<commit_message>
Working on trajectory control
Make sure to use PID controller
</commit_message>
<xml_diff>
--- a/Progress Presentations/8-19-22 Simulink Tests.pptx
+++ b/Progress Presentations/8-19-22 Simulink Tests.pptx
@@ -2,7 +2,7 @@
 <file path=ppt/presentation.xml><?xml version="1.0" encoding="utf-8"?>
 <p:presentation xmlns:a="http://schemas.openxmlformats.org/drawingml/2006/main" xmlns:r="http://schemas.openxmlformats.org/officeDocument/2006/relationships" xmlns:p="http://schemas.openxmlformats.org/presentationml/2006/main" saveSubsetFonts="1">
   <p:sldMasterIdLst>
-    <p:sldMasterId id="2147483648" r:id="rId1"/>
+    <p:sldMasterId id="2147483816" r:id="rId1"/>
   </p:sldMasterIdLst>
   <p:sldIdLst>
     <p:sldId id="256" r:id="rId2"/>
@@ -17,7 +17,7 @@
     <a:defPPr>
       <a:defRPr lang="en-US"/>
     </a:defPPr>
-    <a:lvl1pPr marL="0" algn="l" defTabSz="914400" rtl="0" eaLnBrk="1" latinLnBrk="0" hangingPunct="1">
+    <a:lvl1pPr marL="0" algn="l" defTabSz="457200" rtl="0" eaLnBrk="1" latinLnBrk="0" hangingPunct="1">
       <a:defRPr sz="1800" kern="1200">
         <a:solidFill>
           <a:schemeClr val="tx1"/>
@@ -27,7 +27,7 @@
         <a:cs typeface="+mn-cs"/>
       </a:defRPr>
     </a:lvl1pPr>
-    <a:lvl2pPr marL="457200" algn="l" defTabSz="914400" rtl="0" eaLnBrk="1" latinLnBrk="0" hangingPunct="1">
+    <a:lvl2pPr marL="457200" algn="l" defTabSz="457200" rtl="0" eaLnBrk="1" latinLnBrk="0" hangingPunct="1">
       <a:defRPr sz="1800" kern="1200">
         <a:solidFill>
           <a:schemeClr val="tx1"/>
@@ -37,7 +37,7 @@
         <a:cs typeface="+mn-cs"/>
       </a:defRPr>
     </a:lvl2pPr>
-    <a:lvl3pPr marL="914400" algn="l" defTabSz="914400" rtl="0" eaLnBrk="1" latinLnBrk="0" hangingPunct="1">
+    <a:lvl3pPr marL="914400" algn="l" defTabSz="457200" rtl="0" eaLnBrk="1" latinLnBrk="0" hangingPunct="1">
       <a:defRPr sz="1800" kern="1200">
         <a:solidFill>
           <a:schemeClr val="tx1"/>
@@ -47,7 +47,7 @@
         <a:cs typeface="+mn-cs"/>
       </a:defRPr>
     </a:lvl3pPr>
-    <a:lvl4pPr marL="1371600" algn="l" defTabSz="914400" rtl="0" eaLnBrk="1" latinLnBrk="0" hangingPunct="1">
+    <a:lvl4pPr marL="1371600" algn="l" defTabSz="457200" rtl="0" eaLnBrk="1" latinLnBrk="0" hangingPunct="1">
       <a:defRPr sz="1800" kern="1200">
         <a:solidFill>
           <a:schemeClr val="tx1"/>
@@ -57,7 +57,7 @@
         <a:cs typeface="+mn-cs"/>
       </a:defRPr>
     </a:lvl4pPr>
-    <a:lvl5pPr marL="1828800" algn="l" defTabSz="914400" rtl="0" eaLnBrk="1" latinLnBrk="0" hangingPunct="1">
+    <a:lvl5pPr marL="1828800" algn="l" defTabSz="457200" rtl="0" eaLnBrk="1" latinLnBrk="0" hangingPunct="1">
       <a:defRPr sz="1800" kern="1200">
         <a:solidFill>
           <a:schemeClr val="tx1"/>
@@ -67,7 +67,7 @@
         <a:cs typeface="+mn-cs"/>
       </a:defRPr>
     </a:lvl5pPr>
-    <a:lvl6pPr marL="2286000" algn="l" defTabSz="914400" rtl="0" eaLnBrk="1" latinLnBrk="0" hangingPunct="1">
+    <a:lvl6pPr marL="2286000" algn="l" defTabSz="457200" rtl="0" eaLnBrk="1" latinLnBrk="0" hangingPunct="1">
       <a:defRPr sz="1800" kern="1200">
         <a:solidFill>
           <a:schemeClr val="tx1"/>
@@ -77,7 +77,7 @@
         <a:cs typeface="+mn-cs"/>
       </a:defRPr>
     </a:lvl6pPr>
-    <a:lvl7pPr marL="2743200" algn="l" defTabSz="914400" rtl="0" eaLnBrk="1" latinLnBrk="0" hangingPunct="1">
+    <a:lvl7pPr marL="2743200" algn="l" defTabSz="457200" rtl="0" eaLnBrk="1" latinLnBrk="0" hangingPunct="1">
       <a:defRPr sz="1800" kern="1200">
         <a:solidFill>
           <a:schemeClr val="tx1"/>
@@ -87,7 +87,7 @@
         <a:cs typeface="+mn-cs"/>
       </a:defRPr>
     </a:lvl7pPr>
-    <a:lvl8pPr marL="3200400" algn="l" defTabSz="914400" rtl="0" eaLnBrk="1" latinLnBrk="0" hangingPunct="1">
+    <a:lvl8pPr marL="3200400" algn="l" defTabSz="457200" rtl="0" eaLnBrk="1" latinLnBrk="0" hangingPunct="1">
       <a:defRPr sz="1800" kern="1200">
         <a:solidFill>
           <a:schemeClr val="tx1"/>
@@ -97,7 +97,7 @@
         <a:cs typeface="+mn-cs"/>
       </a:defRPr>
     </a:lvl8pPr>
-    <a:lvl9pPr marL="3657600" algn="l" defTabSz="914400" rtl="0" eaLnBrk="1" latinLnBrk="0" hangingPunct="1">
+    <a:lvl9pPr marL="3657600" algn="l" defTabSz="457200" rtl="0" eaLnBrk="1" latinLnBrk="0" hangingPunct="1">
       <a:defRPr sz="1800" kern="1200">
         <a:solidFill>
           <a:schemeClr val="tx1"/>
@@ -108,6 +108,11 @@
       </a:defRPr>
     </a:lvl9pPr>
   </p:defaultTextStyle>
+  <p:extLst>
+    <p:ext uri="{EFAFB233-063F-42B5-8137-9DF3F51BA10A}">
+      <p15:sldGuideLst xmlns:p15="http://schemas.microsoft.com/office/powerpoint/2012/main"/>
+    </p:ext>
+  </p:extLst>
 </p:presentation>
 </file>
 
@@ -130,13 +135,44 @@
       </p:grpSpPr>
       <p:sp>
         <p:nvSpPr>
-          <p:cNvPr id="2" name="Title 1">
-            <a:extLst>
-              <a:ext uri="{FF2B5EF4-FFF2-40B4-BE49-F238E27FC236}">
-                <a16:creationId xmlns:a16="http://schemas.microsoft.com/office/drawing/2014/main" id="{A18C678F-DB84-B650-32A2-30E89C1DB277}"/>
-              </a:ext>
-            </a:extLst>
-          </p:cNvPr>
+          <p:cNvPr id="7" name="Rectangle 6"/>
+          <p:cNvSpPr/>
+          <p:nvPr/>
+        </p:nvSpPr>
+        <p:spPr>
+          <a:xfrm>
+            <a:off x="446534" y="3085765"/>
+            <a:ext cx="11262866" cy="3304800"/>
+          </a:xfrm>
+          <a:prstGeom prst="rect">
+            <a:avLst/>
+          </a:prstGeom>
+          <a:solidFill>
+            <a:schemeClr val="accent1"/>
+          </a:solidFill>
+          <a:ln>
+            <a:noFill/>
+          </a:ln>
+          <a:effectLst/>
+        </p:spPr>
+        <p:style>
+          <a:lnRef idx="1">
+            <a:schemeClr val="accent1"/>
+          </a:lnRef>
+          <a:fillRef idx="3">
+            <a:schemeClr val="accent1"/>
+          </a:fillRef>
+          <a:effectRef idx="2">
+            <a:schemeClr val="accent1"/>
+          </a:effectRef>
+          <a:fontRef idx="minor">
+            <a:schemeClr val="lt1"/>
+          </a:fontRef>
+        </p:style>
+      </p:sp>
+      <p:sp>
+        <p:nvSpPr>
+          <p:cNvPr id="2" name="Title 1"/>
           <p:cNvSpPr>
             <a:spLocks noGrp="1"/>
           </p:cNvSpPr>
@@ -146,15 +182,22 @@
         </p:nvSpPr>
         <p:spPr>
           <a:xfrm>
-            <a:off x="1524000" y="1122363"/>
-            <a:ext cx="9144000" cy="2387600"/>
-          </a:xfrm>
-        </p:spPr>
-        <p:txBody>
-          <a:bodyPr anchor="b"/>
+            <a:off x="581191" y="1020431"/>
+            <a:ext cx="10993549" cy="1475013"/>
+          </a:xfrm>
+          <a:effectLst/>
+        </p:spPr>
+        <p:txBody>
+          <a:bodyPr anchor="b">
+            <a:normAutofit/>
+          </a:bodyPr>
           <a:lstStyle>
-            <a:lvl1pPr algn="ctr">
-              <a:defRPr sz="6000"/>
+            <a:lvl1pPr>
+              <a:defRPr sz="3600">
+                <a:solidFill>
+                  <a:schemeClr val="accent1"/>
+                </a:solidFill>
+              </a:defRPr>
             </a:lvl1pPr>
           </a:lstStyle>
           <a:p>
@@ -162,18 +205,13 @@
               <a:rPr lang="en-US"/>
               <a:t>Click to edit Master title style</a:t>
             </a:r>
-          </a:p>
-        </p:txBody>
-      </p:sp>
-      <p:sp>
-        <p:nvSpPr>
-          <p:cNvPr id="3" name="Subtitle 2">
-            <a:extLst>
-              <a:ext uri="{FF2B5EF4-FFF2-40B4-BE49-F238E27FC236}">
-                <a16:creationId xmlns:a16="http://schemas.microsoft.com/office/drawing/2014/main" id="{CBCE2795-E0C7-BA5F-11EE-EF5E559906F2}"/>
-              </a:ext>
-            </a:extLst>
-          </p:cNvPr>
+            <a:endParaRPr lang="en-US" dirty="0"/>
+          </a:p>
+        </p:txBody>
+      </p:sp>
+      <p:sp>
+        <p:nvSpPr>
+          <p:cNvPr id="3" name="Subtitle 2"/>
           <p:cNvSpPr>
             <a:spLocks noGrp="1"/>
           </p:cNvSpPr>
@@ -183,78 +221,143 @@
         </p:nvSpPr>
         <p:spPr>
           <a:xfrm>
-            <a:off x="1524000" y="3602038"/>
-            <a:ext cx="9144000" cy="1655762"/>
+            <a:off x="581194" y="2495445"/>
+            <a:ext cx="10993546" cy="590321"/>
+          </a:xfrm>
+        </p:spPr>
+        <p:txBody>
+          <a:bodyPr anchor="t">
+            <a:normAutofit/>
+          </a:bodyPr>
+          <a:lstStyle>
+            <a:lvl1pPr marL="0" indent="0" algn="l">
+              <a:buNone/>
+              <a:defRPr sz="1600" cap="all">
+                <a:solidFill>
+                  <a:schemeClr val="accent2"/>
+                </a:solidFill>
+              </a:defRPr>
+            </a:lvl1pPr>
+            <a:lvl2pPr marL="457200" indent="0" algn="ctr">
+              <a:buNone/>
+              <a:defRPr>
+                <a:solidFill>
+                  <a:schemeClr val="tx1">
+                    <a:tint val="75000"/>
+                  </a:schemeClr>
+                </a:solidFill>
+              </a:defRPr>
+            </a:lvl2pPr>
+            <a:lvl3pPr marL="914400" indent="0" algn="ctr">
+              <a:buNone/>
+              <a:defRPr>
+                <a:solidFill>
+                  <a:schemeClr val="tx1">
+                    <a:tint val="75000"/>
+                  </a:schemeClr>
+                </a:solidFill>
+              </a:defRPr>
+            </a:lvl3pPr>
+            <a:lvl4pPr marL="1371600" indent="0" algn="ctr">
+              <a:buNone/>
+              <a:defRPr>
+                <a:solidFill>
+                  <a:schemeClr val="tx1">
+                    <a:tint val="75000"/>
+                  </a:schemeClr>
+                </a:solidFill>
+              </a:defRPr>
+            </a:lvl4pPr>
+            <a:lvl5pPr marL="1828800" indent="0" algn="ctr">
+              <a:buNone/>
+              <a:defRPr>
+                <a:solidFill>
+                  <a:schemeClr val="tx1">
+                    <a:tint val="75000"/>
+                  </a:schemeClr>
+                </a:solidFill>
+              </a:defRPr>
+            </a:lvl5pPr>
+            <a:lvl6pPr marL="2286000" indent="0" algn="ctr">
+              <a:buNone/>
+              <a:defRPr>
+                <a:solidFill>
+                  <a:schemeClr val="tx1">
+                    <a:tint val="75000"/>
+                  </a:schemeClr>
+                </a:solidFill>
+              </a:defRPr>
+            </a:lvl6pPr>
+            <a:lvl7pPr marL="2743200" indent="0" algn="ctr">
+              <a:buNone/>
+              <a:defRPr>
+                <a:solidFill>
+                  <a:schemeClr val="tx1">
+                    <a:tint val="75000"/>
+                  </a:schemeClr>
+                </a:solidFill>
+              </a:defRPr>
+            </a:lvl7pPr>
+            <a:lvl8pPr marL="3200400" indent="0" algn="ctr">
+              <a:buNone/>
+              <a:defRPr>
+                <a:solidFill>
+                  <a:schemeClr val="tx1">
+                    <a:tint val="75000"/>
+                  </a:schemeClr>
+                </a:solidFill>
+              </a:defRPr>
+            </a:lvl8pPr>
+            <a:lvl9pPr marL="3657600" indent="0" algn="ctr">
+              <a:buNone/>
+              <a:defRPr>
+                <a:solidFill>
+                  <a:schemeClr val="tx1">
+                    <a:tint val="75000"/>
+                  </a:schemeClr>
+                </a:solidFill>
+              </a:defRPr>
+            </a:lvl9pPr>
+          </a:lstStyle>
+          <a:p>
+            <a:r>
+              <a:rPr lang="en-US"/>
+              <a:t>Click to edit Master subtitle style</a:t>
+            </a:r>
+            <a:endParaRPr lang="en-US" dirty="0"/>
+          </a:p>
+        </p:txBody>
+      </p:sp>
+      <p:sp>
+        <p:nvSpPr>
+          <p:cNvPr id="4" name="Date Placeholder 3"/>
+          <p:cNvSpPr>
+            <a:spLocks noGrp="1"/>
+          </p:cNvSpPr>
+          <p:nvPr>
+            <p:ph type="dt" sz="half" idx="10"/>
+          </p:nvPr>
+        </p:nvSpPr>
+        <p:spPr>
+          <a:xfrm>
+            <a:off x="7605951" y="5956137"/>
+            <a:ext cx="2844800" cy="365125"/>
           </a:xfrm>
         </p:spPr>
         <p:txBody>
           <a:bodyPr/>
           <a:lstStyle>
-            <a:lvl1pPr marL="0" indent="0" algn="ctr">
-              <a:buNone/>
-              <a:defRPr sz="2400"/>
+            <a:lvl1pPr>
+              <a:defRPr>
+                <a:solidFill>
+                  <a:schemeClr val="accent1">
+                    <a:lumMod val="75000"/>
+                    <a:lumOff val="25000"/>
+                  </a:schemeClr>
+                </a:solidFill>
+              </a:defRPr>
             </a:lvl1pPr>
-            <a:lvl2pPr marL="457200" indent="0" algn="ctr">
-              <a:buNone/>
-              <a:defRPr sz="2000"/>
-            </a:lvl2pPr>
-            <a:lvl3pPr marL="914400" indent="0" algn="ctr">
-              <a:buNone/>
-              <a:defRPr sz="1800"/>
-            </a:lvl3pPr>
-            <a:lvl4pPr marL="1371600" indent="0" algn="ctr">
-              <a:buNone/>
-              <a:defRPr sz="1600"/>
-            </a:lvl4pPr>
-            <a:lvl5pPr marL="1828800" indent="0" algn="ctr">
-              <a:buNone/>
-              <a:defRPr sz="1600"/>
-            </a:lvl5pPr>
-            <a:lvl6pPr marL="2286000" indent="0" algn="ctr">
-              <a:buNone/>
-              <a:defRPr sz="1600"/>
-            </a:lvl6pPr>
-            <a:lvl7pPr marL="2743200" indent="0" algn="ctr">
-              <a:buNone/>
-              <a:defRPr sz="1600"/>
-            </a:lvl7pPr>
-            <a:lvl8pPr marL="3200400" indent="0" algn="ctr">
-              <a:buNone/>
-              <a:defRPr sz="1600"/>
-            </a:lvl8pPr>
-            <a:lvl9pPr marL="3657600" indent="0" algn="ctr">
-              <a:buNone/>
-              <a:defRPr sz="1600"/>
-            </a:lvl9pPr>
           </a:lstStyle>
-          <a:p>
-            <a:r>
-              <a:rPr lang="en-US"/>
-              <a:t>Click to edit Master subtitle style</a:t>
-            </a:r>
-          </a:p>
-        </p:txBody>
-      </p:sp>
-      <p:sp>
-        <p:nvSpPr>
-          <p:cNvPr id="4" name="Date Placeholder 3">
-            <a:extLst>
-              <a:ext uri="{FF2B5EF4-FFF2-40B4-BE49-F238E27FC236}">
-                <a16:creationId xmlns:a16="http://schemas.microsoft.com/office/drawing/2014/main" id="{1A80573E-446A-D3BD-6DA4-427D94428DAA}"/>
-              </a:ext>
-            </a:extLst>
-          </p:cNvPr>
-          <p:cNvSpPr>
-            <a:spLocks noGrp="1"/>
-          </p:cNvSpPr>
-          <p:nvPr>
-            <p:ph type="dt" sz="half" idx="10"/>
-          </p:nvPr>
-        </p:nvSpPr>
-        <p:spPr/>
-        <p:txBody>
-          <a:bodyPr/>
-          <a:lstStyle/>
           <a:p>
             <a:fld id="{FB6CDBC1-C56B-4840-9889-BEFDC1B8AD8A}" type="datetimeFigureOut">
               <a:rPr lang="en-US" smtClean="0"/>
@@ -266,13 +369,7 @@
       </p:sp>
       <p:sp>
         <p:nvSpPr>
-          <p:cNvPr id="5" name="Footer Placeholder 4">
-            <a:extLst>
-              <a:ext uri="{FF2B5EF4-FFF2-40B4-BE49-F238E27FC236}">
-                <a16:creationId xmlns:a16="http://schemas.microsoft.com/office/drawing/2014/main" id="{F26722D6-BE5C-F2BB-4A87-9214FE5F30BB}"/>
-              </a:ext>
-            </a:extLst>
-          </p:cNvPr>
+          <p:cNvPr id="5" name="Footer Placeholder 4"/>
           <p:cNvSpPr>
             <a:spLocks noGrp="1"/>
           </p:cNvSpPr>
@@ -280,10 +377,26 @@
             <p:ph type="ftr" sz="quarter" idx="11"/>
           </p:nvPr>
         </p:nvSpPr>
-        <p:spPr/>
+        <p:spPr>
+          <a:xfrm>
+            <a:off x="581192" y="5951811"/>
+            <a:ext cx="6917210" cy="365125"/>
+          </a:xfrm>
+        </p:spPr>
         <p:txBody>
           <a:bodyPr/>
-          <a:lstStyle/>
+          <a:lstStyle>
+            <a:lvl1pPr>
+              <a:defRPr>
+                <a:solidFill>
+                  <a:schemeClr val="accent1">
+                    <a:lumMod val="75000"/>
+                    <a:lumOff val="25000"/>
+                  </a:schemeClr>
+                </a:solidFill>
+              </a:defRPr>
+            </a:lvl1pPr>
+          </a:lstStyle>
           <a:p>
             <a:endParaRPr lang="en-US"/>
           </a:p>
@@ -291,13 +404,7 @@
       </p:sp>
       <p:sp>
         <p:nvSpPr>
-          <p:cNvPr id="6" name="Slide Number Placeholder 5">
-            <a:extLst>
-              <a:ext uri="{FF2B5EF4-FFF2-40B4-BE49-F238E27FC236}">
-                <a16:creationId xmlns:a16="http://schemas.microsoft.com/office/drawing/2014/main" id="{FCC88F2E-E088-314E-8264-FCB72166FA15}"/>
-              </a:ext>
-            </a:extLst>
-          </p:cNvPr>
+          <p:cNvPr id="6" name="Slide Number Placeholder 5"/>
           <p:cNvSpPr>
             <a:spLocks noGrp="1"/>
           </p:cNvSpPr>
@@ -305,10 +412,26 @@
             <p:ph type="sldNum" sz="quarter" idx="12"/>
           </p:nvPr>
         </p:nvSpPr>
-        <p:spPr/>
+        <p:spPr>
+          <a:xfrm>
+            <a:off x="10558300" y="5956137"/>
+            <a:ext cx="1016440" cy="365125"/>
+          </a:xfrm>
+        </p:spPr>
         <p:txBody>
           <a:bodyPr/>
-          <a:lstStyle/>
+          <a:lstStyle>
+            <a:lvl1pPr>
+              <a:defRPr>
+                <a:solidFill>
+                  <a:schemeClr val="accent1">
+                    <a:lumMod val="75000"/>
+                    <a:lumOff val="25000"/>
+                  </a:schemeClr>
+                </a:solidFill>
+              </a:defRPr>
+            </a:lvl1pPr>
+          </a:lstStyle>
           <a:p>
             <a:fld id="{5364A9A8-0A73-4C42-A307-CE7FA1FE9880}" type="slidenum">
               <a:rPr lang="en-US" smtClean="0"/>
@@ -321,7 +444,7 @@
     </p:spTree>
     <p:extLst>
       <p:ext uri="{BB962C8B-B14F-4D97-AF65-F5344CB8AC3E}">
-        <p14:creationId xmlns:p14="http://schemas.microsoft.com/office/powerpoint/2010/main" val="2743108863"/>
+        <p14:creationId xmlns:p14="http://schemas.microsoft.com/office/powerpoint/2010/main" val="717947820"/>
       </p:ext>
     </p:extLst>
   </p:cSld>
@@ -350,13 +473,46 @@
       </p:grpSpPr>
       <p:sp>
         <p:nvSpPr>
-          <p:cNvPr id="2" name="Title 1">
-            <a:extLst>
-              <a:ext uri="{FF2B5EF4-FFF2-40B4-BE49-F238E27FC236}">
-                <a16:creationId xmlns:a16="http://schemas.microsoft.com/office/drawing/2014/main" id="{60971B08-E0C7-739D-B56B-604FE8EB3298}"/>
-              </a:ext>
-            </a:extLst>
-          </p:cNvPr>
+          <p:cNvPr id="8" name="Rectangle 7"/>
+          <p:cNvSpPr>
+            <a:spLocks noChangeAspect="1"/>
+          </p:cNvSpPr>
+          <p:nvPr/>
+        </p:nvSpPr>
+        <p:spPr>
+          <a:xfrm>
+            <a:off x="440286" y="614407"/>
+            <a:ext cx="11309338" cy="1189298"/>
+          </a:xfrm>
+          <a:prstGeom prst="rect">
+            <a:avLst/>
+          </a:prstGeom>
+          <a:solidFill>
+            <a:schemeClr val="accent1"/>
+          </a:solidFill>
+          <a:ln>
+            <a:noFill/>
+          </a:ln>
+          <a:effectLst/>
+        </p:spPr>
+        <p:style>
+          <a:lnRef idx="1">
+            <a:schemeClr val="accent1"/>
+          </a:lnRef>
+          <a:fillRef idx="3">
+            <a:schemeClr val="accent1"/>
+          </a:fillRef>
+          <a:effectRef idx="2">
+            <a:schemeClr val="accent1"/>
+          </a:effectRef>
+          <a:fontRef idx="minor">
+            <a:schemeClr val="lt1"/>
+          </a:fontRef>
+        </p:style>
+      </p:sp>
+      <p:sp>
+        <p:nvSpPr>
+          <p:cNvPr id="9" name="Title 1"/>
           <p:cNvSpPr>
             <a:spLocks noGrp="1"/>
           </p:cNvSpPr>
@@ -364,7 +520,12 @@
             <p:ph type="title"/>
           </p:nvPr>
         </p:nvSpPr>
-        <p:spPr/>
+        <p:spPr>
+          <a:xfrm>
+            <a:off x="581192" y="702156"/>
+            <a:ext cx="11029616" cy="1013800"/>
+          </a:xfrm>
+        </p:spPr>
         <p:txBody>
           <a:bodyPr/>
           <a:lstStyle/>
@@ -373,18 +534,13 @@
               <a:rPr lang="en-US"/>
               <a:t>Click to edit Master title style</a:t>
             </a:r>
-          </a:p>
-        </p:txBody>
-      </p:sp>
-      <p:sp>
-        <p:nvSpPr>
-          <p:cNvPr id="3" name="Vertical Text Placeholder 2">
-            <a:extLst>
-              <a:ext uri="{FF2B5EF4-FFF2-40B4-BE49-F238E27FC236}">
-                <a16:creationId xmlns:a16="http://schemas.microsoft.com/office/drawing/2014/main" id="{55D0A415-397E-B4B5-96D5-6810E6FB8D76}"/>
-              </a:ext>
-            </a:extLst>
-          </p:cNvPr>
+            <a:endParaRPr lang="en-US" dirty="0"/>
+          </a:p>
+        </p:txBody>
+      </p:sp>
+      <p:sp>
+        <p:nvSpPr>
+          <p:cNvPr id="3" name="Vertical Text Placeholder 2"/>
           <p:cNvSpPr>
             <a:spLocks noGrp="1"/>
           </p:cNvSpPr>
@@ -394,8 +550,24 @@
         </p:nvSpPr>
         <p:spPr/>
         <p:txBody>
-          <a:bodyPr vert="eaVert"/>
-          <a:lstStyle/>
+          <a:bodyPr vert="eaVert" anchor="t"/>
+          <a:lstStyle>
+            <a:lvl1pPr algn="l">
+              <a:defRPr/>
+            </a:lvl1pPr>
+            <a:lvl2pPr algn="l">
+              <a:defRPr/>
+            </a:lvl2pPr>
+            <a:lvl3pPr algn="l">
+              <a:defRPr/>
+            </a:lvl3pPr>
+            <a:lvl4pPr algn="l">
+              <a:defRPr/>
+            </a:lvl4pPr>
+            <a:lvl5pPr algn="l">
+              <a:defRPr/>
+            </a:lvl5pPr>
+          </a:lstStyle>
           <a:p>
             <a:pPr lvl="0"/>
             <a:r>
@@ -430,18 +602,13 @@
               <a:rPr lang="en-US"/>
               <a:t>Fifth level</a:t>
             </a:r>
-          </a:p>
-        </p:txBody>
-      </p:sp>
-      <p:sp>
-        <p:nvSpPr>
-          <p:cNvPr id="4" name="Date Placeholder 3">
-            <a:extLst>
-              <a:ext uri="{FF2B5EF4-FFF2-40B4-BE49-F238E27FC236}">
-                <a16:creationId xmlns:a16="http://schemas.microsoft.com/office/drawing/2014/main" id="{00F97B04-051C-F7D6-0A6F-7B021B4C3165}"/>
-              </a:ext>
-            </a:extLst>
-          </p:cNvPr>
+            <a:endParaRPr lang="en-US" dirty="0"/>
+          </a:p>
+        </p:txBody>
+      </p:sp>
+      <p:sp>
+        <p:nvSpPr>
+          <p:cNvPr id="4" name="Date Placeholder 3"/>
           <p:cNvSpPr>
             <a:spLocks noGrp="1"/>
           </p:cNvSpPr>
@@ -464,13 +631,7 @@
       </p:sp>
       <p:sp>
         <p:nvSpPr>
-          <p:cNvPr id="5" name="Footer Placeholder 4">
-            <a:extLst>
-              <a:ext uri="{FF2B5EF4-FFF2-40B4-BE49-F238E27FC236}">
-                <a16:creationId xmlns:a16="http://schemas.microsoft.com/office/drawing/2014/main" id="{E396FCC6-BBEA-2BC5-DA03-2578A0E34E54}"/>
-              </a:ext>
-            </a:extLst>
-          </p:cNvPr>
+          <p:cNvPr id="5" name="Footer Placeholder 4"/>
           <p:cNvSpPr>
             <a:spLocks noGrp="1"/>
           </p:cNvSpPr>
@@ -489,13 +650,7 @@
       </p:sp>
       <p:sp>
         <p:nvSpPr>
-          <p:cNvPr id="6" name="Slide Number Placeholder 5">
-            <a:extLst>
-              <a:ext uri="{FF2B5EF4-FFF2-40B4-BE49-F238E27FC236}">
-                <a16:creationId xmlns:a16="http://schemas.microsoft.com/office/drawing/2014/main" id="{5A6C152E-8CCD-2A16-77F6-FE095AE3763F}"/>
-              </a:ext>
-            </a:extLst>
-          </p:cNvPr>
+          <p:cNvPr id="6" name="Slide Number Placeholder 5"/>
           <p:cNvSpPr>
             <a:spLocks noGrp="1"/>
           </p:cNvSpPr>
@@ -519,7 +674,7 @@
     </p:spTree>
     <p:extLst>
       <p:ext uri="{BB962C8B-B14F-4D97-AF65-F5344CB8AC3E}">
-        <p14:creationId xmlns:p14="http://schemas.microsoft.com/office/powerpoint/2010/main" val="3919960886"/>
+        <p14:creationId xmlns:p14="http://schemas.microsoft.com/office/powerpoint/2010/main" val="3392605954"/>
       </p:ext>
     </p:extLst>
   </p:cSld>
@@ -548,13 +703,46 @@
       </p:grpSpPr>
       <p:sp>
         <p:nvSpPr>
-          <p:cNvPr id="2" name="Vertical Title 1">
-            <a:extLst>
-              <a:ext uri="{FF2B5EF4-FFF2-40B4-BE49-F238E27FC236}">
-                <a16:creationId xmlns:a16="http://schemas.microsoft.com/office/drawing/2014/main" id="{27DF2B7A-C223-738E-094C-2899664B7CC2}"/>
-              </a:ext>
-            </a:extLst>
-          </p:cNvPr>
+          <p:cNvPr id="7" name="Rectangle 6"/>
+          <p:cNvSpPr>
+            <a:spLocks noChangeAspect="1"/>
+          </p:cNvSpPr>
+          <p:nvPr/>
+        </p:nvSpPr>
+        <p:spPr>
+          <a:xfrm>
+            <a:off x="8839201" y="599725"/>
+            <a:ext cx="2906817" cy="5816950"/>
+          </a:xfrm>
+          <a:prstGeom prst="rect">
+            <a:avLst/>
+          </a:prstGeom>
+          <a:solidFill>
+            <a:schemeClr val="accent1"/>
+          </a:solidFill>
+          <a:ln>
+            <a:noFill/>
+          </a:ln>
+          <a:effectLst/>
+        </p:spPr>
+        <p:style>
+          <a:lnRef idx="1">
+            <a:schemeClr val="accent1"/>
+          </a:lnRef>
+          <a:fillRef idx="3">
+            <a:schemeClr val="accent1"/>
+          </a:fillRef>
+          <a:effectRef idx="2">
+            <a:schemeClr val="accent1"/>
+          </a:effectRef>
+          <a:fontRef idx="minor">
+            <a:schemeClr val="lt1"/>
+          </a:fontRef>
+        </p:style>
+      </p:sp>
+      <p:sp>
+        <p:nvSpPr>
+          <p:cNvPr id="2" name="Vertical Title 1"/>
           <p:cNvSpPr>
             <a:spLocks noGrp="1"/>
           </p:cNvSpPr>
@@ -564,8 +752,8 @@
         </p:nvSpPr>
         <p:spPr>
           <a:xfrm>
-            <a:off x="8724900" y="365125"/>
-            <a:ext cx="2628900" cy="5811838"/>
+            <a:off x="8839201" y="675726"/>
+            <a:ext cx="2004164" cy="5183073"/>
           </a:xfrm>
         </p:spPr>
         <p:txBody>
@@ -576,18 +764,13 @@
               <a:rPr lang="en-US"/>
               <a:t>Click to edit Master title style</a:t>
             </a:r>
-          </a:p>
-        </p:txBody>
-      </p:sp>
-      <p:sp>
-        <p:nvSpPr>
-          <p:cNvPr id="3" name="Vertical Text Placeholder 2">
-            <a:extLst>
-              <a:ext uri="{FF2B5EF4-FFF2-40B4-BE49-F238E27FC236}">
-                <a16:creationId xmlns:a16="http://schemas.microsoft.com/office/drawing/2014/main" id="{BE290EED-AA0F-CA87-7CE7-17B123EB6B99}"/>
-              </a:ext>
-            </a:extLst>
-          </p:cNvPr>
+            <a:endParaRPr lang="en-US" dirty="0"/>
+          </a:p>
+        </p:txBody>
+      </p:sp>
+      <p:sp>
+        <p:nvSpPr>
+          <p:cNvPr id="3" name="Vertical Text Placeholder 2"/>
           <p:cNvSpPr>
             <a:spLocks noGrp="1"/>
           </p:cNvSpPr>
@@ -597,12 +780,12 @@
         </p:nvSpPr>
         <p:spPr>
           <a:xfrm>
-            <a:off x="838200" y="365125"/>
-            <a:ext cx="7734300" cy="5811838"/>
-          </a:xfrm>
-        </p:spPr>
-        <p:txBody>
-          <a:bodyPr vert="eaVert"/>
+            <a:off x="774923" y="675726"/>
+            <a:ext cx="7896279" cy="5183073"/>
+          </a:xfrm>
+        </p:spPr>
+        <p:txBody>
+          <a:bodyPr vert="eaVert" anchor="t"/>
           <a:lstStyle/>
           <a:p>
             <a:pPr lvl="0"/>
@@ -638,18 +821,13 @@
               <a:rPr lang="en-US"/>
               <a:t>Fifth level</a:t>
             </a:r>
-          </a:p>
-        </p:txBody>
-      </p:sp>
-      <p:sp>
-        <p:nvSpPr>
-          <p:cNvPr id="4" name="Date Placeholder 3">
-            <a:extLst>
-              <a:ext uri="{FF2B5EF4-FFF2-40B4-BE49-F238E27FC236}">
-                <a16:creationId xmlns:a16="http://schemas.microsoft.com/office/drawing/2014/main" id="{2F05FCEE-F3AA-1932-DEEF-E60327255D59}"/>
-              </a:ext>
-            </a:extLst>
-          </p:cNvPr>
+            <a:endParaRPr lang="en-US" dirty="0"/>
+          </a:p>
+        </p:txBody>
+      </p:sp>
+      <p:sp>
+        <p:nvSpPr>
+          <p:cNvPr id="4" name="Date Placeholder 3"/>
           <p:cNvSpPr>
             <a:spLocks noGrp="1"/>
           </p:cNvSpPr>
@@ -657,10 +835,26 @@
             <p:ph type="dt" sz="half" idx="10"/>
           </p:nvPr>
         </p:nvSpPr>
-        <p:spPr/>
+        <p:spPr>
+          <a:xfrm>
+            <a:off x="8993673" y="5956137"/>
+            <a:ext cx="1328141" cy="365125"/>
+          </a:xfrm>
+        </p:spPr>
         <p:txBody>
           <a:bodyPr/>
-          <a:lstStyle/>
+          <a:lstStyle>
+            <a:lvl1pPr>
+              <a:defRPr>
+                <a:solidFill>
+                  <a:schemeClr val="accent1">
+                    <a:lumMod val="75000"/>
+                    <a:lumOff val="25000"/>
+                  </a:schemeClr>
+                </a:solidFill>
+              </a:defRPr>
+            </a:lvl1pPr>
+          </a:lstStyle>
           <a:p>
             <a:fld id="{FB6CDBC1-C56B-4840-9889-BEFDC1B8AD8A}" type="datetimeFigureOut">
               <a:rPr lang="en-US" smtClean="0"/>
@@ -672,13 +866,7 @@
       </p:sp>
       <p:sp>
         <p:nvSpPr>
-          <p:cNvPr id="5" name="Footer Placeholder 4">
-            <a:extLst>
-              <a:ext uri="{FF2B5EF4-FFF2-40B4-BE49-F238E27FC236}">
-                <a16:creationId xmlns:a16="http://schemas.microsoft.com/office/drawing/2014/main" id="{BDEE30D6-DB3D-0B0A-D08A-63917701913B}"/>
-              </a:ext>
-            </a:extLst>
-          </p:cNvPr>
+          <p:cNvPr id="5" name="Footer Placeholder 4"/>
           <p:cNvSpPr>
             <a:spLocks noGrp="1"/>
           </p:cNvSpPr>
@@ -686,7 +874,12 @@
             <p:ph type="ftr" sz="quarter" idx="11"/>
           </p:nvPr>
         </p:nvSpPr>
-        <p:spPr/>
+        <p:spPr>
+          <a:xfrm>
+            <a:off x="774923" y="5951811"/>
+            <a:ext cx="7896279" cy="365125"/>
+          </a:xfrm>
+        </p:spPr>
         <p:txBody>
           <a:bodyPr/>
           <a:lstStyle/>
@@ -697,13 +890,7 @@
       </p:sp>
       <p:sp>
         <p:nvSpPr>
-          <p:cNvPr id="6" name="Slide Number Placeholder 5">
-            <a:extLst>
-              <a:ext uri="{FF2B5EF4-FFF2-40B4-BE49-F238E27FC236}">
-                <a16:creationId xmlns:a16="http://schemas.microsoft.com/office/drawing/2014/main" id="{89F7184B-FB6D-8D07-41C3-8E0149B16F11}"/>
-              </a:ext>
-            </a:extLst>
-          </p:cNvPr>
+          <p:cNvPr id="6" name="Slide Number Placeholder 5"/>
           <p:cNvSpPr>
             <a:spLocks noGrp="1"/>
           </p:cNvSpPr>
@@ -711,10 +898,26 @@
             <p:ph type="sldNum" sz="quarter" idx="12"/>
           </p:nvPr>
         </p:nvSpPr>
-        <p:spPr/>
+        <p:spPr>
+          <a:xfrm>
+            <a:off x="10446615" y="5956137"/>
+            <a:ext cx="1164195" cy="365125"/>
+          </a:xfrm>
+        </p:spPr>
         <p:txBody>
           <a:bodyPr/>
-          <a:lstStyle/>
+          <a:lstStyle>
+            <a:lvl1pPr>
+              <a:defRPr>
+                <a:solidFill>
+                  <a:schemeClr val="accent1">
+                    <a:lumMod val="75000"/>
+                    <a:lumOff val="25000"/>
+                  </a:schemeClr>
+                </a:solidFill>
+              </a:defRPr>
+            </a:lvl1pPr>
+          </a:lstStyle>
           <a:p>
             <a:fld id="{5364A9A8-0A73-4C42-A307-CE7FA1FE9880}" type="slidenum">
               <a:rPr lang="en-US" smtClean="0"/>
@@ -727,7 +930,7 @@
     </p:spTree>
     <p:extLst>
       <p:ext uri="{BB962C8B-B14F-4D97-AF65-F5344CB8AC3E}">
-        <p14:creationId xmlns:p14="http://schemas.microsoft.com/office/powerpoint/2010/main" val="3061127169"/>
+        <p14:creationId xmlns:p14="http://schemas.microsoft.com/office/powerpoint/2010/main" val="2556461898"/>
       </p:ext>
     </p:extLst>
   </p:cSld>
@@ -756,13 +959,46 @@
       </p:grpSpPr>
       <p:sp>
         <p:nvSpPr>
-          <p:cNvPr id="2" name="Title 1">
-            <a:extLst>
-              <a:ext uri="{FF2B5EF4-FFF2-40B4-BE49-F238E27FC236}">
-                <a16:creationId xmlns:a16="http://schemas.microsoft.com/office/drawing/2014/main" id="{277C1DAD-E856-412E-A2F8-57FAF665D6B4}"/>
-              </a:ext>
-            </a:extLst>
-          </p:cNvPr>
+          <p:cNvPr id="7" name="Rectangle 6"/>
+          <p:cNvSpPr>
+            <a:spLocks noChangeAspect="1"/>
+          </p:cNvSpPr>
+          <p:nvPr/>
+        </p:nvSpPr>
+        <p:spPr>
+          <a:xfrm>
+            <a:off x="440286" y="614407"/>
+            <a:ext cx="11309338" cy="1189298"/>
+          </a:xfrm>
+          <a:prstGeom prst="rect">
+            <a:avLst/>
+          </a:prstGeom>
+          <a:solidFill>
+            <a:schemeClr val="accent1"/>
+          </a:solidFill>
+          <a:ln>
+            <a:noFill/>
+          </a:ln>
+          <a:effectLst/>
+        </p:spPr>
+        <p:style>
+          <a:lnRef idx="1">
+            <a:schemeClr val="accent1"/>
+          </a:lnRef>
+          <a:fillRef idx="3">
+            <a:schemeClr val="accent1"/>
+          </a:fillRef>
+          <a:effectRef idx="2">
+            <a:schemeClr val="accent1"/>
+          </a:effectRef>
+          <a:fontRef idx="minor">
+            <a:schemeClr val="lt1"/>
+          </a:fontRef>
+        </p:style>
+      </p:sp>
+      <p:sp>
+        <p:nvSpPr>
+          <p:cNvPr id="2" name="Title 1"/>
           <p:cNvSpPr>
             <a:spLocks noGrp="1"/>
           </p:cNvSpPr>
@@ -770,7 +1006,12 @@
             <p:ph type="title"/>
           </p:nvPr>
         </p:nvSpPr>
-        <p:spPr/>
+        <p:spPr>
+          <a:xfrm>
+            <a:off x="581192" y="702156"/>
+            <a:ext cx="11029616" cy="1013800"/>
+          </a:xfrm>
+        </p:spPr>
         <p:txBody>
           <a:bodyPr/>
           <a:lstStyle/>
@@ -779,18 +1020,13 @@
               <a:rPr lang="en-US"/>
               <a:t>Click to edit Master title style</a:t>
             </a:r>
-          </a:p>
-        </p:txBody>
-      </p:sp>
-      <p:sp>
-        <p:nvSpPr>
-          <p:cNvPr id="3" name="Content Placeholder 2">
-            <a:extLst>
-              <a:ext uri="{FF2B5EF4-FFF2-40B4-BE49-F238E27FC236}">
-                <a16:creationId xmlns:a16="http://schemas.microsoft.com/office/drawing/2014/main" id="{3EEB9C58-E02F-BAFD-D090-02018FBFF665}"/>
-              </a:ext>
-            </a:extLst>
-          </p:cNvPr>
+            <a:endParaRPr lang="en-US" dirty="0"/>
+          </a:p>
+        </p:txBody>
+      </p:sp>
+      <p:sp>
+        <p:nvSpPr>
+          <p:cNvPr id="3" name="Content Placeholder 2"/>
           <p:cNvSpPr>
             <a:spLocks noGrp="1"/>
           </p:cNvSpPr>
@@ -798,7 +1034,12 @@
             <p:ph idx="1"/>
           </p:nvPr>
         </p:nvSpPr>
-        <p:spPr/>
+        <p:spPr>
+          <a:xfrm>
+            <a:off x="581192" y="2180496"/>
+            <a:ext cx="11029615" cy="3678303"/>
+          </a:xfrm>
+        </p:spPr>
         <p:txBody>
           <a:bodyPr/>
           <a:lstStyle/>
@@ -836,18 +1077,13 @@
               <a:rPr lang="en-US"/>
               <a:t>Fifth level</a:t>
             </a:r>
-          </a:p>
-        </p:txBody>
-      </p:sp>
-      <p:sp>
-        <p:nvSpPr>
-          <p:cNvPr id="4" name="Date Placeholder 3">
-            <a:extLst>
-              <a:ext uri="{FF2B5EF4-FFF2-40B4-BE49-F238E27FC236}">
-                <a16:creationId xmlns:a16="http://schemas.microsoft.com/office/drawing/2014/main" id="{C85F4360-73DC-8621-116C-4DD89FBFA0AE}"/>
-              </a:ext>
-            </a:extLst>
-          </p:cNvPr>
+            <a:endParaRPr lang="en-US" dirty="0"/>
+          </a:p>
+        </p:txBody>
+      </p:sp>
+      <p:sp>
+        <p:nvSpPr>
+          <p:cNvPr id="4" name="Date Placeholder 3"/>
           <p:cNvSpPr>
             <a:spLocks noGrp="1"/>
           </p:cNvSpPr>
@@ -870,13 +1106,7 @@
       </p:sp>
       <p:sp>
         <p:nvSpPr>
-          <p:cNvPr id="5" name="Footer Placeholder 4">
-            <a:extLst>
-              <a:ext uri="{FF2B5EF4-FFF2-40B4-BE49-F238E27FC236}">
-                <a16:creationId xmlns:a16="http://schemas.microsoft.com/office/drawing/2014/main" id="{71390CF9-718A-1768-65F4-88CD461AFF90}"/>
-              </a:ext>
-            </a:extLst>
-          </p:cNvPr>
+          <p:cNvPr id="5" name="Footer Placeholder 4"/>
           <p:cNvSpPr>
             <a:spLocks noGrp="1"/>
           </p:cNvSpPr>
@@ -895,13 +1125,7 @@
       </p:sp>
       <p:sp>
         <p:nvSpPr>
-          <p:cNvPr id="6" name="Slide Number Placeholder 5">
-            <a:extLst>
-              <a:ext uri="{FF2B5EF4-FFF2-40B4-BE49-F238E27FC236}">
-                <a16:creationId xmlns:a16="http://schemas.microsoft.com/office/drawing/2014/main" id="{147F5499-CE66-F8D0-9986-3C2CB3A20E05}"/>
-              </a:ext>
-            </a:extLst>
-          </p:cNvPr>
+          <p:cNvPr id="6" name="Slide Number Placeholder 5"/>
           <p:cNvSpPr>
             <a:spLocks noGrp="1"/>
           </p:cNvSpPr>
@@ -909,7 +1133,12 @@
             <p:ph type="sldNum" sz="quarter" idx="12"/>
           </p:nvPr>
         </p:nvSpPr>
-        <p:spPr/>
+        <p:spPr>
+          <a:xfrm>
+            <a:off x="10558300" y="5956137"/>
+            <a:ext cx="1052508" cy="365125"/>
+          </a:xfrm>
+        </p:spPr>
         <p:txBody>
           <a:bodyPr/>
           <a:lstStyle/>
@@ -925,7 +1154,7 @@
     </p:spTree>
     <p:extLst>
       <p:ext uri="{BB962C8B-B14F-4D97-AF65-F5344CB8AC3E}">
-        <p14:creationId xmlns:p14="http://schemas.microsoft.com/office/powerpoint/2010/main" val="1473125560"/>
+        <p14:creationId xmlns:p14="http://schemas.microsoft.com/office/powerpoint/2010/main" val="3511242015"/>
       </p:ext>
     </p:extLst>
   </p:cSld>
@@ -954,13 +1183,46 @@
       </p:grpSpPr>
       <p:sp>
         <p:nvSpPr>
-          <p:cNvPr id="2" name="Title 1">
-            <a:extLst>
-              <a:ext uri="{FF2B5EF4-FFF2-40B4-BE49-F238E27FC236}">
-                <a16:creationId xmlns:a16="http://schemas.microsoft.com/office/drawing/2014/main" id="{26E91703-457C-9CF8-52FA-45EE448ACF8D}"/>
-              </a:ext>
-            </a:extLst>
-          </p:cNvPr>
+          <p:cNvPr id="8" name="Rectangle 7"/>
+          <p:cNvSpPr>
+            <a:spLocks noChangeAspect="1"/>
+          </p:cNvSpPr>
+          <p:nvPr/>
+        </p:nvSpPr>
+        <p:spPr>
+          <a:xfrm>
+            <a:off x="447817" y="5141974"/>
+            <a:ext cx="11290860" cy="1258827"/>
+          </a:xfrm>
+          <a:prstGeom prst="rect">
+            <a:avLst/>
+          </a:prstGeom>
+          <a:solidFill>
+            <a:schemeClr val="accent1"/>
+          </a:solidFill>
+          <a:ln>
+            <a:noFill/>
+          </a:ln>
+          <a:effectLst/>
+        </p:spPr>
+        <p:style>
+          <a:lnRef idx="1">
+            <a:schemeClr val="accent1"/>
+          </a:lnRef>
+          <a:fillRef idx="3">
+            <a:schemeClr val="accent1"/>
+          </a:fillRef>
+          <a:effectRef idx="2">
+            <a:schemeClr val="accent1"/>
+          </a:effectRef>
+          <a:fontRef idx="minor">
+            <a:schemeClr val="lt1"/>
+          </a:fontRef>
+        </p:style>
+      </p:sp>
+      <p:sp>
+        <p:nvSpPr>
+          <p:cNvPr id="2" name="Title 1"/>
           <p:cNvSpPr>
             <a:spLocks noGrp="1"/>
           </p:cNvSpPr>
@@ -970,15 +1232,21 @@
         </p:nvSpPr>
         <p:spPr>
           <a:xfrm>
-            <a:off x="831850" y="1709738"/>
-            <a:ext cx="10515600" cy="2852737"/>
-          </a:xfrm>
-        </p:spPr>
-        <p:txBody>
-          <a:bodyPr anchor="b"/>
+            <a:off x="581193" y="3043910"/>
+            <a:ext cx="11029615" cy="1497507"/>
+          </a:xfrm>
+        </p:spPr>
+        <p:txBody>
+          <a:bodyPr anchor="b">
+            <a:normAutofit/>
+          </a:bodyPr>
           <a:lstStyle>
-            <a:lvl1pPr>
-              <a:defRPr sz="6000"/>
+            <a:lvl1pPr algn="l">
+              <a:defRPr sz="3600" b="0" cap="all">
+                <a:solidFill>
+                  <a:schemeClr val="accent1"/>
+                </a:solidFill>
+              </a:defRPr>
             </a:lvl1pPr>
           </a:lstStyle>
           <a:p>
@@ -986,18 +1254,13 @@
               <a:rPr lang="en-US"/>
               <a:t>Click to edit Master title style</a:t>
             </a:r>
-          </a:p>
-        </p:txBody>
-      </p:sp>
-      <p:sp>
-        <p:nvSpPr>
-          <p:cNvPr id="3" name="Text Placeholder 2">
-            <a:extLst>
-              <a:ext uri="{FF2B5EF4-FFF2-40B4-BE49-F238E27FC236}">
-                <a16:creationId xmlns:a16="http://schemas.microsoft.com/office/drawing/2014/main" id="{7F62ACF4-F0D5-82B3-F98B-9813DEDF3CFB}"/>
-              </a:ext>
-            </a:extLst>
-          </p:cNvPr>
+            <a:endParaRPr lang="en-US" dirty="0"/>
+          </a:p>
+        </p:txBody>
+      </p:sp>
+      <p:sp>
+        <p:nvSpPr>
+          <p:cNvPr id="3" name="Text Placeholder 2"/>
           <p:cNvSpPr>
             <a:spLocks noGrp="1"/>
           </p:cNvSpPr>
@@ -1007,102 +1270,102 @@
         </p:nvSpPr>
         <p:spPr>
           <a:xfrm>
-            <a:off x="831850" y="4589463"/>
-            <a:ext cx="10515600" cy="1500187"/>
-          </a:xfrm>
-        </p:spPr>
-        <p:txBody>
-          <a:bodyPr/>
+            <a:off x="581192" y="4541417"/>
+            <a:ext cx="11029615" cy="600556"/>
+          </a:xfrm>
+        </p:spPr>
+        <p:txBody>
+          <a:bodyPr anchor="t">
+            <a:normAutofit/>
+          </a:bodyPr>
           <a:lstStyle>
-            <a:lvl1pPr marL="0" indent="0">
-              <a:buNone/>
-              <a:defRPr sz="2400">
+            <a:lvl1pPr marL="0" indent="0" algn="l">
+              <a:buNone/>
+              <a:defRPr sz="1800" cap="all">
+                <a:solidFill>
+                  <a:schemeClr val="accent2"/>
+                </a:solidFill>
+              </a:defRPr>
+            </a:lvl1pPr>
+            <a:lvl2pPr marL="457200" indent="0">
+              <a:buNone/>
+              <a:defRPr sz="1800">
                 <a:solidFill>
                   <a:schemeClr val="tx1">
                     <a:tint val="75000"/>
                   </a:schemeClr>
                 </a:solidFill>
               </a:defRPr>
-            </a:lvl1pPr>
-            <a:lvl2pPr marL="457200" indent="0">
-              <a:buNone/>
-              <a:defRPr sz="2000">
+            </a:lvl2pPr>
+            <a:lvl3pPr marL="914400" indent="0">
+              <a:buNone/>
+              <a:defRPr sz="1600">
                 <a:solidFill>
                   <a:schemeClr val="tx1">
                     <a:tint val="75000"/>
                   </a:schemeClr>
                 </a:solidFill>
               </a:defRPr>
-            </a:lvl2pPr>
-            <a:lvl3pPr marL="914400" indent="0">
-              <a:buNone/>
-              <a:defRPr sz="1800">
+            </a:lvl3pPr>
+            <a:lvl4pPr marL="1371600" indent="0">
+              <a:buNone/>
+              <a:defRPr sz="1400">
                 <a:solidFill>
                   <a:schemeClr val="tx1">
                     <a:tint val="75000"/>
                   </a:schemeClr>
                 </a:solidFill>
               </a:defRPr>
-            </a:lvl3pPr>
-            <a:lvl4pPr marL="1371600" indent="0">
-              <a:buNone/>
-              <a:defRPr sz="1600">
+            </a:lvl4pPr>
+            <a:lvl5pPr marL="1828800" indent="0">
+              <a:buNone/>
+              <a:defRPr sz="1400">
                 <a:solidFill>
                   <a:schemeClr val="tx1">
                     <a:tint val="75000"/>
                   </a:schemeClr>
                 </a:solidFill>
               </a:defRPr>
-            </a:lvl4pPr>
-            <a:lvl5pPr marL="1828800" indent="0">
-              <a:buNone/>
-              <a:defRPr sz="1600">
+            </a:lvl5pPr>
+            <a:lvl6pPr marL="2286000" indent="0">
+              <a:buNone/>
+              <a:defRPr sz="1400">
                 <a:solidFill>
                   <a:schemeClr val="tx1">
                     <a:tint val="75000"/>
                   </a:schemeClr>
                 </a:solidFill>
               </a:defRPr>
-            </a:lvl5pPr>
-            <a:lvl6pPr marL="2286000" indent="0">
-              <a:buNone/>
-              <a:defRPr sz="1600">
+            </a:lvl6pPr>
+            <a:lvl7pPr marL="2743200" indent="0">
+              <a:buNone/>
+              <a:defRPr sz="1400">
                 <a:solidFill>
                   <a:schemeClr val="tx1">
                     <a:tint val="75000"/>
                   </a:schemeClr>
                 </a:solidFill>
               </a:defRPr>
-            </a:lvl6pPr>
-            <a:lvl7pPr marL="2743200" indent="0">
-              <a:buNone/>
-              <a:defRPr sz="1600">
+            </a:lvl7pPr>
+            <a:lvl8pPr marL="3200400" indent="0">
+              <a:buNone/>
+              <a:defRPr sz="1400">
                 <a:solidFill>
                   <a:schemeClr val="tx1">
                     <a:tint val="75000"/>
                   </a:schemeClr>
                 </a:solidFill>
               </a:defRPr>
-            </a:lvl7pPr>
-            <a:lvl8pPr marL="3200400" indent="0">
-              <a:buNone/>
-              <a:defRPr sz="1600">
+            </a:lvl8pPr>
+            <a:lvl9pPr marL="3657600" indent="0">
+              <a:buNone/>
+              <a:defRPr sz="1400">
                 <a:solidFill>
                   <a:schemeClr val="tx1">
                     <a:tint val="75000"/>
                   </a:schemeClr>
                 </a:solidFill>
               </a:defRPr>
-            </a:lvl8pPr>
-            <a:lvl9pPr marL="3657600" indent="0">
-              <a:buNone/>
-              <a:defRPr sz="1600">
-                <a:solidFill>
-                  <a:schemeClr val="tx1">
-                    <a:tint val="75000"/>
-                  </a:schemeClr>
-                </a:solidFill>
-              </a:defRPr>
             </a:lvl9pPr>
           </a:lstStyle>
           <a:p>
@@ -1116,13 +1379,7 @@
       </p:sp>
       <p:sp>
         <p:nvSpPr>
-          <p:cNvPr id="4" name="Date Placeholder 3">
-            <a:extLst>
-              <a:ext uri="{FF2B5EF4-FFF2-40B4-BE49-F238E27FC236}">
-                <a16:creationId xmlns:a16="http://schemas.microsoft.com/office/drawing/2014/main" id="{8E7C08C5-FC50-3BC8-1F5B-6312D9907126}"/>
-              </a:ext>
-            </a:extLst>
-          </p:cNvPr>
+          <p:cNvPr id="4" name="Date Placeholder 3"/>
           <p:cNvSpPr>
             <a:spLocks noGrp="1"/>
           </p:cNvSpPr>
@@ -1133,7 +1390,18 @@
         <p:spPr/>
         <p:txBody>
           <a:bodyPr/>
-          <a:lstStyle/>
+          <a:lstStyle>
+            <a:lvl1pPr>
+              <a:defRPr>
+                <a:solidFill>
+                  <a:schemeClr val="accent1">
+                    <a:lumMod val="75000"/>
+                    <a:lumOff val="25000"/>
+                  </a:schemeClr>
+                </a:solidFill>
+              </a:defRPr>
+            </a:lvl1pPr>
+          </a:lstStyle>
           <a:p>
             <a:fld id="{FB6CDBC1-C56B-4840-9889-BEFDC1B8AD8A}" type="datetimeFigureOut">
               <a:rPr lang="en-US" smtClean="0"/>
@@ -1145,13 +1413,7 @@
       </p:sp>
       <p:sp>
         <p:nvSpPr>
-          <p:cNvPr id="5" name="Footer Placeholder 4">
-            <a:extLst>
-              <a:ext uri="{FF2B5EF4-FFF2-40B4-BE49-F238E27FC236}">
-                <a16:creationId xmlns:a16="http://schemas.microsoft.com/office/drawing/2014/main" id="{634188CA-8DA3-990C-7579-53D63C97A232}"/>
-              </a:ext>
-            </a:extLst>
-          </p:cNvPr>
+          <p:cNvPr id="5" name="Footer Placeholder 4"/>
           <p:cNvSpPr>
             <a:spLocks noGrp="1"/>
           </p:cNvSpPr>
@@ -1162,7 +1424,18 @@
         <p:spPr/>
         <p:txBody>
           <a:bodyPr/>
-          <a:lstStyle/>
+          <a:lstStyle>
+            <a:lvl1pPr>
+              <a:defRPr>
+                <a:solidFill>
+                  <a:schemeClr val="accent1">
+                    <a:lumMod val="75000"/>
+                    <a:lumOff val="25000"/>
+                  </a:schemeClr>
+                </a:solidFill>
+              </a:defRPr>
+            </a:lvl1pPr>
+          </a:lstStyle>
           <a:p>
             <a:endParaRPr lang="en-US"/>
           </a:p>
@@ -1170,13 +1443,7 @@
       </p:sp>
       <p:sp>
         <p:nvSpPr>
-          <p:cNvPr id="6" name="Slide Number Placeholder 5">
-            <a:extLst>
-              <a:ext uri="{FF2B5EF4-FFF2-40B4-BE49-F238E27FC236}">
-                <a16:creationId xmlns:a16="http://schemas.microsoft.com/office/drawing/2014/main" id="{1DA6411B-719C-5623-11C6-E0D0FCEB71A0}"/>
-              </a:ext>
-            </a:extLst>
-          </p:cNvPr>
+          <p:cNvPr id="6" name="Slide Number Placeholder 5"/>
           <p:cNvSpPr>
             <a:spLocks noGrp="1"/>
           </p:cNvSpPr>
@@ -1187,7 +1454,18 @@
         <p:spPr/>
         <p:txBody>
           <a:bodyPr/>
-          <a:lstStyle/>
+          <a:lstStyle>
+            <a:lvl1pPr>
+              <a:defRPr>
+                <a:solidFill>
+                  <a:schemeClr val="accent1">
+                    <a:lumMod val="75000"/>
+                    <a:lumOff val="25000"/>
+                  </a:schemeClr>
+                </a:solidFill>
+              </a:defRPr>
+            </a:lvl1pPr>
+          </a:lstStyle>
           <a:p>
             <a:fld id="{5364A9A8-0A73-4C42-A307-CE7FA1FE9880}" type="slidenum">
               <a:rPr lang="en-US" smtClean="0"/>
@@ -1200,7 +1478,7 @@
     </p:spTree>
     <p:extLst>
       <p:ext uri="{BB962C8B-B14F-4D97-AF65-F5344CB8AC3E}">
-        <p14:creationId xmlns:p14="http://schemas.microsoft.com/office/powerpoint/2010/main" val="1455740"/>
+        <p14:creationId xmlns:p14="http://schemas.microsoft.com/office/powerpoint/2010/main" val="449660972"/>
       </p:ext>
     </p:extLst>
   </p:cSld>
@@ -1229,13 +1507,46 @@
       </p:grpSpPr>
       <p:sp>
         <p:nvSpPr>
-          <p:cNvPr id="2" name="Title 1">
-            <a:extLst>
-              <a:ext uri="{FF2B5EF4-FFF2-40B4-BE49-F238E27FC236}">
-                <a16:creationId xmlns:a16="http://schemas.microsoft.com/office/drawing/2014/main" id="{D39B213C-941A-E1F0-9842-E14FA2608109}"/>
-              </a:ext>
-            </a:extLst>
-          </p:cNvPr>
+          <p:cNvPr id="8" name="Rectangle 7"/>
+          <p:cNvSpPr>
+            <a:spLocks noChangeAspect="1"/>
+          </p:cNvSpPr>
+          <p:nvPr/>
+        </p:nvSpPr>
+        <p:spPr>
+          <a:xfrm>
+            <a:off x="445982" y="606554"/>
+            <a:ext cx="11300036" cy="1258827"/>
+          </a:xfrm>
+          <a:prstGeom prst="rect">
+            <a:avLst/>
+          </a:prstGeom>
+          <a:solidFill>
+            <a:schemeClr val="accent1"/>
+          </a:solidFill>
+          <a:ln>
+            <a:noFill/>
+          </a:ln>
+          <a:effectLst/>
+        </p:spPr>
+        <p:style>
+          <a:lnRef idx="1">
+            <a:schemeClr val="accent1"/>
+          </a:lnRef>
+          <a:fillRef idx="3">
+            <a:schemeClr val="accent1"/>
+          </a:fillRef>
+          <a:effectRef idx="2">
+            <a:schemeClr val="accent1"/>
+          </a:effectRef>
+          <a:fontRef idx="minor">
+            <a:schemeClr val="lt1"/>
+          </a:fontRef>
+        </p:style>
+      </p:sp>
+      <p:sp>
+        <p:nvSpPr>
+          <p:cNvPr id="2" name="Title 1"/>
           <p:cNvSpPr>
             <a:spLocks noGrp="1"/>
           </p:cNvSpPr>
@@ -1243,7 +1554,12 @@
             <p:ph type="title"/>
           </p:nvPr>
         </p:nvSpPr>
-        <p:spPr/>
+        <p:spPr>
+          <a:xfrm>
+            <a:off x="581193" y="729658"/>
+            <a:ext cx="11029616" cy="988332"/>
+          </a:xfrm>
+        </p:spPr>
         <p:txBody>
           <a:bodyPr/>
           <a:lstStyle/>
@@ -1252,18 +1568,13 @@
               <a:rPr lang="en-US"/>
               <a:t>Click to edit Master title style</a:t>
             </a:r>
-          </a:p>
-        </p:txBody>
-      </p:sp>
-      <p:sp>
-        <p:nvSpPr>
-          <p:cNvPr id="3" name="Content Placeholder 2">
-            <a:extLst>
-              <a:ext uri="{FF2B5EF4-FFF2-40B4-BE49-F238E27FC236}">
-                <a16:creationId xmlns:a16="http://schemas.microsoft.com/office/drawing/2014/main" id="{CFB476E7-4DEA-4271-454A-673072E6CFF7}"/>
-              </a:ext>
-            </a:extLst>
-          </p:cNvPr>
+            <a:endParaRPr lang="en-US" dirty="0"/>
+          </a:p>
+        </p:txBody>
+      </p:sp>
+      <p:sp>
+        <p:nvSpPr>
+          <p:cNvPr id="3" name="Content Placeholder 2"/>
           <p:cNvSpPr>
             <a:spLocks noGrp="1"/>
           </p:cNvSpPr>
@@ -1273,12 +1584,14 @@
         </p:nvSpPr>
         <p:spPr>
           <a:xfrm>
-            <a:off x="838200" y="1825625"/>
-            <a:ext cx="5181600" cy="4351338"/>
-          </a:xfrm>
-        </p:spPr>
-        <p:txBody>
-          <a:bodyPr/>
+            <a:off x="581193" y="2228003"/>
+            <a:ext cx="5422390" cy="3633047"/>
+          </a:xfrm>
+        </p:spPr>
+        <p:txBody>
+          <a:bodyPr>
+            <a:normAutofit/>
+          </a:bodyPr>
           <a:lstStyle/>
           <a:p>
             <a:pPr lvl="0"/>
@@ -1314,18 +1627,13 @@
               <a:rPr lang="en-US"/>
               <a:t>Fifth level</a:t>
             </a:r>
-          </a:p>
-        </p:txBody>
-      </p:sp>
-      <p:sp>
-        <p:nvSpPr>
-          <p:cNvPr id="4" name="Content Placeholder 3">
-            <a:extLst>
-              <a:ext uri="{FF2B5EF4-FFF2-40B4-BE49-F238E27FC236}">
-                <a16:creationId xmlns:a16="http://schemas.microsoft.com/office/drawing/2014/main" id="{7271955C-DEBC-3744-674D-94D0C1979AA5}"/>
-              </a:ext>
-            </a:extLst>
-          </p:cNvPr>
+            <a:endParaRPr lang="en-US" dirty="0"/>
+          </a:p>
+        </p:txBody>
+      </p:sp>
+      <p:sp>
+        <p:nvSpPr>
+          <p:cNvPr id="4" name="Content Placeholder 3"/>
           <p:cNvSpPr>
             <a:spLocks noGrp="1"/>
           </p:cNvSpPr>
@@ -1335,12 +1643,14 @@
         </p:nvSpPr>
         <p:spPr>
           <a:xfrm>
-            <a:off x="6172200" y="1825625"/>
-            <a:ext cx="5181600" cy="4351338"/>
-          </a:xfrm>
-        </p:spPr>
-        <p:txBody>
-          <a:bodyPr/>
+            <a:off x="6188417" y="2228003"/>
+            <a:ext cx="5422392" cy="3633047"/>
+          </a:xfrm>
+        </p:spPr>
+        <p:txBody>
+          <a:bodyPr>
+            <a:normAutofit/>
+          </a:bodyPr>
           <a:lstStyle/>
           <a:p>
             <a:pPr lvl="0"/>
@@ -1376,18 +1686,13 @@
               <a:rPr lang="en-US"/>
               <a:t>Fifth level</a:t>
             </a:r>
-          </a:p>
-        </p:txBody>
-      </p:sp>
-      <p:sp>
-        <p:nvSpPr>
-          <p:cNvPr id="5" name="Date Placeholder 4">
-            <a:extLst>
-              <a:ext uri="{FF2B5EF4-FFF2-40B4-BE49-F238E27FC236}">
-                <a16:creationId xmlns:a16="http://schemas.microsoft.com/office/drawing/2014/main" id="{D2D43633-3EDE-C485-75E8-0F5C21C4DE7E}"/>
-              </a:ext>
-            </a:extLst>
-          </p:cNvPr>
+            <a:endParaRPr lang="en-US" dirty="0"/>
+          </a:p>
+        </p:txBody>
+      </p:sp>
+      <p:sp>
+        <p:nvSpPr>
+          <p:cNvPr id="5" name="Date Placeholder 4"/>
           <p:cNvSpPr>
             <a:spLocks noGrp="1"/>
           </p:cNvSpPr>
@@ -1410,13 +1715,7 @@
       </p:sp>
       <p:sp>
         <p:nvSpPr>
-          <p:cNvPr id="6" name="Footer Placeholder 5">
-            <a:extLst>
-              <a:ext uri="{FF2B5EF4-FFF2-40B4-BE49-F238E27FC236}">
-                <a16:creationId xmlns:a16="http://schemas.microsoft.com/office/drawing/2014/main" id="{C3D8B04B-8413-B397-3484-C6F7EE5DD5CC}"/>
-              </a:ext>
-            </a:extLst>
-          </p:cNvPr>
+          <p:cNvPr id="6" name="Footer Placeholder 5"/>
           <p:cNvSpPr>
             <a:spLocks noGrp="1"/>
           </p:cNvSpPr>
@@ -1435,13 +1734,7 @@
       </p:sp>
       <p:sp>
         <p:nvSpPr>
-          <p:cNvPr id="7" name="Slide Number Placeholder 6">
-            <a:extLst>
-              <a:ext uri="{FF2B5EF4-FFF2-40B4-BE49-F238E27FC236}">
-                <a16:creationId xmlns:a16="http://schemas.microsoft.com/office/drawing/2014/main" id="{E2F36C0D-E261-723D-9363-7533C7C7FDEA}"/>
-              </a:ext>
-            </a:extLst>
-          </p:cNvPr>
+          <p:cNvPr id="7" name="Slide Number Placeholder 6"/>
           <p:cNvSpPr>
             <a:spLocks noGrp="1"/>
           </p:cNvSpPr>
@@ -1465,7 +1758,7 @@
     </p:spTree>
     <p:extLst>
       <p:ext uri="{BB962C8B-B14F-4D97-AF65-F5344CB8AC3E}">
-        <p14:creationId xmlns:p14="http://schemas.microsoft.com/office/powerpoint/2010/main" val="843495837"/>
+        <p14:creationId xmlns:p14="http://schemas.microsoft.com/office/powerpoint/2010/main" val="1178028186"/>
       </p:ext>
     </p:extLst>
   </p:cSld>
@@ -1494,13 +1787,46 @@
       </p:grpSpPr>
       <p:sp>
         <p:nvSpPr>
-          <p:cNvPr id="2" name="Title 1">
-            <a:extLst>
-              <a:ext uri="{FF2B5EF4-FFF2-40B4-BE49-F238E27FC236}">
-                <a16:creationId xmlns:a16="http://schemas.microsoft.com/office/drawing/2014/main" id="{67D31A19-C078-D71B-AF67-D32B751018B0}"/>
-              </a:ext>
-            </a:extLst>
-          </p:cNvPr>
+          <p:cNvPr id="11" name="Rectangle 10"/>
+          <p:cNvSpPr>
+            <a:spLocks noChangeAspect="1"/>
+          </p:cNvSpPr>
+          <p:nvPr/>
+        </p:nvSpPr>
+        <p:spPr>
+          <a:xfrm>
+            <a:off x="445982" y="606554"/>
+            <a:ext cx="11300036" cy="1258827"/>
+          </a:xfrm>
+          <a:prstGeom prst="rect">
+            <a:avLst/>
+          </a:prstGeom>
+          <a:solidFill>
+            <a:schemeClr val="accent1"/>
+          </a:solidFill>
+          <a:ln>
+            <a:noFill/>
+          </a:ln>
+          <a:effectLst/>
+        </p:spPr>
+        <p:style>
+          <a:lnRef idx="1">
+            <a:schemeClr val="accent1"/>
+          </a:lnRef>
+          <a:fillRef idx="3">
+            <a:schemeClr val="accent1"/>
+          </a:fillRef>
+          <a:effectRef idx="2">
+            <a:schemeClr val="accent1"/>
+          </a:effectRef>
+          <a:fontRef idx="minor">
+            <a:schemeClr val="lt1"/>
+          </a:fontRef>
+        </p:style>
+      </p:sp>
+      <p:sp>
+        <p:nvSpPr>
+          <p:cNvPr id="12" name="Title 1"/>
           <p:cNvSpPr>
             <a:spLocks noGrp="1"/>
           </p:cNvSpPr>
@@ -1510,8 +1836,8 @@
         </p:nvSpPr>
         <p:spPr>
           <a:xfrm>
-            <a:off x="839788" y="365125"/>
-            <a:ext cx="10515600" cy="1325563"/>
+            <a:off x="581193" y="729658"/>
+            <a:ext cx="11029616" cy="988332"/>
           </a:xfrm>
         </p:spPr>
         <p:txBody>
@@ -1522,18 +1848,13 @@
               <a:rPr lang="en-US"/>
               <a:t>Click to edit Master title style</a:t>
             </a:r>
-          </a:p>
-        </p:txBody>
-      </p:sp>
-      <p:sp>
-        <p:nvSpPr>
-          <p:cNvPr id="3" name="Text Placeholder 2">
-            <a:extLst>
-              <a:ext uri="{FF2B5EF4-FFF2-40B4-BE49-F238E27FC236}">
-                <a16:creationId xmlns:a16="http://schemas.microsoft.com/office/drawing/2014/main" id="{FF2C9378-CE6C-7E67-AEB8-AB575B04ABB7}"/>
-              </a:ext>
-            </a:extLst>
-          </p:cNvPr>
+            <a:endParaRPr lang="en-US" dirty="0"/>
+          </a:p>
+        </p:txBody>
+      </p:sp>
+      <p:sp>
+        <p:nvSpPr>
+          <p:cNvPr id="3" name="Text Placeholder 2"/>
           <p:cNvSpPr>
             <a:spLocks noGrp="1"/>
           </p:cNvSpPr>
@@ -1543,16 +1864,22 @@
         </p:nvSpPr>
         <p:spPr>
           <a:xfrm>
-            <a:off x="839788" y="1681163"/>
-            <a:ext cx="5157787" cy="823912"/>
-          </a:xfrm>
-        </p:spPr>
-        <p:txBody>
-          <a:bodyPr anchor="b"/>
+            <a:off x="887219" y="2250892"/>
+            <a:ext cx="5087075" cy="536005"/>
+          </a:xfrm>
+        </p:spPr>
+        <p:txBody>
+          <a:bodyPr anchor="b">
+            <a:noAutofit/>
+          </a:bodyPr>
           <a:lstStyle>
             <a:lvl1pPr marL="0" indent="0">
               <a:buNone/>
-              <a:defRPr sz="2400" b="1"/>
+              <a:defRPr sz="2200" b="0">
+                <a:solidFill>
+                  <a:schemeClr val="accent2"/>
+                </a:solidFill>
+              </a:defRPr>
             </a:lvl1pPr>
             <a:lvl2pPr marL="457200" indent="0">
               <a:buNone/>
@@ -1598,13 +1925,7 @@
       </p:sp>
       <p:sp>
         <p:nvSpPr>
-          <p:cNvPr id="4" name="Content Placeholder 3">
-            <a:extLst>
-              <a:ext uri="{FF2B5EF4-FFF2-40B4-BE49-F238E27FC236}">
-                <a16:creationId xmlns:a16="http://schemas.microsoft.com/office/drawing/2014/main" id="{8CEE69BF-9DE2-6160-3DC4-6F8FD5531849}"/>
-              </a:ext>
-            </a:extLst>
-          </p:cNvPr>
+          <p:cNvPr id="4" name="Content Placeholder 3"/>
           <p:cNvSpPr>
             <a:spLocks noGrp="1"/>
           </p:cNvSpPr>
@@ -1614,12 +1935,14 @@
         </p:nvSpPr>
         <p:spPr>
           <a:xfrm>
-            <a:off x="839788" y="2505075"/>
-            <a:ext cx="5157787" cy="3684588"/>
-          </a:xfrm>
-        </p:spPr>
-        <p:txBody>
-          <a:bodyPr/>
+            <a:off x="581194" y="2926052"/>
+            <a:ext cx="5393100" cy="2934999"/>
+          </a:xfrm>
+        </p:spPr>
+        <p:txBody>
+          <a:bodyPr anchor="t">
+            <a:normAutofit/>
+          </a:bodyPr>
           <a:lstStyle/>
           <a:p>
             <a:pPr lvl="0"/>
@@ -1655,18 +1978,13 @@
               <a:rPr lang="en-US"/>
               <a:t>Fifth level</a:t>
             </a:r>
-          </a:p>
-        </p:txBody>
-      </p:sp>
-      <p:sp>
-        <p:nvSpPr>
-          <p:cNvPr id="5" name="Text Placeholder 4">
-            <a:extLst>
-              <a:ext uri="{FF2B5EF4-FFF2-40B4-BE49-F238E27FC236}">
-                <a16:creationId xmlns:a16="http://schemas.microsoft.com/office/drawing/2014/main" id="{407C2F8A-9091-4B24-1E1B-36A248290213}"/>
-              </a:ext>
-            </a:extLst>
-          </p:cNvPr>
+            <a:endParaRPr lang="en-US" dirty="0"/>
+          </a:p>
+        </p:txBody>
+      </p:sp>
+      <p:sp>
+        <p:nvSpPr>
+          <p:cNvPr id="5" name="Text Placeholder 4"/>
           <p:cNvSpPr>
             <a:spLocks noGrp="1"/>
           </p:cNvSpPr>
@@ -1676,16 +1994,22 @@
         </p:nvSpPr>
         <p:spPr>
           <a:xfrm>
-            <a:off x="6172200" y="1681163"/>
-            <a:ext cx="5183188" cy="823912"/>
-          </a:xfrm>
-        </p:spPr>
-        <p:txBody>
-          <a:bodyPr anchor="b"/>
+            <a:off x="6523735" y="2250892"/>
+            <a:ext cx="5087073" cy="553373"/>
+          </a:xfrm>
+        </p:spPr>
+        <p:txBody>
+          <a:bodyPr anchor="b">
+            <a:noAutofit/>
+          </a:bodyPr>
           <a:lstStyle>
             <a:lvl1pPr marL="0" indent="0">
               <a:buNone/>
-              <a:defRPr sz="2400" b="1"/>
+              <a:defRPr sz="2200" b="0">
+                <a:solidFill>
+                  <a:schemeClr val="accent2"/>
+                </a:solidFill>
+              </a:defRPr>
             </a:lvl1pPr>
             <a:lvl2pPr marL="457200" indent="0">
               <a:buNone/>
@@ -1731,13 +2055,7 @@
       </p:sp>
       <p:sp>
         <p:nvSpPr>
-          <p:cNvPr id="6" name="Content Placeholder 5">
-            <a:extLst>
-              <a:ext uri="{FF2B5EF4-FFF2-40B4-BE49-F238E27FC236}">
-                <a16:creationId xmlns:a16="http://schemas.microsoft.com/office/drawing/2014/main" id="{5C64C857-7612-01DE-C544-5E2D762E5D84}"/>
-              </a:ext>
-            </a:extLst>
-          </p:cNvPr>
+          <p:cNvPr id="6" name="Content Placeholder 5"/>
           <p:cNvSpPr>
             <a:spLocks noGrp="1"/>
           </p:cNvSpPr>
@@ -1747,12 +2065,14 @@
         </p:nvSpPr>
         <p:spPr>
           <a:xfrm>
-            <a:off x="6172200" y="2505075"/>
-            <a:ext cx="5183188" cy="3684588"/>
-          </a:xfrm>
-        </p:spPr>
-        <p:txBody>
-          <a:bodyPr/>
+            <a:off x="6217709" y="2926052"/>
+            <a:ext cx="5393100" cy="2934999"/>
+          </a:xfrm>
+        </p:spPr>
+        <p:txBody>
+          <a:bodyPr anchor="t">
+            <a:normAutofit/>
+          </a:bodyPr>
           <a:lstStyle/>
           <a:p>
             <a:pPr lvl="0"/>
@@ -1788,18 +2108,13 @@
               <a:rPr lang="en-US"/>
               <a:t>Fifth level</a:t>
             </a:r>
-          </a:p>
-        </p:txBody>
-      </p:sp>
-      <p:sp>
-        <p:nvSpPr>
-          <p:cNvPr id="7" name="Date Placeholder 6">
-            <a:extLst>
-              <a:ext uri="{FF2B5EF4-FFF2-40B4-BE49-F238E27FC236}">
-                <a16:creationId xmlns:a16="http://schemas.microsoft.com/office/drawing/2014/main" id="{E914CDF0-EC26-2DB4-AECE-35B0BB838592}"/>
-              </a:ext>
-            </a:extLst>
-          </p:cNvPr>
+            <a:endParaRPr lang="en-US" dirty="0"/>
+          </a:p>
+        </p:txBody>
+      </p:sp>
+      <p:sp>
+        <p:nvSpPr>
+          <p:cNvPr id="7" name="Date Placeholder 6"/>
           <p:cNvSpPr>
             <a:spLocks noGrp="1"/>
           </p:cNvSpPr>
@@ -1822,13 +2137,7 @@
       </p:sp>
       <p:sp>
         <p:nvSpPr>
-          <p:cNvPr id="8" name="Footer Placeholder 7">
-            <a:extLst>
-              <a:ext uri="{FF2B5EF4-FFF2-40B4-BE49-F238E27FC236}">
-                <a16:creationId xmlns:a16="http://schemas.microsoft.com/office/drawing/2014/main" id="{8FA2AF95-457A-94E7-90C4-A357E70AFBC0}"/>
-              </a:ext>
-            </a:extLst>
-          </p:cNvPr>
+          <p:cNvPr id="8" name="Footer Placeholder 7"/>
           <p:cNvSpPr>
             <a:spLocks noGrp="1"/>
           </p:cNvSpPr>
@@ -1847,13 +2156,7 @@
       </p:sp>
       <p:sp>
         <p:nvSpPr>
-          <p:cNvPr id="9" name="Slide Number Placeholder 8">
-            <a:extLst>
-              <a:ext uri="{FF2B5EF4-FFF2-40B4-BE49-F238E27FC236}">
-                <a16:creationId xmlns:a16="http://schemas.microsoft.com/office/drawing/2014/main" id="{79D4A34D-F2B4-8A49-4151-82D7D8A7C4A4}"/>
-              </a:ext>
-            </a:extLst>
-          </p:cNvPr>
+          <p:cNvPr id="9" name="Slide Number Placeholder 8"/>
           <p:cNvSpPr>
             <a:spLocks noGrp="1"/>
           </p:cNvSpPr>
@@ -1877,7 +2180,7 @@
     </p:spTree>
     <p:extLst>
       <p:ext uri="{BB962C8B-B14F-4D97-AF65-F5344CB8AC3E}">
-        <p14:creationId xmlns:p14="http://schemas.microsoft.com/office/powerpoint/2010/main" val="4224949604"/>
+        <p14:creationId xmlns:p14="http://schemas.microsoft.com/office/powerpoint/2010/main" val="3316966833"/>
       </p:ext>
     </p:extLst>
   </p:cSld>
@@ -1906,13 +2209,46 @@
       </p:grpSpPr>
       <p:sp>
         <p:nvSpPr>
-          <p:cNvPr id="2" name="Title 1">
-            <a:extLst>
-              <a:ext uri="{FF2B5EF4-FFF2-40B4-BE49-F238E27FC236}">
-                <a16:creationId xmlns:a16="http://schemas.microsoft.com/office/drawing/2014/main" id="{C1670E6E-E39F-FE1C-1A64-ED62318BB4DF}"/>
-              </a:ext>
-            </a:extLst>
-          </p:cNvPr>
+          <p:cNvPr id="7" name="Rectangle 6"/>
+          <p:cNvSpPr>
+            <a:spLocks noChangeAspect="1"/>
+          </p:cNvSpPr>
+          <p:nvPr/>
+        </p:nvSpPr>
+        <p:spPr>
+          <a:xfrm>
+            <a:off x="440683" y="606554"/>
+            <a:ext cx="11300036" cy="1258827"/>
+          </a:xfrm>
+          <a:prstGeom prst="rect">
+            <a:avLst/>
+          </a:prstGeom>
+          <a:solidFill>
+            <a:schemeClr val="accent1"/>
+          </a:solidFill>
+          <a:ln>
+            <a:noFill/>
+          </a:ln>
+          <a:effectLst/>
+        </p:spPr>
+        <p:style>
+          <a:lnRef idx="1">
+            <a:schemeClr val="accent1"/>
+          </a:lnRef>
+          <a:fillRef idx="3">
+            <a:schemeClr val="accent1"/>
+          </a:fillRef>
+          <a:effectRef idx="2">
+            <a:schemeClr val="accent1"/>
+          </a:effectRef>
+          <a:fontRef idx="minor">
+            <a:schemeClr val="lt1"/>
+          </a:fontRef>
+        </p:style>
+      </p:sp>
+      <p:sp>
+        <p:nvSpPr>
+          <p:cNvPr id="8" name="Title 1"/>
           <p:cNvSpPr>
             <a:spLocks noGrp="1"/>
           </p:cNvSpPr>
@@ -1920,7 +2256,12 @@
             <p:ph type="title"/>
           </p:nvPr>
         </p:nvSpPr>
-        <p:spPr/>
+        <p:spPr>
+          <a:xfrm>
+            <a:off x="575894" y="729658"/>
+            <a:ext cx="11029616" cy="988332"/>
+          </a:xfrm>
+        </p:spPr>
         <p:txBody>
           <a:bodyPr/>
           <a:lstStyle/>
@@ -1929,18 +2270,13 @@
               <a:rPr lang="en-US"/>
               <a:t>Click to edit Master title style</a:t>
             </a:r>
-          </a:p>
-        </p:txBody>
-      </p:sp>
-      <p:sp>
-        <p:nvSpPr>
-          <p:cNvPr id="3" name="Date Placeholder 2">
-            <a:extLst>
-              <a:ext uri="{FF2B5EF4-FFF2-40B4-BE49-F238E27FC236}">
-                <a16:creationId xmlns:a16="http://schemas.microsoft.com/office/drawing/2014/main" id="{5D51AB24-89DD-3F1A-510A-2A08AD2987BB}"/>
-              </a:ext>
-            </a:extLst>
-          </p:cNvPr>
+            <a:endParaRPr lang="en-US" dirty="0"/>
+          </a:p>
+        </p:txBody>
+      </p:sp>
+      <p:sp>
+        <p:nvSpPr>
+          <p:cNvPr id="3" name="Date Placeholder 2"/>
           <p:cNvSpPr>
             <a:spLocks noGrp="1"/>
           </p:cNvSpPr>
@@ -1963,13 +2299,7 @@
       </p:sp>
       <p:sp>
         <p:nvSpPr>
-          <p:cNvPr id="4" name="Footer Placeholder 3">
-            <a:extLst>
-              <a:ext uri="{FF2B5EF4-FFF2-40B4-BE49-F238E27FC236}">
-                <a16:creationId xmlns:a16="http://schemas.microsoft.com/office/drawing/2014/main" id="{A8CEE08E-968A-5A0D-C4DC-1EAEF9C24BBD}"/>
-              </a:ext>
-            </a:extLst>
-          </p:cNvPr>
+          <p:cNvPr id="4" name="Footer Placeholder 3"/>
           <p:cNvSpPr>
             <a:spLocks noGrp="1"/>
           </p:cNvSpPr>
@@ -1988,13 +2318,7 @@
       </p:sp>
       <p:sp>
         <p:nvSpPr>
-          <p:cNvPr id="5" name="Slide Number Placeholder 4">
-            <a:extLst>
-              <a:ext uri="{FF2B5EF4-FFF2-40B4-BE49-F238E27FC236}">
-                <a16:creationId xmlns:a16="http://schemas.microsoft.com/office/drawing/2014/main" id="{20443FB7-AD76-D38C-15EF-C9DF6F6C2FB6}"/>
-              </a:ext>
-            </a:extLst>
-          </p:cNvPr>
+          <p:cNvPr id="5" name="Slide Number Placeholder 4"/>
           <p:cNvSpPr>
             <a:spLocks noGrp="1"/>
           </p:cNvSpPr>
@@ -2018,7 +2342,7 @@
     </p:spTree>
     <p:extLst>
       <p:ext uri="{BB962C8B-B14F-4D97-AF65-F5344CB8AC3E}">
-        <p14:creationId xmlns:p14="http://schemas.microsoft.com/office/powerpoint/2010/main" val="2611542424"/>
+        <p14:creationId xmlns:p14="http://schemas.microsoft.com/office/powerpoint/2010/main" val="4191823120"/>
       </p:ext>
     </p:extLst>
   </p:cSld>
@@ -2047,13 +2371,7 @@
       </p:grpSpPr>
       <p:sp>
         <p:nvSpPr>
-          <p:cNvPr id="2" name="Date Placeholder 1">
-            <a:extLst>
-              <a:ext uri="{FF2B5EF4-FFF2-40B4-BE49-F238E27FC236}">
-                <a16:creationId xmlns:a16="http://schemas.microsoft.com/office/drawing/2014/main" id="{9353C545-D16E-2975-8DE0-5C5ED754B0F6}"/>
-              </a:ext>
-            </a:extLst>
-          </p:cNvPr>
+          <p:cNvPr id="2" name="Date Placeholder 1"/>
           <p:cNvSpPr>
             <a:spLocks noGrp="1"/>
           </p:cNvSpPr>
@@ -2076,13 +2394,7 @@
       </p:sp>
       <p:sp>
         <p:nvSpPr>
-          <p:cNvPr id="3" name="Footer Placeholder 2">
-            <a:extLst>
-              <a:ext uri="{FF2B5EF4-FFF2-40B4-BE49-F238E27FC236}">
-                <a16:creationId xmlns:a16="http://schemas.microsoft.com/office/drawing/2014/main" id="{FB695AC3-8F46-B2F8-C22B-F2B94791537E}"/>
-              </a:ext>
-            </a:extLst>
-          </p:cNvPr>
+          <p:cNvPr id="3" name="Footer Placeholder 2"/>
           <p:cNvSpPr>
             <a:spLocks noGrp="1"/>
           </p:cNvSpPr>
@@ -2101,13 +2413,7 @@
       </p:sp>
       <p:sp>
         <p:nvSpPr>
-          <p:cNvPr id="4" name="Slide Number Placeholder 3">
-            <a:extLst>
-              <a:ext uri="{FF2B5EF4-FFF2-40B4-BE49-F238E27FC236}">
-                <a16:creationId xmlns:a16="http://schemas.microsoft.com/office/drawing/2014/main" id="{DC413BAD-FA49-55CD-E8D7-AF4F7E9E3B74}"/>
-              </a:ext>
-            </a:extLst>
-          </p:cNvPr>
+          <p:cNvPr id="4" name="Slide Number Placeholder 3"/>
           <p:cNvSpPr>
             <a:spLocks noGrp="1"/>
           </p:cNvSpPr>
@@ -2131,7 +2437,7 @@
     </p:spTree>
     <p:extLst>
       <p:ext uri="{BB962C8B-B14F-4D97-AF65-F5344CB8AC3E}">
-        <p14:creationId xmlns:p14="http://schemas.microsoft.com/office/powerpoint/2010/main" val="2297602432"/>
+        <p14:creationId xmlns:p14="http://schemas.microsoft.com/office/powerpoint/2010/main" val="2203646067"/>
       </p:ext>
     </p:extLst>
   </p:cSld>
@@ -2160,13 +2466,46 @@
       </p:grpSpPr>
       <p:sp>
         <p:nvSpPr>
-          <p:cNvPr id="2" name="Title 1">
-            <a:extLst>
-              <a:ext uri="{FF2B5EF4-FFF2-40B4-BE49-F238E27FC236}">
-                <a16:creationId xmlns:a16="http://schemas.microsoft.com/office/drawing/2014/main" id="{2867B6FB-579B-3A84-4CAF-A50AFDAC9152}"/>
-              </a:ext>
-            </a:extLst>
-          </p:cNvPr>
+          <p:cNvPr id="9" name="Rectangle 8"/>
+          <p:cNvSpPr>
+            <a:spLocks noChangeAspect="1"/>
+          </p:cNvSpPr>
+          <p:nvPr/>
+        </p:nvSpPr>
+        <p:spPr>
+          <a:xfrm>
+            <a:off x="447817" y="5141973"/>
+            <a:ext cx="11298200" cy="1274702"/>
+          </a:xfrm>
+          <a:prstGeom prst="rect">
+            <a:avLst/>
+          </a:prstGeom>
+          <a:solidFill>
+            <a:schemeClr val="accent1"/>
+          </a:solidFill>
+          <a:ln>
+            <a:noFill/>
+          </a:ln>
+          <a:effectLst/>
+        </p:spPr>
+        <p:style>
+          <a:lnRef idx="1">
+            <a:schemeClr val="accent1"/>
+          </a:lnRef>
+          <a:fillRef idx="3">
+            <a:schemeClr val="accent1"/>
+          </a:fillRef>
+          <a:effectRef idx="2">
+            <a:schemeClr val="accent1"/>
+          </a:effectRef>
+          <a:fontRef idx="minor">
+            <a:schemeClr val="lt1"/>
+          </a:fontRef>
+        </p:style>
+      </p:sp>
+      <p:sp>
+        <p:nvSpPr>
+          <p:cNvPr id="2" name="Title 1"/>
           <p:cNvSpPr>
             <a:spLocks noGrp="1"/>
           </p:cNvSpPr>
@@ -2176,206 +2515,252 @@
         </p:nvSpPr>
         <p:spPr>
           <a:xfrm>
-            <a:off x="839788" y="457200"/>
-            <a:ext cx="3932237" cy="1600200"/>
-          </a:xfrm>
-        </p:spPr>
-        <p:txBody>
-          <a:bodyPr anchor="b"/>
+            <a:off x="581192" y="5262296"/>
+            <a:ext cx="4909445" cy="689514"/>
+          </a:xfrm>
+        </p:spPr>
+        <p:txBody>
+          <a:bodyPr anchor="ctr"/>
+          <a:lstStyle>
+            <a:lvl1pPr algn="l">
+              <a:defRPr sz="2000" b="0">
+                <a:solidFill>
+                  <a:schemeClr val="accent1">
+                    <a:lumMod val="75000"/>
+                    <a:lumOff val="25000"/>
+                  </a:schemeClr>
+                </a:solidFill>
+              </a:defRPr>
+            </a:lvl1pPr>
+          </a:lstStyle>
+          <a:p>
+            <a:r>
+              <a:rPr lang="en-US"/>
+              <a:t>Click to edit Master title style</a:t>
+            </a:r>
+            <a:endParaRPr lang="en-US" dirty="0"/>
+          </a:p>
+        </p:txBody>
+      </p:sp>
+      <p:sp>
+        <p:nvSpPr>
+          <p:cNvPr id="3" name="Content Placeholder 2"/>
+          <p:cNvSpPr>
+            <a:spLocks noGrp="1"/>
+          </p:cNvSpPr>
+          <p:nvPr>
+            <p:ph idx="1"/>
+          </p:nvPr>
+        </p:nvSpPr>
+        <p:spPr>
+          <a:xfrm>
+            <a:off x="447816" y="601200"/>
+            <a:ext cx="11292840" cy="4204800"/>
+          </a:xfrm>
+        </p:spPr>
+        <p:txBody>
+          <a:bodyPr anchor="ctr">
+            <a:normAutofit/>
+          </a:bodyPr>
           <a:lstStyle>
             <a:lvl1pPr>
-              <a:defRPr sz="3200"/>
+              <a:defRPr sz="2000">
+                <a:solidFill>
+                  <a:schemeClr val="tx2"/>
+                </a:solidFill>
+              </a:defRPr>
             </a:lvl1pPr>
+            <a:lvl2pPr>
+              <a:defRPr sz="1800">
+                <a:solidFill>
+                  <a:schemeClr val="tx2"/>
+                </a:solidFill>
+              </a:defRPr>
+            </a:lvl2pPr>
+            <a:lvl3pPr>
+              <a:defRPr sz="1600">
+                <a:solidFill>
+                  <a:schemeClr val="tx2"/>
+                </a:solidFill>
+              </a:defRPr>
+            </a:lvl3pPr>
+            <a:lvl4pPr>
+              <a:defRPr sz="1400">
+                <a:solidFill>
+                  <a:schemeClr val="tx2"/>
+                </a:solidFill>
+              </a:defRPr>
+            </a:lvl4pPr>
+            <a:lvl5pPr>
+              <a:defRPr sz="1400">
+                <a:solidFill>
+                  <a:schemeClr val="tx2"/>
+                </a:solidFill>
+              </a:defRPr>
+            </a:lvl5pPr>
+            <a:lvl6pPr>
+              <a:defRPr sz="1400">
+                <a:solidFill>
+                  <a:schemeClr val="tx2"/>
+                </a:solidFill>
+              </a:defRPr>
+            </a:lvl6pPr>
+            <a:lvl7pPr>
+              <a:defRPr sz="1400">
+                <a:solidFill>
+                  <a:schemeClr val="tx2"/>
+                </a:solidFill>
+              </a:defRPr>
+            </a:lvl7pPr>
+            <a:lvl8pPr>
+              <a:defRPr sz="1400">
+                <a:solidFill>
+                  <a:schemeClr val="tx2"/>
+                </a:solidFill>
+              </a:defRPr>
+            </a:lvl8pPr>
+            <a:lvl9pPr>
+              <a:defRPr sz="1400">
+                <a:solidFill>
+                  <a:schemeClr val="tx2"/>
+                </a:solidFill>
+              </a:defRPr>
+            </a:lvl9pPr>
           </a:lstStyle>
           <a:p>
-            <a:r>
-              <a:rPr lang="en-US"/>
-              <a:t>Click to edit Master title style</a:t>
-            </a:r>
-          </a:p>
-        </p:txBody>
-      </p:sp>
-      <p:sp>
-        <p:nvSpPr>
-          <p:cNvPr id="3" name="Content Placeholder 2">
-            <a:extLst>
-              <a:ext uri="{FF2B5EF4-FFF2-40B4-BE49-F238E27FC236}">
-                <a16:creationId xmlns:a16="http://schemas.microsoft.com/office/drawing/2014/main" id="{EA481D7D-9948-6D53-515E-39A669EDC279}"/>
-              </a:ext>
-            </a:extLst>
-          </p:cNvPr>
-          <p:cNvSpPr>
-            <a:spLocks noGrp="1"/>
-          </p:cNvSpPr>
-          <p:nvPr>
-            <p:ph idx="1"/>
-          </p:nvPr>
-        </p:nvSpPr>
-        <p:spPr>
-          <a:xfrm>
-            <a:off x="5183188" y="987425"/>
-            <a:ext cx="6172200" cy="4873625"/>
-          </a:xfrm>
-        </p:spPr>
+            <a:pPr lvl="0"/>
+            <a:r>
+              <a:rPr lang="en-US"/>
+              <a:t>Click to edit Master text styles</a:t>
+            </a:r>
+          </a:p>
+          <a:p>
+            <a:pPr lvl="1"/>
+            <a:r>
+              <a:rPr lang="en-US"/>
+              <a:t>Second level</a:t>
+            </a:r>
+          </a:p>
+          <a:p>
+            <a:pPr lvl="2"/>
+            <a:r>
+              <a:rPr lang="en-US"/>
+              <a:t>Third level</a:t>
+            </a:r>
+          </a:p>
+          <a:p>
+            <a:pPr lvl="3"/>
+            <a:r>
+              <a:rPr lang="en-US"/>
+              <a:t>Fourth level</a:t>
+            </a:r>
+          </a:p>
+          <a:p>
+            <a:pPr lvl="4"/>
+            <a:r>
+              <a:rPr lang="en-US"/>
+              <a:t>Fifth level</a:t>
+            </a:r>
+            <a:endParaRPr lang="en-US" dirty="0"/>
+          </a:p>
+        </p:txBody>
+      </p:sp>
+      <p:sp>
+        <p:nvSpPr>
+          <p:cNvPr id="4" name="Text Placeholder 3"/>
+          <p:cNvSpPr>
+            <a:spLocks noGrp="1"/>
+          </p:cNvSpPr>
+          <p:nvPr>
+            <p:ph type="body" sz="half" idx="2"/>
+          </p:nvPr>
+        </p:nvSpPr>
+        <p:spPr>
+          <a:xfrm>
+            <a:off x="5740823" y="5262296"/>
+            <a:ext cx="5869987" cy="689515"/>
+          </a:xfrm>
+        </p:spPr>
+        <p:txBody>
+          <a:bodyPr anchor="ctr">
+            <a:normAutofit/>
+          </a:bodyPr>
+          <a:lstStyle>
+            <a:lvl1pPr marL="0" indent="0" algn="r">
+              <a:buNone/>
+              <a:defRPr sz="1100">
+                <a:solidFill>
+                  <a:schemeClr val="bg1"/>
+                </a:solidFill>
+              </a:defRPr>
+            </a:lvl1pPr>
+            <a:lvl2pPr marL="457200" indent="0">
+              <a:buNone/>
+              <a:defRPr sz="1100"/>
+            </a:lvl2pPr>
+            <a:lvl3pPr marL="914400" indent="0">
+              <a:buNone/>
+              <a:defRPr sz="1000"/>
+            </a:lvl3pPr>
+            <a:lvl4pPr marL="1371600" indent="0">
+              <a:buNone/>
+              <a:defRPr sz="900"/>
+            </a:lvl4pPr>
+            <a:lvl5pPr marL="1828800" indent="0">
+              <a:buNone/>
+              <a:defRPr sz="900"/>
+            </a:lvl5pPr>
+            <a:lvl6pPr marL="2286000" indent="0">
+              <a:buNone/>
+              <a:defRPr sz="900"/>
+            </a:lvl6pPr>
+            <a:lvl7pPr marL="2743200" indent="0">
+              <a:buNone/>
+              <a:defRPr sz="900"/>
+            </a:lvl7pPr>
+            <a:lvl8pPr marL="3200400" indent="0">
+              <a:buNone/>
+              <a:defRPr sz="900"/>
+            </a:lvl8pPr>
+            <a:lvl9pPr marL="3657600" indent="0">
+              <a:buNone/>
+              <a:defRPr sz="900"/>
+            </a:lvl9pPr>
+          </a:lstStyle>
+          <a:p>
+            <a:pPr lvl="0"/>
+            <a:r>
+              <a:rPr lang="en-US"/>
+              <a:t>Click to edit Master text styles</a:t>
+            </a:r>
+          </a:p>
+        </p:txBody>
+      </p:sp>
+      <p:sp>
+        <p:nvSpPr>
+          <p:cNvPr id="5" name="Date Placeholder 4"/>
+          <p:cNvSpPr>
+            <a:spLocks noGrp="1"/>
+          </p:cNvSpPr>
+          <p:nvPr>
+            <p:ph type="dt" sz="half" idx="10"/>
+          </p:nvPr>
+        </p:nvSpPr>
+        <p:spPr/>
         <p:txBody>
           <a:bodyPr/>
           <a:lstStyle>
             <a:lvl1pPr>
-              <a:defRPr sz="3200"/>
+              <a:defRPr>
+                <a:solidFill>
+                  <a:schemeClr val="accent1">
+                    <a:lumMod val="75000"/>
+                    <a:lumOff val="25000"/>
+                  </a:schemeClr>
+                </a:solidFill>
+              </a:defRPr>
             </a:lvl1pPr>
-            <a:lvl2pPr>
-              <a:defRPr sz="2800"/>
-            </a:lvl2pPr>
-            <a:lvl3pPr>
-              <a:defRPr sz="2400"/>
-            </a:lvl3pPr>
-            <a:lvl4pPr>
-              <a:defRPr sz="2000"/>
-            </a:lvl4pPr>
-            <a:lvl5pPr>
-              <a:defRPr sz="2000"/>
-            </a:lvl5pPr>
-            <a:lvl6pPr>
-              <a:defRPr sz="2000"/>
-            </a:lvl6pPr>
-            <a:lvl7pPr>
-              <a:defRPr sz="2000"/>
-            </a:lvl7pPr>
-            <a:lvl8pPr>
-              <a:defRPr sz="2000"/>
-            </a:lvl8pPr>
-            <a:lvl9pPr>
-              <a:defRPr sz="2000"/>
-            </a:lvl9pPr>
           </a:lstStyle>
-          <a:p>
-            <a:pPr lvl="0"/>
-            <a:r>
-              <a:rPr lang="en-US"/>
-              <a:t>Click to edit Master text styles</a:t>
-            </a:r>
-          </a:p>
-          <a:p>
-            <a:pPr lvl="1"/>
-            <a:r>
-              <a:rPr lang="en-US"/>
-              <a:t>Second level</a:t>
-            </a:r>
-          </a:p>
-          <a:p>
-            <a:pPr lvl="2"/>
-            <a:r>
-              <a:rPr lang="en-US"/>
-              <a:t>Third level</a:t>
-            </a:r>
-          </a:p>
-          <a:p>
-            <a:pPr lvl="3"/>
-            <a:r>
-              <a:rPr lang="en-US"/>
-              <a:t>Fourth level</a:t>
-            </a:r>
-          </a:p>
-          <a:p>
-            <a:pPr lvl="4"/>
-            <a:r>
-              <a:rPr lang="en-US"/>
-              <a:t>Fifth level</a:t>
-            </a:r>
-          </a:p>
-        </p:txBody>
-      </p:sp>
-      <p:sp>
-        <p:nvSpPr>
-          <p:cNvPr id="4" name="Text Placeholder 3">
-            <a:extLst>
-              <a:ext uri="{FF2B5EF4-FFF2-40B4-BE49-F238E27FC236}">
-                <a16:creationId xmlns:a16="http://schemas.microsoft.com/office/drawing/2014/main" id="{065977C7-00CE-8D6F-4B2A-FB7052ADFA18}"/>
-              </a:ext>
-            </a:extLst>
-          </p:cNvPr>
-          <p:cNvSpPr>
-            <a:spLocks noGrp="1"/>
-          </p:cNvSpPr>
-          <p:nvPr>
-            <p:ph type="body" sz="half" idx="2"/>
-          </p:nvPr>
-        </p:nvSpPr>
-        <p:spPr>
-          <a:xfrm>
-            <a:off x="839788" y="2057400"/>
-            <a:ext cx="3932237" cy="3811588"/>
-          </a:xfrm>
-        </p:spPr>
-        <p:txBody>
-          <a:bodyPr/>
-          <a:lstStyle>
-            <a:lvl1pPr marL="0" indent="0">
-              <a:buNone/>
-              <a:defRPr sz="1600"/>
-            </a:lvl1pPr>
-            <a:lvl2pPr marL="457200" indent="0">
-              <a:buNone/>
-              <a:defRPr sz="1400"/>
-            </a:lvl2pPr>
-            <a:lvl3pPr marL="914400" indent="0">
-              <a:buNone/>
-              <a:defRPr sz="1200"/>
-            </a:lvl3pPr>
-            <a:lvl4pPr marL="1371600" indent="0">
-              <a:buNone/>
-              <a:defRPr sz="1000"/>
-            </a:lvl4pPr>
-            <a:lvl5pPr marL="1828800" indent="0">
-              <a:buNone/>
-              <a:defRPr sz="1000"/>
-            </a:lvl5pPr>
-            <a:lvl6pPr marL="2286000" indent="0">
-              <a:buNone/>
-              <a:defRPr sz="1000"/>
-            </a:lvl6pPr>
-            <a:lvl7pPr marL="2743200" indent="0">
-              <a:buNone/>
-              <a:defRPr sz="1000"/>
-            </a:lvl7pPr>
-            <a:lvl8pPr marL="3200400" indent="0">
-              <a:buNone/>
-              <a:defRPr sz="1000"/>
-            </a:lvl8pPr>
-            <a:lvl9pPr marL="3657600" indent="0">
-              <a:buNone/>
-              <a:defRPr sz="1000"/>
-            </a:lvl9pPr>
-          </a:lstStyle>
-          <a:p>
-            <a:pPr lvl="0"/>
-            <a:r>
-              <a:rPr lang="en-US"/>
-              <a:t>Click to edit Master text styles</a:t>
-            </a:r>
-          </a:p>
-        </p:txBody>
-      </p:sp>
-      <p:sp>
-        <p:nvSpPr>
-          <p:cNvPr id="5" name="Date Placeholder 4">
-            <a:extLst>
-              <a:ext uri="{FF2B5EF4-FFF2-40B4-BE49-F238E27FC236}">
-                <a16:creationId xmlns:a16="http://schemas.microsoft.com/office/drawing/2014/main" id="{E0378C3D-C5AC-B232-BFDB-C49D68092A79}"/>
-              </a:ext>
-            </a:extLst>
-          </p:cNvPr>
-          <p:cNvSpPr>
-            <a:spLocks noGrp="1"/>
-          </p:cNvSpPr>
-          <p:nvPr>
-            <p:ph type="dt" sz="half" idx="10"/>
-          </p:nvPr>
-        </p:nvSpPr>
-        <p:spPr/>
-        <p:txBody>
-          <a:bodyPr/>
-          <a:lstStyle/>
           <a:p>
             <a:fld id="{FB6CDBC1-C56B-4840-9889-BEFDC1B8AD8A}" type="datetimeFigureOut">
               <a:rPr lang="en-US" smtClean="0"/>
@@ -2387,13 +2772,7 @@
       </p:sp>
       <p:sp>
         <p:nvSpPr>
-          <p:cNvPr id="6" name="Footer Placeholder 5">
-            <a:extLst>
-              <a:ext uri="{FF2B5EF4-FFF2-40B4-BE49-F238E27FC236}">
-                <a16:creationId xmlns:a16="http://schemas.microsoft.com/office/drawing/2014/main" id="{59F69AE0-E1B6-C132-232A-6EA69865B626}"/>
-              </a:ext>
-            </a:extLst>
-          </p:cNvPr>
+          <p:cNvPr id="6" name="Footer Placeholder 5"/>
           <p:cNvSpPr>
             <a:spLocks noGrp="1"/>
           </p:cNvSpPr>
@@ -2404,7 +2783,18 @@
         <p:spPr/>
         <p:txBody>
           <a:bodyPr/>
-          <a:lstStyle/>
+          <a:lstStyle>
+            <a:lvl1pPr>
+              <a:defRPr>
+                <a:solidFill>
+                  <a:schemeClr val="accent1">
+                    <a:lumMod val="75000"/>
+                    <a:lumOff val="25000"/>
+                  </a:schemeClr>
+                </a:solidFill>
+              </a:defRPr>
+            </a:lvl1pPr>
+          </a:lstStyle>
           <a:p>
             <a:endParaRPr lang="en-US"/>
           </a:p>
@@ -2412,13 +2802,7 @@
       </p:sp>
       <p:sp>
         <p:nvSpPr>
-          <p:cNvPr id="7" name="Slide Number Placeholder 6">
-            <a:extLst>
-              <a:ext uri="{FF2B5EF4-FFF2-40B4-BE49-F238E27FC236}">
-                <a16:creationId xmlns:a16="http://schemas.microsoft.com/office/drawing/2014/main" id="{D96D4B43-0828-685B-CFF4-20E5E545BF97}"/>
-              </a:ext>
-            </a:extLst>
-          </p:cNvPr>
+          <p:cNvPr id="7" name="Slide Number Placeholder 6"/>
           <p:cNvSpPr>
             <a:spLocks noGrp="1"/>
           </p:cNvSpPr>
@@ -2429,7 +2813,18 @@
         <p:spPr/>
         <p:txBody>
           <a:bodyPr/>
-          <a:lstStyle/>
+          <a:lstStyle>
+            <a:lvl1pPr>
+              <a:defRPr>
+                <a:solidFill>
+                  <a:schemeClr val="accent1">
+                    <a:lumMod val="75000"/>
+                    <a:lumOff val="25000"/>
+                  </a:schemeClr>
+                </a:solidFill>
+              </a:defRPr>
+            </a:lvl1pPr>
+          </a:lstStyle>
           <a:p>
             <a:fld id="{5364A9A8-0A73-4C42-A307-CE7FA1FE9880}" type="slidenum">
               <a:rPr lang="en-US" smtClean="0"/>
@@ -2442,7 +2837,7 @@
     </p:spTree>
     <p:extLst>
       <p:ext uri="{BB962C8B-B14F-4D97-AF65-F5344CB8AC3E}">
-        <p14:creationId xmlns:p14="http://schemas.microsoft.com/office/powerpoint/2010/main" val="4037871201"/>
+        <p14:creationId xmlns:p14="http://schemas.microsoft.com/office/powerpoint/2010/main" val="2071360588"/>
       </p:ext>
     </p:extLst>
   </p:cSld>
@@ -2471,13 +2866,7 @@
       </p:grpSpPr>
       <p:sp>
         <p:nvSpPr>
-          <p:cNvPr id="2" name="Title 1">
-            <a:extLst>
-              <a:ext uri="{FF2B5EF4-FFF2-40B4-BE49-F238E27FC236}">
-                <a16:creationId xmlns:a16="http://schemas.microsoft.com/office/drawing/2014/main" id="{AF1901E6-0427-C693-DD52-F5A336C799DD}"/>
-              </a:ext>
-            </a:extLst>
-          </p:cNvPr>
+          <p:cNvPr id="2" name="Title 1"/>
           <p:cNvSpPr>
             <a:spLocks noGrp="1"/>
           </p:cNvSpPr>
@@ -2487,15 +2876,21 @@
         </p:nvSpPr>
         <p:spPr>
           <a:xfrm>
-            <a:off x="839788" y="457200"/>
-            <a:ext cx="3932237" cy="1600200"/>
-          </a:xfrm>
-        </p:spPr>
-        <p:txBody>
-          <a:bodyPr anchor="b"/>
+            <a:off x="581193" y="4693389"/>
+            <a:ext cx="11029616" cy="566738"/>
+          </a:xfrm>
+        </p:spPr>
+        <p:txBody>
+          <a:bodyPr anchor="b">
+            <a:normAutofit/>
+          </a:bodyPr>
           <a:lstStyle>
-            <a:lvl1pPr>
-              <a:defRPr sz="3200"/>
+            <a:lvl1pPr algn="l">
+              <a:defRPr sz="2400" b="0">
+                <a:solidFill>
+                  <a:schemeClr val="accent1"/>
+                </a:solidFill>
+              </a:defRPr>
             </a:lvl1pPr>
           </a:lstStyle>
           <a:p>
@@ -2503,20 +2898,15 @@
               <a:rPr lang="en-US"/>
               <a:t>Click to edit Master title style</a:t>
             </a:r>
-          </a:p>
-        </p:txBody>
-      </p:sp>
-      <p:sp>
-        <p:nvSpPr>
-          <p:cNvPr id="3" name="Picture Placeholder 2">
-            <a:extLst>
-              <a:ext uri="{FF2B5EF4-FFF2-40B4-BE49-F238E27FC236}">
-                <a16:creationId xmlns:a16="http://schemas.microsoft.com/office/drawing/2014/main" id="{7D5AE7D1-45FC-A597-A667-F5E10870E21B}"/>
-              </a:ext>
-            </a:extLst>
-          </p:cNvPr>
-          <p:cNvSpPr>
-            <a:spLocks noGrp="1"/>
+            <a:endParaRPr lang="en-US" dirty="0"/>
+          </a:p>
+        </p:txBody>
+      </p:sp>
+      <p:sp>
+        <p:nvSpPr>
+          <p:cNvPr id="3" name="Picture Placeholder 2"/>
+          <p:cNvSpPr>
+            <a:spLocks noGrp="1" noChangeAspect="1"/>
           </p:cNvSpPr>
           <p:nvPr>
             <p:ph type="pic" idx="1"/>
@@ -2524,118 +2914,120 @@
         </p:nvSpPr>
         <p:spPr>
           <a:xfrm>
-            <a:off x="5183188" y="987425"/>
-            <a:ext cx="6172200" cy="4873625"/>
-          </a:xfrm>
-        </p:spPr>
-        <p:txBody>
-          <a:bodyPr/>
+            <a:off x="447817" y="599725"/>
+            <a:ext cx="11290859" cy="3557252"/>
+          </a:xfrm>
+        </p:spPr>
+        <p:txBody>
+          <a:bodyPr anchor="t">
+            <a:normAutofit/>
+          </a:bodyPr>
           <a:lstStyle>
-            <a:lvl1pPr marL="0" indent="0">
-              <a:buNone/>
-              <a:defRPr sz="3200"/>
-            </a:lvl1pPr>
-            <a:lvl2pPr marL="457200" indent="0">
-              <a:buNone/>
-              <a:defRPr sz="2800"/>
-            </a:lvl2pPr>
-            <a:lvl3pPr marL="914400" indent="0">
-              <a:buNone/>
-              <a:defRPr sz="2400"/>
-            </a:lvl3pPr>
-            <a:lvl4pPr marL="1371600" indent="0">
-              <a:buNone/>
-              <a:defRPr sz="2000"/>
-            </a:lvl4pPr>
-            <a:lvl5pPr marL="1828800" indent="0">
-              <a:buNone/>
-              <a:defRPr sz="2000"/>
-            </a:lvl5pPr>
-            <a:lvl6pPr marL="2286000" indent="0">
-              <a:buNone/>
-              <a:defRPr sz="2000"/>
-            </a:lvl6pPr>
-            <a:lvl7pPr marL="2743200" indent="0">
-              <a:buNone/>
-              <a:defRPr sz="2000"/>
-            </a:lvl7pPr>
-            <a:lvl8pPr marL="3200400" indent="0">
-              <a:buNone/>
-              <a:defRPr sz="2000"/>
-            </a:lvl8pPr>
-            <a:lvl9pPr marL="3657600" indent="0">
-              <a:buNone/>
-              <a:defRPr sz="2000"/>
-            </a:lvl9pPr>
-          </a:lstStyle>
-          <a:p>
-            <a:endParaRPr lang="en-US"/>
-          </a:p>
-        </p:txBody>
-      </p:sp>
-      <p:sp>
-        <p:nvSpPr>
-          <p:cNvPr id="4" name="Text Placeholder 3">
-            <a:extLst>
-              <a:ext uri="{FF2B5EF4-FFF2-40B4-BE49-F238E27FC236}">
-                <a16:creationId xmlns:a16="http://schemas.microsoft.com/office/drawing/2014/main" id="{995A52FE-4ED9-ABF2-604E-6DA9CAE13DB7}"/>
-              </a:ext>
-            </a:extLst>
-          </p:cNvPr>
-          <p:cNvSpPr>
-            <a:spLocks noGrp="1"/>
-          </p:cNvSpPr>
-          <p:nvPr>
-            <p:ph type="body" sz="half" idx="2"/>
-          </p:nvPr>
-        </p:nvSpPr>
-        <p:spPr>
-          <a:xfrm>
-            <a:off x="839788" y="2057400"/>
-            <a:ext cx="3932237" cy="3811588"/>
-          </a:xfrm>
-        </p:spPr>
-        <p:txBody>
-          <a:bodyPr/>
-          <a:lstStyle>
-            <a:lvl1pPr marL="0" indent="0">
+            <a:lvl1pPr marL="0" indent="0" algn="ctr">
               <a:buNone/>
               <a:defRPr sz="1600"/>
             </a:lvl1pPr>
             <a:lvl2pPr marL="457200" indent="0">
               <a:buNone/>
-              <a:defRPr sz="1400"/>
+              <a:defRPr sz="1600"/>
             </a:lvl2pPr>
             <a:lvl3pPr marL="914400" indent="0">
               <a:buNone/>
-              <a:defRPr sz="1200"/>
+              <a:defRPr sz="1600"/>
             </a:lvl3pPr>
             <a:lvl4pPr marL="1371600" indent="0">
               <a:buNone/>
-              <a:defRPr sz="1000"/>
+              <a:defRPr sz="1600"/>
             </a:lvl4pPr>
             <a:lvl5pPr marL="1828800" indent="0">
               <a:buNone/>
-              <a:defRPr sz="1000"/>
+              <a:defRPr sz="1600"/>
             </a:lvl5pPr>
             <a:lvl6pPr marL="2286000" indent="0">
               <a:buNone/>
-              <a:defRPr sz="1000"/>
+              <a:defRPr sz="1600"/>
             </a:lvl6pPr>
             <a:lvl7pPr marL="2743200" indent="0">
               <a:buNone/>
-              <a:defRPr sz="1000"/>
+              <a:defRPr sz="1600"/>
             </a:lvl7pPr>
             <a:lvl8pPr marL="3200400" indent="0">
               <a:buNone/>
-              <a:defRPr sz="1000"/>
+              <a:defRPr sz="1600"/>
             </a:lvl8pPr>
             <a:lvl9pPr marL="3657600" indent="0">
               <a:buNone/>
-              <a:defRPr sz="1000"/>
+              <a:defRPr sz="1600"/>
             </a:lvl9pPr>
           </a:lstStyle>
           <a:p>
+            <a:r>
+              <a:rPr lang="en-US"/>
+              <a:t>Click icon to add picture</a:t>
+            </a:r>
+            <a:endParaRPr lang="en-US" dirty="0"/>
+          </a:p>
+        </p:txBody>
+      </p:sp>
+      <p:sp>
+        <p:nvSpPr>
+          <p:cNvPr id="4" name="Text Placeholder 3"/>
+          <p:cNvSpPr>
+            <a:spLocks noGrp="1"/>
+          </p:cNvSpPr>
+          <p:nvPr>
+            <p:ph type="body" sz="half" idx="2"/>
+          </p:nvPr>
+        </p:nvSpPr>
+        <p:spPr>
+          <a:xfrm>
+            <a:off x="581192" y="5260127"/>
+            <a:ext cx="11029617" cy="598671"/>
+          </a:xfrm>
+        </p:spPr>
+        <p:txBody>
+          <a:bodyPr>
+            <a:normAutofit/>
+          </a:bodyPr>
+          <a:lstStyle>
+            <a:lvl1pPr marL="0" indent="0">
+              <a:buNone/>
+              <a:defRPr sz="1200"/>
+            </a:lvl1pPr>
+            <a:lvl2pPr marL="457200" indent="0">
+              <a:buNone/>
+              <a:defRPr sz="1200"/>
+            </a:lvl2pPr>
+            <a:lvl3pPr marL="914400" indent="0">
+              <a:buNone/>
+              <a:defRPr sz="1000"/>
+            </a:lvl3pPr>
+            <a:lvl4pPr marL="1371600" indent="0">
+              <a:buNone/>
+              <a:defRPr sz="900"/>
+            </a:lvl4pPr>
+            <a:lvl5pPr marL="1828800" indent="0">
+              <a:buNone/>
+              <a:defRPr sz="900"/>
+            </a:lvl5pPr>
+            <a:lvl6pPr marL="2286000" indent="0">
+              <a:buNone/>
+              <a:defRPr sz="900"/>
+            </a:lvl6pPr>
+            <a:lvl7pPr marL="2743200" indent="0">
+              <a:buNone/>
+              <a:defRPr sz="900"/>
+            </a:lvl7pPr>
+            <a:lvl8pPr marL="3200400" indent="0">
+              <a:buNone/>
+              <a:defRPr sz="900"/>
+            </a:lvl8pPr>
+            <a:lvl9pPr marL="3657600" indent="0">
+              <a:buNone/>
+              <a:defRPr sz="900"/>
+            </a:lvl9pPr>
+          </a:lstStyle>
+          <a:p>
             <a:pPr lvl="0"/>
             <a:r>
               <a:rPr lang="en-US"/>
@@ -2646,13 +3038,7 @@
       </p:sp>
       <p:sp>
         <p:nvSpPr>
-          <p:cNvPr id="5" name="Date Placeholder 4">
-            <a:extLst>
-              <a:ext uri="{FF2B5EF4-FFF2-40B4-BE49-F238E27FC236}">
-                <a16:creationId xmlns:a16="http://schemas.microsoft.com/office/drawing/2014/main" id="{DF2F1221-1990-D535-05B7-60E49866B1E1}"/>
-              </a:ext>
-            </a:extLst>
-          </p:cNvPr>
+          <p:cNvPr id="5" name="Date Placeholder 4"/>
           <p:cNvSpPr>
             <a:spLocks noGrp="1"/>
           </p:cNvSpPr>
@@ -2675,13 +3061,7 @@
       </p:sp>
       <p:sp>
         <p:nvSpPr>
-          <p:cNvPr id="6" name="Footer Placeholder 5">
-            <a:extLst>
-              <a:ext uri="{FF2B5EF4-FFF2-40B4-BE49-F238E27FC236}">
-                <a16:creationId xmlns:a16="http://schemas.microsoft.com/office/drawing/2014/main" id="{BAD52E59-286F-8FDB-3E0E-7D6EBE33CEE7}"/>
-              </a:ext>
-            </a:extLst>
-          </p:cNvPr>
+          <p:cNvPr id="6" name="Footer Placeholder 5"/>
           <p:cNvSpPr>
             <a:spLocks noGrp="1"/>
           </p:cNvSpPr>
@@ -2700,13 +3080,7 @@
       </p:sp>
       <p:sp>
         <p:nvSpPr>
-          <p:cNvPr id="7" name="Slide Number Placeholder 6">
-            <a:extLst>
-              <a:ext uri="{FF2B5EF4-FFF2-40B4-BE49-F238E27FC236}">
-                <a16:creationId xmlns:a16="http://schemas.microsoft.com/office/drawing/2014/main" id="{9641C67E-48B9-33F3-B17F-C910D00A1452}"/>
-              </a:ext>
-            </a:extLst>
-          </p:cNvPr>
+          <p:cNvPr id="7" name="Slide Number Placeholder 6"/>
           <p:cNvSpPr>
             <a:spLocks noGrp="1"/>
           </p:cNvSpPr>
@@ -2730,7 +3104,7 @@
     </p:spTree>
     <p:extLst>
       <p:ext uri="{BB962C8B-B14F-4D97-AF65-F5344CB8AC3E}">
-        <p14:creationId xmlns:p14="http://schemas.microsoft.com/office/powerpoint/2010/main" val="2444969047"/>
+        <p14:creationId xmlns:p14="http://schemas.microsoft.com/office/powerpoint/2010/main" val="1948564105"/>
       </p:ext>
     </p:extLst>
   </p:cSld>
@@ -2764,13 +3138,7 @@
       </p:grpSpPr>
       <p:sp>
         <p:nvSpPr>
-          <p:cNvPr id="2" name="Title Placeholder 1">
-            <a:extLst>
-              <a:ext uri="{FF2B5EF4-FFF2-40B4-BE49-F238E27FC236}">
-                <a16:creationId xmlns:a16="http://schemas.microsoft.com/office/drawing/2014/main" id="{10FADDD9-5745-A2FA-7B04-DFDCCCCA6A06}"/>
-              </a:ext>
-            </a:extLst>
-          </p:cNvPr>
+          <p:cNvPr id="2" name="Title Placeholder 1"/>
           <p:cNvSpPr>
             <a:spLocks noGrp="1"/>
           </p:cNvSpPr>
@@ -2780,8 +3148,41 @@
         </p:nvSpPr>
         <p:spPr>
           <a:xfrm>
-            <a:off x="838200" y="365125"/>
-            <a:ext cx="10515600" cy="1325563"/>
+            <a:off x="581192" y="705124"/>
+            <a:ext cx="11029616" cy="1189554"/>
+          </a:xfrm>
+          <a:prstGeom prst="rect">
+            <a:avLst/>
+          </a:prstGeom>
+        </p:spPr>
+        <p:txBody>
+          <a:bodyPr vert="horz" lIns="91440" tIns="45720" rIns="91440" bIns="45720" rtlCol="0" anchor="b">
+            <a:normAutofit/>
+          </a:bodyPr>
+          <a:lstStyle/>
+          <a:p>
+            <a:r>
+              <a:rPr lang="en-US"/>
+              <a:t>Click to edit Master title style</a:t>
+            </a:r>
+            <a:endParaRPr lang="en-US" dirty="0"/>
+          </a:p>
+        </p:txBody>
+      </p:sp>
+      <p:sp>
+        <p:nvSpPr>
+          <p:cNvPr id="3" name="Text Placeholder 2"/>
+          <p:cNvSpPr>
+            <a:spLocks noGrp="1"/>
+          </p:cNvSpPr>
+          <p:nvPr>
+            <p:ph type="body" idx="1"/>
+          </p:nvPr>
+        </p:nvSpPr>
+        <p:spPr>
+          <a:xfrm>
+            <a:off x="581192" y="2336003"/>
+            <a:ext cx="11029616" cy="3522794"/>
           </a:xfrm>
           <a:prstGeom prst="rect">
             <a:avLst/>
@@ -2793,114 +3194,69 @@
           </a:bodyPr>
           <a:lstStyle/>
           <a:p>
-            <a:r>
-              <a:rPr lang="en-US"/>
-              <a:t>Click to edit Master title style</a:t>
-            </a:r>
-          </a:p>
-        </p:txBody>
-      </p:sp>
-      <p:sp>
-        <p:nvSpPr>
-          <p:cNvPr id="3" name="Text Placeholder 2">
-            <a:extLst>
-              <a:ext uri="{FF2B5EF4-FFF2-40B4-BE49-F238E27FC236}">
-                <a16:creationId xmlns:a16="http://schemas.microsoft.com/office/drawing/2014/main" id="{C6733531-FDF3-D4B8-9550-3631F0A32AA4}"/>
-              </a:ext>
-            </a:extLst>
-          </p:cNvPr>
-          <p:cNvSpPr>
-            <a:spLocks noGrp="1"/>
-          </p:cNvSpPr>
-          <p:nvPr>
-            <p:ph type="body" idx="1"/>
-          </p:nvPr>
-        </p:nvSpPr>
-        <p:spPr>
-          <a:xfrm>
-            <a:off x="838200" y="1825625"/>
-            <a:ext cx="10515600" cy="4351338"/>
+            <a:pPr lvl="0"/>
+            <a:r>
+              <a:rPr lang="en-US"/>
+              <a:t>Click to edit Master text styles</a:t>
+            </a:r>
+          </a:p>
+          <a:p>
+            <a:pPr lvl="1"/>
+            <a:r>
+              <a:rPr lang="en-US"/>
+              <a:t>Second level</a:t>
+            </a:r>
+          </a:p>
+          <a:p>
+            <a:pPr lvl="2"/>
+            <a:r>
+              <a:rPr lang="en-US"/>
+              <a:t>Third level</a:t>
+            </a:r>
+          </a:p>
+          <a:p>
+            <a:pPr lvl="3"/>
+            <a:r>
+              <a:rPr lang="en-US"/>
+              <a:t>Fourth level</a:t>
+            </a:r>
+          </a:p>
+          <a:p>
+            <a:pPr lvl="4"/>
+            <a:r>
+              <a:rPr lang="en-US"/>
+              <a:t>Fifth level</a:t>
+            </a:r>
+            <a:endParaRPr lang="en-US" dirty="0"/>
+          </a:p>
+        </p:txBody>
+      </p:sp>
+      <p:sp>
+        <p:nvSpPr>
+          <p:cNvPr id="4" name="Date Placeholder 3"/>
+          <p:cNvSpPr>
+            <a:spLocks noGrp="1"/>
+          </p:cNvSpPr>
+          <p:nvPr>
+            <p:ph type="dt" sz="half" idx="2"/>
+          </p:nvPr>
+        </p:nvSpPr>
+        <p:spPr>
+          <a:xfrm>
+            <a:off x="7605951" y="5956137"/>
+            <a:ext cx="2844799" cy="365125"/>
           </a:xfrm>
           <a:prstGeom prst="rect">
             <a:avLst/>
           </a:prstGeom>
         </p:spPr>
         <p:txBody>
-          <a:bodyPr vert="horz" lIns="91440" tIns="45720" rIns="91440" bIns="45720" rtlCol="0">
-            <a:normAutofit/>
-          </a:bodyPr>
-          <a:lstStyle/>
-          <a:p>
-            <a:pPr lvl="0"/>
-            <a:r>
-              <a:rPr lang="en-US"/>
-              <a:t>Click to edit Master text styles</a:t>
-            </a:r>
-          </a:p>
-          <a:p>
-            <a:pPr lvl="1"/>
-            <a:r>
-              <a:rPr lang="en-US"/>
-              <a:t>Second level</a:t>
-            </a:r>
-          </a:p>
-          <a:p>
-            <a:pPr lvl="2"/>
-            <a:r>
-              <a:rPr lang="en-US"/>
-              <a:t>Third level</a:t>
-            </a:r>
-          </a:p>
-          <a:p>
-            <a:pPr lvl="3"/>
-            <a:r>
-              <a:rPr lang="en-US"/>
-              <a:t>Fourth level</a:t>
-            </a:r>
-          </a:p>
-          <a:p>
-            <a:pPr lvl="4"/>
-            <a:r>
-              <a:rPr lang="en-US"/>
-              <a:t>Fifth level</a:t>
-            </a:r>
-          </a:p>
-        </p:txBody>
-      </p:sp>
-      <p:sp>
-        <p:nvSpPr>
-          <p:cNvPr id="4" name="Date Placeholder 3">
-            <a:extLst>
-              <a:ext uri="{FF2B5EF4-FFF2-40B4-BE49-F238E27FC236}">
-                <a16:creationId xmlns:a16="http://schemas.microsoft.com/office/drawing/2014/main" id="{CA821330-EC9D-E23B-9085-5AFE3B6BD76B}"/>
-              </a:ext>
-            </a:extLst>
-          </p:cNvPr>
-          <p:cNvSpPr>
-            <a:spLocks noGrp="1"/>
-          </p:cNvSpPr>
-          <p:nvPr>
-            <p:ph type="dt" sz="half" idx="2"/>
-          </p:nvPr>
-        </p:nvSpPr>
-        <p:spPr>
-          <a:xfrm>
-            <a:off x="838200" y="6356350"/>
-            <a:ext cx="2743200" cy="365125"/>
-          </a:xfrm>
-          <a:prstGeom prst="rect">
-            <a:avLst/>
-          </a:prstGeom>
-        </p:spPr>
-        <p:txBody>
           <a:bodyPr vert="horz" lIns="91440" tIns="45720" rIns="91440" bIns="45720" rtlCol="0" anchor="ctr"/>
           <a:lstStyle>
-            <a:lvl1pPr algn="l">
-              <a:defRPr sz="1200">
-                <a:solidFill>
-                  <a:schemeClr val="tx1">
-                    <a:tint val="75000"/>
-                  </a:schemeClr>
+            <a:lvl1pPr algn="r">
+              <a:defRPr sz="900">
+                <a:solidFill>
+                  <a:schemeClr val="accent2"/>
                 </a:solidFill>
               </a:defRPr>
             </a:lvl1pPr>
@@ -2916,13 +3272,7 @@
       </p:sp>
       <p:sp>
         <p:nvSpPr>
-          <p:cNvPr id="5" name="Footer Placeholder 4">
-            <a:extLst>
-              <a:ext uri="{FF2B5EF4-FFF2-40B4-BE49-F238E27FC236}">
-                <a16:creationId xmlns:a16="http://schemas.microsoft.com/office/drawing/2014/main" id="{E9EEA3CF-4B19-E381-EBD6-037B1C6FF0BF}"/>
-              </a:ext>
-            </a:extLst>
-          </p:cNvPr>
+          <p:cNvPr id="5" name="Footer Placeholder 4"/>
           <p:cNvSpPr>
             <a:spLocks noGrp="1"/>
           </p:cNvSpPr>
@@ -2932,8 +3282,8 @@
         </p:nvSpPr>
         <p:spPr>
           <a:xfrm>
-            <a:off x="4038600" y="6356350"/>
-            <a:ext cx="4114800" cy="365125"/>
+            <a:off x="581192" y="5951811"/>
+            <a:ext cx="6917210" cy="365125"/>
           </a:xfrm>
           <a:prstGeom prst="rect">
             <a:avLst/>
@@ -2942,12 +3292,10 @@
         <p:txBody>
           <a:bodyPr vert="horz" lIns="91440" tIns="45720" rIns="91440" bIns="45720" rtlCol="0" anchor="ctr"/>
           <a:lstStyle>
-            <a:lvl1pPr algn="ctr">
-              <a:defRPr sz="1200">
-                <a:solidFill>
-                  <a:schemeClr val="tx1">
-                    <a:tint val="75000"/>
-                  </a:schemeClr>
+            <a:lvl1pPr algn="l">
+              <a:defRPr sz="900" cap="all">
+                <a:solidFill>
+                  <a:schemeClr val="accent2"/>
                 </a:solidFill>
               </a:defRPr>
             </a:lvl1pPr>
@@ -2959,13 +3307,7 @@
       </p:sp>
       <p:sp>
         <p:nvSpPr>
-          <p:cNvPr id="6" name="Slide Number Placeholder 5">
-            <a:extLst>
-              <a:ext uri="{FF2B5EF4-FFF2-40B4-BE49-F238E27FC236}">
-                <a16:creationId xmlns:a16="http://schemas.microsoft.com/office/drawing/2014/main" id="{0CBE9D48-D7BD-7D3D-971D-9582B9D6730A}"/>
-              </a:ext>
-            </a:extLst>
-          </p:cNvPr>
+          <p:cNvPr id="6" name="Slide Number Placeholder 5"/>
           <p:cNvSpPr>
             <a:spLocks noGrp="1"/>
           </p:cNvSpPr>
@@ -2975,8 +3317,8 @@
         </p:nvSpPr>
         <p:spPr>
           <a:xfrm>
-            <a:off x="8610600" y="6356350"/>
-            <a:ext cx="2743200" cy="365125"/>
+            <a:off x="10558300" y="5956137"/>
+            <a:ext cx="1052510" cy="365125"/>
           </a:xfrm>
           <a:prstGeom prst="rect">
             <a:avLst/>
@@ -2986,11 +3328,9 @@
           <a:bodyPr vert="horz" lIns="91440" tIns="45720" rIns="91440" bIns="45720" rtlCol="0" anchor="ctr"/>
           <a:lstStyle>
             <a:lvl1pPr algn="r">
-              <a:defRPr sz="1200">
-                <a:solidFill>
-                  <a:schemeClr val="tx1">
-                    <a:tint val="75000"/>
-                  </a:schemeClr>
+              <a:defRPr sz="900">
+                <a:solidFill>
+                  <a:schemeClr val="accent2"/>
                 </a:solidFill>
               </a:defRPr>
             </a:lvl1pPr>
@@ -3004,204 +3344,404 @@
           </a:p>
         </p:txBody>
       </p:sp>
+      <p:sp>
+        <p:nvSpPr>
+          <p:cNvPr id="9" name="Rectangle 8"/>
+          <p:cNvSpPr/>
+          <p:nvPr/>
+        </p:nvSpPr>
+        <p:spPr>
+          <a:xfrm>
+            <a:off x="446534" y="457200"/>
+            <a:ext cx="3703320" cy="94997"/>
+          </a:xfrm>
+          <a:prstGeom prst="rect">
+            <a:avLst/>
+          </a:prstGeom>
+          <a:solidFill>
+            <a:schemeClr val="accent1"/>
+          </a:solidFill>
+          <a:ln>
+            <a:noFill/>
+          </a:ln>
+          <a:effectLst/>
+        </p:spPr>
+        <p:style>
+          <a:lnRef idx="1">
+            <a:schemeClr val="accent1"/>
+          </a:lnRef>
+          <a:fillRef idx="3">
+            <a:schemeClr val="accent1"/>
+          </a:fillRef>
+          <a:effectRef idx="2">
+            <a:schemeClr val="accent1"/>
+          </a:effectRef>
+          <a:fontRef idx="minor">
+            <a:schemeClr val="lt1"/>
+          </a:fontRef>
+        </p:style>
+      </p:sp>
+      <p:sp>
+        <p:nvSpPr>
+          <p:cNvPr id="10" name="Rectangle 9"/>
+          <p:cNvSpPr/>
+          <p:nvPr/>
+        </p:nvSpPr>
+        <p:spPr>
+          <a:xfrm>
+            <a:off x="8042147" y="453643"/>
+            <a:ext cx="3703320" cy="98554"/>
+          </a:xfrm>
+          <a:prstGeom prst="rect">
+            <a:avLst/>
+          </a:prstGeom>
+          <a:solidFill>
+            <a:schemeClr val="accent4"/>
+          </a:solidFill>
+          <a:ln>
+            <a:noFill/>
+          </a:ln>
+          <a:effectLst/>
+        </p:spPr>
+        <p:style>
+          <a:lnRef idx="1">
+            <a:schemeClr val="accent1"/>
+          </a:lnRef>
+          <a:fillRef idx="3">
+            <a:schemeClr val="accent1"/>
+          </a:fillRef>
+          <a:effectRef idx="2">
+            <a:schemeClr val="accent1"/>
+          </a:effectRef>
+          <a:fontRef idx="minor">
+            <a:schemeClr val="lt1"/>
+          </a:fontRef>
+        </p:style>
+      </p:sp>
+      <p:sp>
+        <p:nvSpPr>
+          <p:cNvPr id="11" name="Rectangle 10"/>
+          <p:cNvSpPr/>
+          <p:nvPr/>
+        </p:nvSpPr>
+        <p:spPr>
+          <a:xfrm>
+            <a:off x="4241830" y="457200"/>
+            <a:ext cx="3703320" cy="91440"/>
+          </a:xfrm>
+          <a:prstGeom prst="rect">
+            <a:avLst/>
+          </a:prstGeom>
+          <a:solidFill>
+            <a:schemeClr val="accent2"/>
+          </a:solidFill>
+          <a:ln>
+            <a:noFill/>
+          </a:ln>
+          <a:effectLst/>
+        </p:spPr>
+        <p:style>
+          <a:lnRef idx="1">
+            <a:schemeClr val="accent1"/>
+          </a:lnRef>
+          <a:fillRef idx="3">
+            <a:schemeClr val="accent1"/>
+          </a:fillRef>
+          <a:effectRef idx="2">
+            <a:schemeClr val="accent1"/>
+          </a:effectRef>
+          <a:fontRef idx="minor">
+            <a:schemeClr val="lt1"/>
+          </a:fontRef>
+        </p:style>
+      </p:sp>
     </p:spTree>
     <p:extLst>
       <p:ext uri="{BB962C8B-B14F-4D97-AF65-F5344CB8AC3E}">
-        <p14:creationId xmlns:p14="http://schemas.microsoft.com/office/powerpoint/2010/main" val="493899765"/>
+        <p14:creationId xmlns:p14="http://schemas.microsoft.com/office/powerpoint/2010/main" val="983908920"/>
       </p:ext>
     </p:extLst>
   </p:cSld>
   <p:clrMap bg1="lt1" tx1="dk1" bg2="lt2" tx2="dk2" accent1="accent1" accent2="accent2" accent3="accent3" accent4="accent4" accent5="accent5" accent6="accent6" hlink="hlink" folHlink="folHlink"/>
   <p:sldLayoutIdLst>
-    <p:sldLayoutId id="2147483649" r:id="rId1"/>
-    <p:sldLayoutId id="2147483650" r:id="rId2"/>
-    <p:sldLayoutId id="2147483651" r:id="rId3"/>
-    <p:sldLayoutId id="2147483652" r:id="rId4"/>
-    <p:sldLayoutId id="2147483653" r:id="rId5"/>
-    <p:sldLayoutId id="2147483654" r:id="rId6"/>
-    <p:sldLayoutId id="2147483655" r:id="rId7"/>
-    <p:sldLayoutId id="2147483656" r:id="rId8"/>
-    <p:sldLayoutId id="2147483657" r:id="rId9"/>
-    <p:sldLayoutId id="2147483658" r:id="rId10"/>
-    <p:sldLayoutId id="2147483659" r:id="rId11"/>
+    <p:sldLayoutId id="2147483817" r:id="rId1"/>
+    <p:sldLayoutId id="2147483818" r:id="rId2"/>
+    <p:sldLayoutId id="2147483819" r:id="rId3"/>
+    <p:sldLayoutId id="2147483820" r:id="rId4"/>
+    <p:sldLayoutId id="2147483821" r:id="rId5"/>
+    <p:sldLayoutId id="2147483822" r:id="rId6"/>
+    <p:sldLayoutId id="2147483823" r:id="rId7"/>
+    <p:sldLayoutId id="2147483824" r:id="rId8"/>
+    <p:sldLayoutId id="2147483825" r:id="rId9"/>
+    <p:sldLayoutId id="2147483826" r:id="rId10"/>
+    <p:sldLayoutId id="2147483827" r:id="rId11"/>
   </p:sldLayoutIdLst>
   <p:txStyles>
     <p:titleStyle>
-      <a:lvl1pPr algn="l" defTabSz="914400" rtl="0" eaLnBrk="1" latinLnBrk="0" hangingPunct="1">
-        <a:lnSpc>
-          <a:spcPct val="90000"/>
-        </a:lnSpc>
+      <a:lvl1pPr algn="l" defTabSz="457200" rtl="0" eaLnBrk="1" latinLnBrk="0" hangingPunct="1">
         <a:spcBef>
           <a:spcPct val="0"/>
         </a:spcBef>
         <a:buNone/>
-        <a:defRPr sz="4400" kern="1200">
+        <a:defRPr sz="2800" b="0" kern="1200" cap="all">
           <a:solidFill>
-            <a:schemeClr val="tx1"/>
+            <a:schemeClr val="bg1"/>
           </a:solidFill>
           <a:latin typeface="+mj-lt"/>
           <a:ea typeface="+mj-ea"/>
           <a:cs typeface="+mj-cs"/>
         </a:defRPr>
       </a:lvl1pPr>
+      <a:lvl2pPr eaLnBrk="1" hangingPunct="1">
+        <a:defRPr>
+          <a:solidFill>
+            <a:schemeClr val="tx2"/>
+          </a:solidFill>
+        </a:defRPr>
+      </a:lvl2pPr>
+      <a:lvl3pPr eaLnBrk="1" hangingPunct="1">
+        <a:defRPr>
+          <a:solidFill>
+            <a:schemeClr val="tx2"/>
+          </a:solidFill>
+        </a:defRPr>
+      </a:lvl3pPr>
+      <a:lvl4pPr eaLnBrk="1" hangingPunct="1">
+        <a:defRPr>
+          <a:solidFill>
+            <a:schemeClr val="tx2"/>
+          </a:solidFill>
+        </a:defRPr>
+      </a:lvl4pPr>
+      <a:lvl5pPr eaLnBrk="1" hangingPunct="1">
+        <a:defRPr>
+          <a:solidFill>
+            <a:schemeClr val="tx2"/>
+          </a:solidFill>
+        </a:defRPr>
+      </a:lvl5pPr>
+      <a:lvl6pPr eaLnBrk="1" hangingPunct="1">
+        <a:defRPr>
+          <a:solidFill>
+            <a:schemeClr val="tx2"/>
+          </a:solidFill>
+        </a:defRPr>
+      </a:lvl6pPr>
+      <a:lvl7pPr eaLnBrk="1" hangingPunct="1">
+        <a:defRPr>
+          <a:solidFill>
+            <a:schemeClr val="tx2"/>
+          </a:solidFill>
+        </a:defRPr>
+      </a:lvl7pPr>
+      <a:lvl8pPr eaLnBrk="1" hangingPunct="1">
+        <a:defRPr>
+          <a:solidFill>
+            <a:schemeClr val="tx2"/>
+          </a:solidFill>
+        </a:defRPr>
+      </a:lvl8pPr>
+      <a:lvl9pPr eaLnBrk="1" hangingPunct="1">
+        <a:defRPr>
+          <a:solidFill>
+            <a:schemeClr val="tx2"/>
+          </a:solidFill>
+        </a:defRPr>
+      </a:lvl9pPr>
     </p:titleStyle>
     <p:bodyStyle>
-      <a:lvl1pPr marL="228600" indent="-228600" algn="l" defTabSz="914400" rtl="0" eaLnBrk="1" latinLnBrk="0" hangingPunct="1">
-        <a:lnSpc>
-          <a:spcPct val="90000"/>
-        </a:lnSpc>
+      <a:lvl1pPr marL="306000" indent="-306000" algn="l" defTabSz="457200" rtl="0" eaLnBrk="1" latinLnBrk="0" hangingPunct="1">
         <a:spcBef>
-          <a:spcPts val="1000"/>
+          <a:spcPct val="20000"/>
         </a:spcBef>
-        <a:buFont typeface="Arial" panose="020B0604020202020204" pitchFamily="34" charset="0"/>
-        <a:buChar char="•"/>
-        <a:defRPr sz="2800" kern="1200">
+        <a:spcAft>
+          <a:spcPts val="600"/>
+        </a:spcAft>
+        <a:buClr>
+          <a:schemeClr val="accent2"/>
+        </a:buClr>
+        <a:buSzPct val="92000"/>
+        <a:buFont typeface="Wingdings 2" panose="05020102010507070707" pitchFamily="18" charset="2"/>
+        <a:buChar char=""/>
+        <a:defRPr sz="1800" kern="1200">
           <a:solidFill>
-            <a:schemeClr val="tx1"/>
+            <a:schemeClr val="tx2"/>
           </a:solidFill>
           <a:latin typeface="+mn-lt"/>
           <a:ea typeface="+mn-ea"/>
           <a:cs typeface="+mn-cs"/>
         </a:defRPr>
       </a:lvl1pPr>
-      <a:lvl2pPr marL="685800" indent="-228600" algn="l" defTabSz="914400" rtl="0" eaLnBrk="1" latinLnBrk="0" hangingPunct="1">
-        <a:lnSpc>
-          <a:spcPct val="90000"/>
-        </a:lnSpc>
+      <a:lvl2pPr marL="630000" indent="-306000" algn="l" defTabSz="457200" rtl="0" eaLnBrk="1" latinLnBrk="0" hangingPunct="1">
         <a:spcBef>
-          <a:spcPts val="500"/>
+          <a:spcPct val="20000"/>
         </a:spcBef>
-        <a:buFont typeface="Arial" panose="020B0604020202020204" pitchFamily="34" charset="0"/>
-        <a:buChar char="•"/>
-        <a:defRPr sz="2400" kern="1200">
+        <a:spcAft>
+          <a:spcPts val="600"/>
+        </a:spcAft>
+        <a:buClr>
+          <a:schemeClr val="accent2"/>
+        </a:buClr>
+        <a:buSzPct val="92000"/>
+        <a:buFont typeface="Wingdings 2" panose="05020102010507070707" pitchFamily="18" charset="2"/>
+        <a:buChar char=""/>
+        <a:defRPr sz="1600" kern="1200">
           <a:solidFill>
-            <a:schemeClr val="tx1"/>
+            <a:schemeClr val="tx2"/>
           </a:solidFill>
           <a:latin typeface="+mn-lt"/>
           <a:ea typeface="+mn-ea"/>
           <a:cs typeface="+mn-cs"/>
         </a:defRPr>
       </a:lvl2pPr>
-      <a:lvl3pPr marL="1143000" indent="-228600" algn="l" defTabSz="914400" rtl="0" eaLnBrk="1" latinLnBrk="0" hangingPunct="1">
-        <a:lnSpc>
-          <a:spcPct val="90000"/>
-        </a:lnSpc>
+      <a:lvl3pPr marL="900000" indent="-270000" algn="l" defTabSz="457200" rtl="0" eaLnBrk="1" latinLnBrk="0" hangingPunct="1">
         <a:spcBef>
-          <a:spcPts val="500"/>
+          <a:spcPct val="20000"/>
         </a:spcBef>
-        <a:buFont typeface="Arial" panose="020B0604020202020204" pitchFamily="34" charset="0"/>
-        <a:buChar char="•"/>
-        <a:defRPr sz="2000" kern="1200">
+        <a:spcAft>
+          <a:spcPts val="600"/>
+        </a:spcAft>
+        <a:buClr>
+          <a:schemeClr val="accent2"/>
+        </a:buClr>
+        <a:buSzPct val="92000"/>
+        <a:buFont typeface="Wingdings 2" panose="05020102010507070707" pitchFamily="18" charset="2"/>
+        <a:buChar char=""/>
+        <a:defRPr sz="1400" kern="1200">
           <a:solidFill>
-            <a:schemeClr val="tx1"/>
+            <a:schemeClr val="tx2"/>
           </a:solidFill>
           <a:latin typeface="+mn-lt"/>
           <a:ea typeface="+mn-ea"/>
           <a:cs typeface="+mn-cs"/>
         </a:defRPr>
       </a:lvl3pPr>
-      <a:lvl4pPr marL="1600200" indent="-228600" algn="l" defTabSz="914400" rtl="0" eaLnBrk="1" latinLnBrk="0" hangingPunct="1">
-        <a:lnSpc>
-          <a:spcPct val="90000"/>
-        </a:lnSpc>
+      <a:lvl4pPr marL="1242000" indent="-234000" algn="l" defTabSz="457200" rtl="0" eaLnBrk="1" latinLnBrk="0" hangingPunct="1">
         <a:spcBef>
-          <a:spcPts val="500"/>
+          <a:spcPct val="20000"/>
         </a:spcBef>
-        <a:buFont typeface="Arial" panose="020B0604020202020204" pitchFamily="34" charset="0"/>
-        <a:buChar char="•"/>
-        <a:defRPr sz="1800" kern="1200">
+        <a:spcAft>
+          <a:spcPts val="600"/>
+        </a:spcAft>
+        <a:buClr>
+          <a:schemeClr val="accent2"/>
+        </a:buClr>
+        <a:buSzPct val="92000"/>
+        <a:buFont typeface="Wingdings 2" panose="05020102010507070707" pitchFamily="18" charset="2"/>
+        <a:buChar char=""/>
+        <a:defRPr sz="1200" kern="1200">
           <a:solidFill>
-            <a:schemeClr val="tx1"/>
+            <a:schemeClr val="tx2"/>
           </a:solidFill>
           <a:latin typeface="+mn-lt"/>
           <a:ea typeface="+mn-ea"/>
           <a:cs typeface="+mn-cs"/>
         </a:defRPr>
       </a:lvl4pPr>
-      <a:lvl5pPr marL="2057400" indent="-228600" algn="l" defTabSz="914400" rtl="0" eaLnBrk="1" latinLnBrk="0" hangingPunct="1">
-        <a:lnSpc>
-          <a:spcPct val="90000"/>
-        </a:lnSpc>
+      <a:lvl5pPr marL="1602000" indent="-234000" algn="l" defTabSz="457200" rtl="0" eaLnBrk="1" latinLnBrk="0" hangingPunct="1">
         <a:spcBef>
-          <a:spcPts val="500"/>
+          <a:spcPct val="20000"/>
         </a:spcBef>
-        <a:buFont typeface="Arial" panose="020B0604020202020204" pitchFamily="34" charset="0"/>
-        <a:buChar char="•"/>
-        <a:defRPr sz="1800" kern="1200">
+        <a:spcAft>
+          <a:spcPts val="600"/>
+        </a:spcAft>
+        <a:buClr>
+          <a:schemeClr val="accent2"/>
+        </a:buClr>
+        <a:buSzPct val="92000"/>
+        <a:buFont typeface="Wingdings 2" panose="05020102010507070707" pitchFamily="18" charset="2"/>
+        <a:buChar char=""/>
+        <a:defRPr sz="1200" kern="1200">
           <a:solidFill>
-            <a:schemeClr val="tx1"/>
+            <a:schemeClr val="tx2"/>
           </a:solidFill>
           <a:latin typeface="+mn-lt"/>
           <a:ea typeface="+mn-ea"/>
           <a:cs typeface="+mn-cs"/>
         </a:defRPr>
       </a:lvl5pPr>
-      <a:lvl6pPr marL="2514600" indent="-228600" algn="l" defTabSz="914400" rtl="0" eaLnBrk="1" latinLnBrk="0" hangingPunct="1">
-        <a:lnSpc>
-          <a:spcPct val="90000"/>
-        </a:lnSpc>
+      <a:lvl6pPr marL="1900000" indent="-228600" algn="l" defTabSz="457200" rtl="0" eaLnBrk="1" latinLnBrk="0" hangingPunct="1">
         <a:spcBef>
-          <a:spcPts val="500"/>
+          <a:spcPct val="20000"/>
         </a:spcBef>
-        <a:buFont typeface="Arial" panose="020B0604020202020204" pitchFamily="34" charset="0"/>
-        <a:buChar char="•"/>
-        <a:defRPr sz="1800" kern="1200">
+        <a:spcAft>
+          <a:spcPts val="600"/>
+        </a:spcAft>
+        <a:buClr>
+          <a:schemeClr val="accent2"/>
+        </a:buClr>
+        <a:buSzPct val="92000"/>
+        <a:buFont typeface="Wingdings 2" panose="05020102010507070707" pitchFamily="18" charset="2"/>
+        <a:buChar char=""/>
+        <a:defRPr sz="1200" kern="1200">
           <a:solidFill>
-            <a:schemeClr val="tx1"/>
+            <a:schemeClr val="tx2"/>
           </a:solidFill>
           <a:latin typeface="+mn-lt"/>
           <a:ea typeface="+mn-ea"/>
           <a:cs typeface="+mn-cs"/>
         </a:defRPr>
       </a:lvl6pPr>
-      <a:lvl7pPr marL="2971800" indent="-228600" algn="l" defTabSz="914400" rtl="0" eaLnBrk="1" latinLnBrk="0" hangingPunct="1">
-        <a:lnSpc>
-          <a:spcPct val="90000"/>
-        </a:lnSpc>
+      <a:lvl7pPr marL="2200000" indent="-228600" algn="l" defTabSz="457200" rtl="0" eaLnBrk="1" latinLnBrk="0" hangingPunct="1">
         <a:spcBef>
-          <a:spcPts val="500"/>
+          <a:spcPct val="20000"/>
         </a:spcBef>
-        <a:buFont typeface="Arial" panose="020B0604020202020204" pitchFamily="34" charset="0"/>
-        <a:buChar char="•"/>
-        <a:defRPr sz="1800" kern="1200">
+        <a:spcAft>
+          <a:spcPts val="600"/>
+        </a:spcAft>
+        <a:buClr>
+          <a:schemeClr val="accent2"/>
+        </a:buClr>
+        <a:buSzPct val="92000"/>
+        <a:buFont typeface="Wingdings 2" panose="05020102010507070707" pitchFamily="18" charset="2"/>
+        <a:buChar char=""/>
+        <a:defRPr sz="1200" kern="1200">
           <a:solidFill>
-            <a:schemeClr val="tx1"/>
+            <a:schemeClr val="tx2"/>
           </a:solidFill>
           <a:latin typeface="+mn-lt"/>
           <a:ea typeface="+mn-ea"/>
           <a:cs typeface="+mn-cs"/>
         </a:defRPr>
       </a:lvl7pPr>
-      <a:lvl8pPr marL="3429000" indent="-228600" algn="l" defTabSz="914400" rtl="0" eaLnBrk="1" latinLnBrk="0" hangingPunct="1">
-        <a:lnSpc>
-          <a:spcPct val="90000"/>
-        </a:lnSpc>
+      <a:lvl8pPr marL="2500000" indent="-228600" algn="l" defTabSz="457200" rtl="0" eaLnBrk="1" latinLnBrk="0" hangingPunct="1">
         <a:spcBef>
-          <a:spcPts val="500"/>
+          <a:spcPct val="20000"/>
         </a:spcBef>
-        <a:buFont typeface="Arial" panose="020B0604020202020204" pitchFamily="34" charset="0"/>
-        <a:buChar char="•"/>
-        <a:defRPr sz="1800" kern="1200">
+        <a:spcAft>
+          <a:spcPts val="600"/>
+        </a:spcAft>
+        <a:buClr>
+          <a:schemeClr val="accent2"/>
+        </a:buClr>
+        <a:buSzPct val="92000"/>
+        <a:buFont typeface="Wingdings 2" panose="05020102010507070707" pitchFamily="18" charset="2"/>
+        <a:buChar char=""/>
+        <a:defRPr sz="1200" kern="1200">
           <a:solidFill>
-            <a:schemeClr val="tx1"/>
+            <a:schemeClr val="tx2"/>
           </a:solidFill>
           <a:latin typeface="+mn-lt"/>
           <a:ea typeface="+mn-ea"/>
           <a:cs typeface="+mn-cs"/>
         </a:defRPr>
       </a:lvl8pPr>
-      <a:lvl9pPr marL="3886200" indent="-228600" algn="l" defTabSz="914400" rtl="0" eaLnBrk="1" latinLnBrk="0" hangingPunct="1">
-        <a:lnSpc>
-          <a:spcPct val="90000"/>
-        </a:lnSpc>
+      <a:lvl9pPr marL="2800000" indent="-228600" algn="l" defTabSz="457200" rtl="0" eaLnBrk="1" latinLnBrk="0" hangingPunct="1">
         <a:spcBef>
-          <a:spcPts val="500"/>
+          <a:spcPct val="20000"/>
         </a:spcBef>
-        <a:buFont typeface="Arial" panose="020B0604020202020204" pitchFamily="34" charset="0"/>
-        <a:buChar char="•"/>
-        <a:defRPr sz="1800" kern="1200">
+        <a:spcAft>
+          <a:spcPts val="600"/>
+        </a:spcAft>
+        <a:buClr>
+          <a:schemeClr val="accent2"/>
+        </a:buClr>
+        <a:buSzPct val="92000"/>
+        <a:buFont typeface="Wingdings 2" panose="05020102010507070707" pitchFamily="18" charset="2"/>
+        <a:buChar char=""/>
+        <a:defRPr sz="1200" kern="1200">
           <a:solidFill>
-            <a:schemeClr val="tx1"/>
+            <a:schemeClr val="tx2"/>
           </a:solidFill>
           <a:latin typeface="+mn-lt"/>
           <a:ea typeface="+mn-ea"/>
@@ -3213,7 +3753,7 @@
       <a:defPPr>
         <a:defRPr lang="en-US"/>
       </a:defPPr>
-      <a:lvl1pPr marL="0" algn="l" defTabSz="914400" rtl="0" eaLnBrk="1" latinLnBrk="0" hangingPunct="1">
+      <a:lvl1pPr marL="0" algn="l" defTabSz="457200" rtl="0" eaLnBrk="1" latinLnBrk="0" hangingPunct="1">
         <a:defRPr sz="1800" kern="1200">
           <a:solidFill>
             <a:schemeClr val="tx1"/>
@@ -3223,7 +3763,7 @@
           <a:cs typeface="+mn-cs"/>
         </a:defRPr>
       </a:lvl1pPr>
-      <a:lvl2pPr marL="457200" algn="l" defTabSz="914400" rtl="0" eaLnBrk="1" latinLnBrk="0" hangingPunct="1">
+      <a:lvl2pPr marL="457200" algn="l" defTabSz="457200" rtl="0" eaLnBrk="1" latinLnBrk="0" hangingPunct="1">
         <a:defRPr sz="1800" kern="1200">
           <a:solidFill>
             <a:schemeClr val="tx1"/>
@@ -3233,7 +3773,7 @@
           <a:cs typeface="+mn-cs"/>
         </a:defRPr>
       </a:lvl2pPr>
-      <a:lvl3pPr marL="914400" algn="l" defTabSz="914400" rtl="0" eaLnBrk="1" latinLnBrk="0" hangingPunct="1">
+      <a:lvl3pPr marL="914400" algn="l" defTabSz="457200" rtl="0" eaLnBrk="1" latinLnBrk="0" hangingPunct="1">
         <a:defRPr sz="1800" kern="1200">
           <a:solidFill>
             <a:schemeClr val="tx1"/>
@@ -3243,7 +3783,7 @@
           <a:cs typeface="+mn-cs"/>
         </a:defRPr>
       </a:lvl3pPr>
-      <a:lvl4pPr marL="1371600" algn="l" defTabSz="914400" rtl="0" eaLnBrk="1" latinLnBrk="0" hangingPunct="1">
+      <a:lvl4pPr marL="1371600" algn="l" defTabSz="457200" rtl="0" eaLnBrk="1" latinLnBrk="0" hangingPunct="1">
         <a:defRPr sz="1800" kern="1200">
           <a:solidFill>
             <a:schemeClr val="tx1"/>
@@ -3253,7 +3793,7 @@
           <a:cs typeface="+mn-cs"/>
         </a:defRPr>
       </a:lvl4pPr>
-      <a:lvl5pPr marL="1828800" algn="l" defTabSz="914400" rtl="0" eaLnBrk="1" latinLnBrk="0" hangingPunct="1">
+      <a:lvl5pPr marL="1828800" algn="l" defTabSz="457200" rtl="0" eaLnBrk="1" latinLnBrk="0" hangingPunct="1">
         <a:defRPr sz="1800" kern="1200">
           <a:solidFill>
             <a:schemeClr val="tx1"/>
@@ -3263,7 +3803,7 @@
           <a:cs typeface="+mn-cs"/>
         </a:defRPr>
       </a:lvl5pPr>
-      <a:lvl6pPr marL="2286000" algn="l" defTabSz="914400" rtl="0" eaLnBrk="1" latinLnBrk="0" hangingPunct="1">
+      <a:lvl6pPr marL="2286000" algn="l" defTabSz="457200" rtl="0" eaLnBrk="1" latinLnBrk="0" hangingPunct="1">
         <a:defRPr sz="1800" kern="1200">
           <a:solidFill>
             <a:schemeClr val="tx1"/>
@@ -3273,7 +3813,7 @@
           <a:cs typeface="+mn-cs"/>
         </a:defRPr>
       </a:lvl6pPr>
-      <a:lvl7pPr marL="2743200" algn="l" defTabSz="914400" rtl="0" eaLnBrk="1" latinLnBrk="0" hangingPunct="1">
+      <a:lvl7pPr marL="2743200" algn="l" defTabSz="457200" rtl="0" eaLnBrk="1" latinLnBrk="0" hangingPunct="1">
         <a:defRPr sz="1800" kern="1200">
           <a:solidFill>
             <a:schemeClr val="tx1"/>
@@ -3283,7 +3823,7 @@
           <a:cs typeface="+mn-cs"/>
         </a:defRPr>
       </a:lvl7pPr>
-      <a:lvl8pPr marL="3200400" algn="l" defTabSz="914400" rtl="0" eaLnBrk="1" latinLnBrk="0" hangingPunct="1">
+      <a:lvl8pPr marL="3200400" algn="l" defTabSz="457200" rtl="0" eaLnBrk="1" latinLnBrk="0" hangingPunct="1">
         <a:defRPr sz="1800" kern="1200">
           <a:solidFill>
             <a:schemeClr val="tx1"/>
@@ -3293,7 +3833,7 @@
           <a:cs typeface="+mn-cs"/>
         </a:defRPr>
       </a:lvl8pPr>
-      <a:lvl9pPr marL="3657600" algn="l" defTabSz="914400" rtl="0" eaLnBrk="1" latinLnBrk="0" hangingPunct="1">
+      <a:lvl9pPr marL="3657600" algn="l" defTabSz="457200" rtl="0" eaLnBrk="1" latinLnBrk="0" hangingPunct="1">
         <a:defRPr sz="1800" kern="1200">
           <a:solidFill>
             <a:schemeClr val="tx1"/>
@@ -3374,7 +3914,7 @@
           <a:bodyPr/>
           <a:lstStyle/>
           <a:p>
-            <a:endParaRPr lang="en-US"/>
+            <a:endParaRPr lang="en-US" dirty="0"/>
           </a:p>
         </p:txBody>
       </p:sp>
@@ -3426,7 +3966,9 @@
         </p:nvSpPr>
         <p:spPr/>
         <p:txBody>
-          <a:bodyPr/>
+          <a:bodyPr>
+            <a:normAutofit/>
+          </a:bodyPr>
           <a:lstStyle/>
           <a:p>
             <a:r>
@@ -3462,7 +4004,7 @@
         </p:nvSpPr>
         <p:spPr/>
         <p:txBody>
-          <a:bodyPr/>
+          <a:bodyPr anchor="t"/>
           <a:lstStyle/>
           <a:p>
             <a:r>
@@ -3558,45 +4100,14 @@
         </p:nvSpPr>
         <p:spPr/>
         <p:txBody>
-          <a:bodyPr/>
+          <a:bodyPr>
+            <a:normAutofit/>
+          </a:bodyPr>
           <a:lstStyle/>
           <a:p>
             <a:r>
               <a:rPr lang="en-US" dirty="0"/>
               <a:t>Attitude PID control (Simulink Plant Response)</a:t>
-            </a:r>
-          </a:p>
-        </p:txBody>
-      </p:sp>
-      <p:sp>
-        <p:nvSpPr>
-          <p:cNvPr id="3" name="Content Placeholder 2">
-            <a:extLst>
-              <a:ext uri="{FF2B5EF4-FFF2-40B4-BE49-F238E27FC236}">
-                <a16:creationId xmlns:a16="http://schemas.microsoft.com/office/drawing/2014/main" id="{D522E4AE-5C78-1A9E-1C06-26FECA85039E}"/>
-              </a:ext>
-            </a:extLst>
-          </p:cNvPr>
-          <p:cNvSpPr>
-            <a:spLocks noGrp="1"/>
-          </p:cNvSpPr>
-          <p:nvPr>
-            <p:ph idx="1"/>
-          </p:nvPr>
-        </p:nvSpPr>
-        <p:spPr>
-          <a:xfrm>
-            <a:off x="838200" y="1825625"/>
-            <a:ext cx="5257800" cy="4351338"/>
-          </a:xfrm>
-        </p:spPr>
-        <p:txBody>
-          <a:bodyPr/>
-          <a:lstStyle/>
-          <a:p>
-            <a:r>
-              <a:rPr lang="en-US" dirty="0"/>
-              <a:t>Roll/Pitch</a:t>
             </a:r>
           </a:p>
         </p:txBody>
@@ -3920,6 +4431,205 @@
           </a:prstGeom>
         </p:spPr>
       </p:pic>
+      <p:sp>
+        <p:nvSpPr>
+          <p:cNvPr id="7" name="Content Placeholder 2">
+            <a:extLst>
+              <a:ext uri="{FF2B5EF4-FFF2-40B4-BE49-F238E27FC236}">
+                <a16:creationId xmlns:a16="http://schemas.microsoft.com/office/drawing/2014/main" id="{16E62B7A-76FF-9B43-62A7-1D512D028A8E}"/>
+              </a:ext>
+            </a:extLst>
+          </p:cNvPr>
+          <p:cNvSpPr txBox="1">
+            <a:spLocks/>
+          </p:cNvSpPr>
+          <p:nvPr/>
+        </p:nvSpPr>
+        <p:spPr>
+          <a:xfrm>
+            <a:off x="581193" y="1825625"/>
+            <a:ext cx="5257800" cy="4351338"/>
+          </a:xfrm>
+          <a:prstGeom prst="rect">
+            <a:avLst/>
+          </a:prstGeom>
+        </p:spPr>
+        <p:txBody>
+          <a:bodyPr vert="horz" lIns="91440" tIns="45720" rIns="91440" bIns="45720" rtlCol="0">
+            <a:normAutofit/>
+          </a:bodyPr>
+          <a:lstStyle>
+            <a:lvl1pPr marL="228600" indent="-228600" algn="l" defTabSz="914400" rtl="0" eaLnBrk="1" latinLnBrk="0" hangingPunct="1">
+              <a:lnSpc>
+                <a:spcPct val="90000"/>
+              </a:lnSpc>
+              <a:spcBef>
+                <a:spcPts val="1000"/>
+              </a:spcBef>
+              <a:buFont typeface="Arial" panose="020B0604020202020204" pitchFamily="34" charset="0"/>
+              <a:buChar char="•"/>
+              <a:defRPr sz="2800" kern="1200">
+                <a:solidFill>
+                  <a:schemeClr val="tx1"/>
+                </a:solidFill>
+                <a:latin typeface="+mn-lt"/>
+                <a:ea typeface="+mn-ea"/>
+                <a:cs typeface="+mn-cs"/>
+              </a:defRPr>
+            </a:lvl1pPr>
+            <a:lvl2pPr marL="685800" indent="-228600" algn="l" defTabSz="914400" rtl="0" eaLnBrk="1" latinLnBrk="0" hangingPunct="1">
+              <a:lnSpc>
+                <a:spcPct val="90000"/>
+              </a:lnSpc>
+              <a:spcBef>
+                <a:spcPts val="500"/>
+              </a:spcBef>
+              <a:buFont typeface="Arial" panose="020B0604020202020204" pitchFamily="34" charset="0"/>
+              <a:buChar char="•"/>
+              <a:defRPr sz="2400" kern="1200">
+                <a:solidFill>
+                  <a:schemeClr val="tx1"/>
+                </a:solidFill>
+                <a:latin typeface="+mn-lt"/>
+                <a:ea typeface="+mn-ea"/>
+                <a:cs typeface="+mn-cs"/>
+              </a:defRPr>
+            </a:lvl2pPr>
+            <a:lvl3pPr marL="1143000" indent="-228600" algn="l" defTabSz="914400" rtl="0" eaLnBrk="1" latinLnBrk="0" hangingPunct="1">
+              <a:lnSpc>
+                <a:spcPct val="90000"/>
+              </a:lnSpc>
+              <a:spcBef>
+                <a:spcPts val="500"/>
+              </a:spcBef>
+              <a:buFont typeface="Arial" panose="020B0604020202020204" pitchFamily="34" charset="0"/>
+              <a:buChar char="•"/>
+              <a:defRPr sz="2000" kern="1200">
+                <a:solidFill>
+                  <a:schemeClr val="tx1"/>
+                </a:solidFill>
+                <a:latin typeface="+mn-lt"/>
+                <a:ea typeface="+mn-ea"/>
+                <a:cs typeface="+mn-cs"/>
+              </a:defRPr>
+            </a:lvl3pPr>
+            <a:lvl4pPr marL="1600200" indent="-228600" algn="l" defTabSz="914400" rtl="0" eaLnBrk="1" latinLnBrk="0" hangingPunct="1">
+              <a:lnSpc>
+                <a:spcPct val="90000"/>
+              </a:lnSpc>
+              <a:spcBef>
+                <a:spcPts val="500"/>
+              </a:spcBef>
+              <a:buFont typeface="Arial" panose="020B0604020202020204" pitchFamily="34" charset="0"/>
+              <a:buChar char="•"/>
+              <a:defRPr sz="1800" kern="1200">
+                <a:solidFill>
+                  <a:schemeClr val="tx1"/>
+                </a:solidFill>
+                <a:latin typeface="+mn-lt"/>
+                <a:ea typeface="+mn-ea"/>
+                <a:cs typeface="+mn-cs"/>
+              </a:defRPr>
+            </a:lvl4pPr>
+            <a:lvl5pPr marL="2057400" indent="-228600" algn="l" defTabSz="914400" rtl="0" eaLnBrk="1" latinLnBrk="0" hangingPunct="1">
+              <a:lnSpc>
+                <a:spcPct val="90000"/>
+              </a:lnSpc>
+              <a:spcBef>
+                <a:spcPts val="500"/>
+              </a:spcBef>
+              <a:buFont typeface="Arial" panose="020B0604020202020204" pitchFamily="34" charset="0"/>
+              <a:buChar char="•"/>
+              <a:defRPr sz="1800" kern="1200">
+                <a:solidFill>
+                  <a:schemeClr val="tx1"/>
+                </a:solidFill>
+                <a:latin typeface="+mn-lt"/>
+                <a:ea typeface="+mn-ea"/>
+                <a:cs typeface="+mn-cs"/>
+              </a:defRPr>
+            </a:lvl5pPr>
+            <a:lvl6pPr marL="2514600" indent="-228600" algn="l" defTabSz="914400" rtl="0" eaLnBrk="1" latinLnBrk="0" hangingPunct="1">
+              <a:lnSpc>
+                <a:spcPct val="90000"/>
+              </a:lnSpc>
+              <a:spcBef>
+                <a:spcPts val="500"/>
+              </a:spcBef>
+              <a:buFont typeface="Arial" panose="020B0604020202020204" pitchFamily="34" charset="0"/>
+              <a:buChar char="•"/>
+              <a:defRPr sz="1800" kern="1200">
+                <a:solidFill>
+                  <a:schemeClr val="tx1"/>
+                </a:solidFill>
+                <a:latin typeface="+mn-lt"/>
+                <a:ea typeface="+mn-ea"/>
+                <a:cs typeface="+mn-cs"/>
+              </a:defRPr>
+            </a:lvl6pPr>
+            <a:lvl7pPr marL="2971800" indent="-228600" algn="l" defTabSz="914400" rtl="0" eaLnBrk="1" latinLnBrk="0" hangingPunct="1">
+              <a:lnSpc>
+                <a:spcPct val="90000"/>
+              </a:lnSpc>
+              <a:spcBef>
+                <a:spcPts val="500"/>
+              </a:spcBef>
+              <a:buFont typeface="Arial" panose="020B0604020202020204" pitchFamily="34" charset="0"/>
+              <a:buChar char="•"/>
+              <a:defRPr sz="1800" kern="1200">
+                <a:solidFill>
+                  <a:schemeClr val="tx1"/>
+                </a:solidFill>
+                <a:latin typeface="+mn-lt"/>
+                <a:ea typeface="+mn-ea"/>
+                <a:cs typeface="+mn-cs"/>
+              </a:defRPr>
+            </a:lvl7pPr>
+            <a:lvl8pPr marL="3429000" indent="-228600" algn="l" defTabSz="914400" rtl="0" eaLnBrk="1" latinLnBrk="0" hangingPunct="1">
+              <a:lnSpc>
+                <a:spcPct val="90000"/>
+              </a:lnSpc>
+              <a:spcBef>
+                <a:spcPts val="500"/>
+              </a:spcBef>
+              <a:buFont typeface="Arial" panose="020B0604020202020204" pitchFamily="34" charset="0"/>
+              <a:buChar char="•"/>
+              <a:defRPr sz="1800" kern="1200">
+                <a:solidFill>
+                  <a:schemeClr val="tx1"/>
+                </a:solidFill>
+                <a:latin typeface="+mn-lt"/>
+                <a:ea typeface="+mn-ea"/>
+                <a:cs typeface="+mn-cs"/>
+              </a:defRPr>
+            </a:lvl8pPr>
+            <a:lvl9pPr marL="3886200" indent="-228600" algn="l" defTabSz="914400" rtl="0" eaLnBrk="1" latinLnBrk="0" hangingPunct="1">
+              <a:lnSpc>
+                <a:spcPct val="90000"/>
+              </a:lnSpc>
+              <a:spcBef>
+                <a:spcPts val="500"/>
+              </a:spcBef>
+              <a:buFont typeface="Arial" panose="020B0604020202020204" pitchFamily="34" charset="0"/>
+              <a:buChar char="•"/>
+              <a:defRPr sz="1800" kern="1200">
+                <a:solidFill>
+                  <a:schemeClr val="tx1"/>
+                </a:solidFill>
+                <a:latin typeface="+mn-lt"/>
+                <a:ea typeface="+mn-ea"/>
+                <a:cs typeface="+mn-cs"/>
+              </a:defRPr>
+            </a:lvl9pPr>
+          </a:lstStyle>
+          <a:p>
+            <a:r>
+              <a:rPr lang="en-US" dirty="0"/>
+              <a:t>Roll/Pitch</a:t>
+            </a:r>
+          </a:p>
+        </p:txBody>
+      </p:sp>
     </p:spTree>
     <p:extLst>
       <p:ext uri="{BB962C8B-B14F-4D97-AF65-F5344CB8AC3E}">
@@ -3970,20 +4680,14 @@
             </p:nvSpPr>
             <p:spPr/>
             <p:txBody>
-              <a:bodyPr/>
+              <a:bodyPr>
+                <a:normAutofit/>
+              </a:bodyPr>
               <a:lstStyle/>
               <a:p>
                 <a:r>
                   <a:rPr lang="en-US" dirty="0"/>
-                  <a:t>Results from step </a:t>
-                </a:r>
-                <a:r>
-                  <a:rPr lang="en-US" dirty="0" err="1"/>
-                  <a:t>impuls</a:t>
-                </a:r>
-                <a:r>
-                  <a:rPr lang="en-US" dirty="0"/>
-                  <a:t> at 0.1 s of 15 deg (~.26 rad) in </a:t>
+                  <a:t>Results from step impulse at 0.1 s of 15 deg (~.26 rad) in </a:t>
                 </a:r>
                 <a14:m>
                   <m:oMath xmlns:m="http://schemas.openxmlformats.org/officeDocument/2006/math">
@@ -4027,7 +4731,7 @@
               <a:blipFill>
                 <a:blip r:embed="rId2"/>
                 <a:stretch>
-                  <a:fillRect l="-2377" t="-13364" b="-21198"/>
+                  <a:fillRect l="-1105" b="-16867"/>
                 </a:stretch>
               </a:blipFill>
             </p:spPr>
@@ -4212,7 +4916,10 @@
           <a:bodyPr/>
           <a:lstStyle/>
           <a:p>
-            <a:endParaRPr lang="en-US"/>
+            <a:r>
+              <a:rPr lang="en-US" dirty="0"/>
+              <a:t>Thrust Control (u1)</a:t>
+            </a:r>
           </a:p>
         </p:txBody>
       </p:sp>
@@ -4234,13 +4941,76 @@
         </p:nvSpPr>
         <p:spPr/>
         <p:txBody>
-          <a:bodyPr/>
+          <a:bodyPr anchor="t"/>
           <a:lstStyle/>
           <a:p>
-            <a:endParaRPr lang="en-US"/>
-          </a:p>
-        </p:txBody>
-      </p:sp>
+            <a:r>
+              <a:rPr lang="en-US" dirty="0"/>
+              <a:t>Thrust Control (u1 tuning)</a:t>
+            </a:r>
+          </a:p>
+        </p:txBody>
+      </p:sp>
+      <p:pic>
+        <p:nvPicPr>
+          <p:cNvPr id="5" name="Picture 4">
+            <a:extLst>
+              <a:ext uri="{FF2B5EF4-FFF2-40B4-BE49-F238E27FC236}">
+                <a16:creationId xmlns:a16="http://schemas.microsoft.com/office/drawing/2014/main" id="{56665FAD-1895-B128-101E-FEB63408660C}"/>
+              </a:ext>
+            </a:extLst>
+          </p:cNvPr>
+          <p:cNvPicPr>
+            <a:picLocks noChangeAspect="1"/>
+          </p:cNvPicPr>
+          <p:nvPr/>
+        </p:nvPicPr>
+        <p:blipFill>
+          <a:blip r:embed="rId2"/>
+          <a:stretch>
+            <a:fillRect/>
+          </a:stretch>
+        </p:blipFill>
+        <p:spPr>
+          <a:xfrm>
+            <a:off x="5528236" y="2314122"/>
+            <a:ext cx="3090462" cy="3411049"/>
+          </a:xfrm>
+          <a:prstGeom prst="rect">
+            <a:avLst/>
+          </a:prstGeom>
+        </p:spPr>
+      </p:pic>
+      <p:pic>
+        <p:nvPicPr>
+          <p:cNvPr id="7" name="Picture 6">
+            <a:extLst>
+              <a:ext uri="{FF2B5EF4-FFF2-40B4-BE49-F238E27FC236}">
+                <a16:creationId xmlns:a16="http://schemas.microsoft.com/office/drawing/2014/main" id="{188A3237-A0EA-18E6-9467-A95A691F0D90}"/>
+              </a:ext>
+            </a:extLst>
+          </p:cNvPr>
+          <p:cNvPicPr>
+            <a:picLocks noChangeAspect="1"/>
+          </p:cNvPicPr>
+          <p:nvPr/>
+        </p:nvPicPr>
+        <p:blipFill>
+          <a:blip r:embed="rId3"/>
+          <a:stretch>
+            <a:fillRect/>
+          </a:stretch>
+        </p:blipFill>
+        <p:spPr>
+          <a:xfrm>
+            <a:off x="928820" y="2714861"/>
+            <a:ext cx="4599416" cy="3076345"/>
+          </a:xfrm>
+          <a:prstGeom prst="rect">
+            <a:avLst/>
+          </a:prstGeom>
+        </p:spPr>
+      </p:pic>
     </p:spTree>
     <p:extLst>
       <p:ext uri="{BB962C8B-B14F-4D97-AF65-F5344CB8AC3E}">
@@ -4255,9 +5025,9 @@
 </file>
 
 <file path=ppt/theme/theme1.xml><?xml version="1.0" encoding="utf-8"?>
-<a:theme xmlns:a="http://schemas.openxmlformats.org/drawingml/2006/main" name="Office Theme">
+<a:theme xmlns:a="http://schemas.openxmlformats.org/drawingml/2006/main" name="Dividend">
   <a:themeElements>
-    <a:clrScheme name="Office">
+    <a:clrScheme name="Dividend">
       <a:dk1>
         <a:sysClr val="windowText" lastClr="000000"/>
       </a:dk1>
@@ -4265,98 +5035,48 @@
         <a:sysClr val="window" lastClr="FFFFFF"/>
       </a:lt1>
       <a:dk2>
-        <a:srgbClr val="44546A"/>
+        <a:srgbClr val="3D3D3D"/>
       </a:dk2>
       <a:lt2>
-        <a:srgbClr val="E7E6E6"/>
+        <a:srgbClr val="EBEBEB"/>
       </a:lt2>
       <a:accent1>
-        <a:srgbClr val="4472C4"/>
+        <a:srgbClr val="465359"/>
       </a:accent1>
       <a:accent2>
-        <a:srgbClr val="ED7D31"/>
+        <a:srgbClr val="ED8428"/>
       </a:accent2>
       <a:accent3>
-        <a:srgbClr val="A5A5A5"/>
+        <a:srgbClr val="E6C46D"/>
       </a:accent3>
       <a:accent4>
-        <a:srgbClr val="FFC000"/>
+        <a:srgbClr val="969FA7"/>
       </a:accent4>
       <a:accent5>
-        <a:srgbClr val="5B9BD5"/>
+        <a:srgbClr val="A9C37C"/>
       </a:accent5>
       <a:accent6>
-        <a:srgbClr val="70AD47"/>
+        <a:srgbClr val="5A8071"/>
       </a:accent6>
       <a:hlink>
-        <a:srgbClr val="0563C1"/>
+        <a:srgbClr val="828282"/>
       </a:hlink>
       <a:folHlink>
-        <a:srgbClr val="954F72"/>
+        <a:srgbClr val="A5A5A5"/>
       </a:folHlink>
     </a:clrScheme>
-    <a:fontScheme name="Office">
+    <a:fontScheme name="Dividend">
       <a:majorFont>
-        <a:latin typeface="Calibri Light" panose="020F0302020204030204"/>
+        <a:latin typeface="Gill Sans MT" panose="020B0502020104020203"/>
         <a:ea typeface=""/>
         <a:cs typeface=""/>
-        <a:font script="Jpan" typeface="游ゴシック Light"/>
-        <a:font script="Hang" typeface="맑은 고딕"/>
-        <a:font script="Hans" typeface="等线 Light"/>
-        <a:font script="Hant" typeface="新細明體"/>
-        <a:font script="Arab" typeface="Times New Roman"/>
-        <a:font script="Hebr" typeface="Times New Roman"/>
-        <a:font script="Thai" typeface="Angsana New"/>
-        <a:font script="Ethi" typeface="Nyala"/>
-        <a:font script="Beng" typeface="Vrinda"/>
-        <a:font script="Gujr" typeface="Shruti"/>
-        <a:font script="Khmr" typeface="MoolBoran"/>
-        <a:font script="Knda" typeface="Tunga"/>
-        <a:font script="Guru" typeface="Raavi"/>
-        <a:font script="Cans" typeface="Euphemia"/>
-        <a:font script="Cher" typeface="Plantagenet Cherokee"/>
-        <a:font script="Yiii" typeface="Microsoft Yi Baiti"/>
-        <a:font script="Tibt" typeface="Microsoft Himalaya"/>
-        <a:font script="Thaa" typeface="MV Boli"/>
-        <a:font script="Deva" typeface="Mangal"/>
-        <a:font script="Telu" typeface="Gautami"/>
-        <a:font script="Taml" typeface="Latha"/>
-        <a:font script="Syrc" typeface="Estrangelo Edessa"/>
-        <a:font script="Orya" typeface="Kalinga"/>
-        <a:font script="Mlym" typeface="Kartika"/>
-        <a:font script="Laoo" typeface="DokChampa"/>
-        <a:font script="Sinh" typeface="Iskoola Pota"/>
-        <a:font script="Mong" typeface="Mongolian Baiti"/>
-        <a:font script="Viet" typeface="Times New Roman"/>
-        <a:font script="Uigh" typeface="Microsoft Uighur"/>
-        <a:font script="Geor" typeface="Sylfaen"/>
-        <a:font script="Armn" typeface="Arial"/>
-        <a:font script="Bugi" typeface="Leelawadee UI"/>
-        <a:font script="Bopo" typeface="Microsoft JhengHei"/>
-        <a:font script="Java" typeface="Javanese Text"/>
-        <a:font script="Lisu" typeface="Segoe UI"/>
-        <a:font script="Mymr" typeface="Myanmar Text"/>
-        <a:font script="Nkoo" typeface="Ebrima"/>
-        <a:font script="Olck" typeface="Nirmala UI"/>
-        <a:font script="Osma" typeface="Ebrima"/>
-        <a:font script="Phag" typeface="Phagspa"/>
-        <a:font script="Syrn" typeface="Estrangelo Edessa"/>
-        <a:font script="Syrj" typeface="Estrangelo Edessa"/>
-        <a:font script="Syre" typeface="Estrangelo Edessa"/>
-        <a:font script="Sora" typeface="Nirmala UI"/>
-        <a:font script="Tale" typeface="Microsoft Tai Le"/>
-        <a:font script="Talu" typeface="Microsoft New Tai Lue"/>
-        <a:font script="Tfng" typeface="Ebrima"/>
-      </a:majorFont>
-      <a:minorFont>
-        <a:latin typeface="Calibri" panose="020F0502020204030204"/>
-        <a:ea typeface=""/>
-        <a:cs typeface=""/>
-        <a:font script="Jpan" typeface="游ゴシック"/>
-        <a:font script="Hang" typeface="맑은 고딕"/>
-        <a:font script="Hans" typeface="等线"/>
-        <a:font script="Hant" typeface="新細明體"/>
-        <a:font script="Arab" typeface="Arial"/>
+        <a:font script="Grek" typeface="Corbel"/>
+        <a:font script="Cyrl" typeface="Corbel"/>
+        <a:font script="Jpan" typeface="HGｺﾞｼｯｸE"/>
+        <a:font script="Hang" typeface="휴먼매직체"/>
+        <a:font script="Hans" typeface="华文中宋"/>
+        <a:font script="Hant" typeface="微軟正黑體"/>
+        <a:font script="Arab" typeface="Majalla UI"/>
         <a:font script="Hebr" typeface="Arial"/>
         <a:font script="Thai" typeface="Cordia New"/>
         <a:font script="Ethi" typeface="Nyala"/>
@@ -4379,29 +5099,49 @@
         <a:font script="Laoo" typeface="DokChampa"/>
         <a:font script="Sinh" typeface="Iskoola Pota"/>
         <a:font script="Mong" typeface="Mongolian Baiti"/>
-        <a:font script="Viet" typeface="Arial"/>
+        <a:font script="Viet" typeface="Tahoma"/>
         <a:font script="Uigh" typeface="Microsoft Uighur"/>
         <a:font script="Geor" typeface="Sylfaen"/>
-        <a:font script="Armn" typeface="Arial"/>
-        <a:font script="Bugi" typeface="Leelawadee UI"/>
-        <a:font script="Bopo" typeface="Microsoft JhengHei"/>
-        <a:font script="Java" typeface="Javanese Text"/>
-        <a:font script="Lisu" typeface="Segoe UI"/>
-        <a:font script="Mymr" typeface="Myanmar Text"/>
-        <a:font script="Nkoo" typeface="Ebrima"/>
-        <a:font script="Olck" typeface="Nirmala UI"/>
-        <a:font script="Osma" typeface="Ebrima"/>
-        <a:font script="Phag" typeface="Phagspa"/>
-        <a:font script="Syrn" typeface="Estrangelo Edessa"/>
-        <a:font script="Syrj" typeface="Estrangelo Edessa"/>
-        <a:font script="Syre" typeface="Estrangelo Edessa"/>
-        <a:font script="Sora" typeface="Nirmala UI"/>
-        <a:font script="Tale" typeface="Microsoft Tai Le"/>
-        <a:font script="Talu" typeface="Microsoft New Tai Lue"/>
-        <a:font script="Tfng" typeface="Ebrima"/>
+      </a:majorFont>
+      <a:minorFont>
+        <a:latin typeface="Gill Sans MT" panose="020B0502020104020203"/>
+        <a:ea typeface=""/>
+        <a:cs typeface=""/>
+        <a:font script="Grek" typeface="Corbel"/>
+        <a:font script="Cyrl" typeface="Corbel"/>
+        <a:font script="Jpan" typeface="HGｺﾞｼｯｸE"/>
+        <a:font script="Hang" typeface="휴먼매직체"/>
+        <a:font script="Hans" typeface="华文中宋"/>
+        <a:font script="Hant" typeface="微軟正黑體"/>
+        <a:font script="Arab" typeface="Majalla UI"/>
+        <a:font script="Hebr" typeface="Arial"/>
+        <a:font script="Thai" typeface="Cordia New"/>
+        <a:font script="Ethi" typeface="Nyala"/>
+        <a:font script="Beng" typeface="Vrinda"/>
+        <a:font script="Gujr" typeface="Shruti"/>
+        <a:font script="Khmr" typeface="DaunPenh"/>
+        <a:font script="Knda" typeface="Tunga"/>
+        <a:font script="Guru" typeface="Raavi"/>
+        <a:font script="Cans" typeface="Euphemia"/>
+        <a:font script="Cher" typeface="Plantagenet Cherokee"/>
+        <a:font script="Yiii" typeface="Microsoft Yi Baiti"/>
+        <a:font script="Tibt" typeface="Microsoft Himalaya"/>
+        <a:font script="Thaa" typeface="MV Boli"/>
+        <a:font script="Deva" typeface="Mangal"/>
+        <a:font script="Telu" typeface="Gautami"/>
+        <a:font script="Taml" typeface="Latha"/>
+        <a:font script="Syrc" typeface="Estrangelo Edessa"/>
+        <a:font script="Orya" typeface="Kalinga"/>
+        <a:font script="Mlym" typeface="Kartika"/>
+        <a:font script="Laoo" typeface="DokChampa"/>
+        <a:font script="Sinh" typeface="Iskoola Pota"/>
+        <a:font script="Mong" typeface="Mongolian Baiti"/>
+        <a:font script="Viet" typeface="Tahoma"/>
+        <a:font script="Uigh" typeface="Microsoft Uighur"/>
+        <a:font script="Geor" typeface="Sylfaen"/>
       </a:minorFont>
     </a:fontScheme>
-    <a:fmtScheme name="Office">
+    <a:fmtScheme name="Dividend">
       <a:fillStyleLst>
         <a:solidFill>
           <a:schemeClr val="phClr"/>
@@ -4410,23 +5150,111 @@
           <a:gsLst>
             <a:gs pos="0">
               <a:schemeClr val="phClr">
-                <a:lumMod val="110000"/>
-                <a:satMod val="105000"/>
-                <a:tint val="67000"/>
-              </a:schemeClr>
-            </a:gs>
-            <a:gs pos="50000">
-              <a:schemeClr val="phClr">
-                <a:lumMod val="105000"/>
-                <a:satMod val="103000"/>
-                <a:tint val="73000"/>
+                <a:tint val="68000"/>
+                <a:alpha val="90000"/>
+                <a:lumMod val="100000"/>
               </a:schemeClr>
             </a:gs>
             <a:gs pos="100000">
               <a:schemeClr val="phClr">
-                <a:lumMod val="105000"/>
-                <a:satMod val="109000"/>
-                <a:tint val="81000"/>
+                <a:tint val="90000"/>
+                <a:lumMod val="95000"/>
+              </a:schemeClr>
+            </a:gs>
+          </a:gsLst>
+          <a:lin ang="5400000" scaled="1"/>
+        </a:gradFill>
+        <a:gradFill rotWithShape="1">
+          <a:gsLst>
+            <a:gs pos="0">
+              <a:schemeClr val="phClr">
+                <a:tint val="98000"/>
+                <a:lumMod val="110000"/>
+              </a:schemeClr>
+            </a:gs>
+            <a:gs pos="84000">
+              <a:schemeClr val="phClr">
+                <a:shade val="90000"/>
+                <a:lumMod val="88000"/>
+              </a:schemeClr>
+            </a:gs>
+          </a:gsLst>
+          <a:lin ang="5400000" scaled="0"/>
+        </a:gradFill>
+      </a:fillStyleLst>
+      <a:lnStyleLst>
+        <a:ln w="12700" cap="rnd" cmpd="sng" algn="ctr">
+          <a:solidFill>
+            <a:schemeClr val="phClr">
+              <a:lumMod val="90000"/>
+            </a:schemeClr>
+          </a:solidFill>
+          <a:prstDash val="solid"/>
+        </a:ln>
+        <a:ln w="22225" cap="rnd" cmpd="sng" algn="ctr">
+          <a:solidFill>
+            <a:schemeClr val="phClr"/>
+          </a:solidFill>
+          <a:prstDash val="solid"/>
+        </a:ln>
+        <a:ln w="25400" cap="rnd" cmpd="sng" algn="ctr">
+          <a:solidFill>
+            <a:schemeClr val="phClr"/>
+          </a:solidFill>
+          <a:prstDash val="solid"/>
+        </a:ln>
+      </a:lnStyleLst>
+      <a:effectStyleLst>
+        <a:effectStyle>
+          <a:effectLst/>
+        </a:effectStyle>
+        <a:effectStyle>
+          <a:effectLst>
+            <a:outerShdw blurRad="38100" dist="25400" dir="5400000" rotWithShape="0">
+              <a:srgbClr val="000000">
+                <a:alpha val="55000"/>
+              </a:srgbClr>
+            </a:outerShdw>
+          </a:effectLst>
+        </a:effectStyle>
+        <a:effectStyle>
+          <a:effectLst>
+            <a:outerShdw blurRad="88900" dist="38100" dir="5040000" rotWithShape="0">
+              <a:srgbClr val="000000">
+                <a:alpha val="60000"/>
+              </a:srgbClr>
+            </a:outerShdw>
+          </a:effectLst>
+          <a:scene3d>
+            <a:camera prst="orthographicFront">
+              <a:rot lat="0" lon="0" rev="0"/>
+            </a:camera>
+            <a:lightRig rig="threePt" dir="tl">
+              <a:rot lat="0" lon="0" rev="1200000"/>
+            </a:lightRig>
+          </a:scene3d>
+          <a:sp3d>
+            <a:bevelT w="38100" h="50800"/>
+          </a:sp3d>
+        </a:effectStyle>
+      </a:effectStyleLst>
+      <a:bgFillStyleLst>
+        <a:solidFill>
+          <a:schemeClr val="phClr"/>
+        </a:solidFill>
+        <a:gradFill rotWithShape="1">
+          <a:gsLst>
+            <a:gs pos="0">
+              <a:schemeClr val="phClr">
+                <a:tint val="90000"/>
+                <a:lumMod val="110000"/>
+              </a:schemeClr>
+            </a:gs>
+            <a:gs pos="88000">
+              <a:schemeClr val="phClr">
+                <a:shade val="94000"/>
+                <a:satMod val="110000"/>
+                <a:lumMod val="88000"/>
               </a:schemeClr>
             </a:gs>
           </a:gsLst>
@@ -4436,105 +5264,21 @@
           <a:gsLst>
             <a:gs pos="0">
               <a:schemeClr val="phClr">
-                <a:satMod val="103000"/>
-                <a:lumMod val="102000"/>
-                <a:tint val="94000"/>
-              </a:schemeClr>
-            </a:gs>
-            <a:gs pos="50000">
-              <a:schemeClr val="phClr">
-                <a:satMod val="110000"/>
-                <a:lumMod val="100000"/>
-                <a:shade val="100000"/>
+                <a:tint val="90000"/>
+                <a:lumMod val="110000"/>
               </a:schemeClr>
             </a:gs>
             <a:gs pos="100000">
               <a:schemeClr val="phClr">
-                <a:lumMod val="99000"/>
-                <a:satMod val="120000"/>
-                <a:shade val="78000"/>
+                <a:shade val="98000"/>
+                <a:satMod val="110000"/>
+                <a:lumMod val="86000"/>
               </a:schemeClr>
             </a:gs>
           </a:gsLst>
-          <a:lin ang="5400000" scaled="0"/>
-        </a:gradFill>
-      </a:fillStyleLst>
-      <a:lnStyleLst>
-        <a:ln w="6350" cap="flat" cmpd="sng" algn="ctr">
-          <a:solidFill>
-            <a:schemeClr val="phClr"/>
-          </a:solidFill>
-          <a:prstDash val="solid"/>
-          <a:miter lim="800000"/>
-        </a:ln>
-        <a:ln w="12700" cap="flat" cmpd="sng" algn="ctr">
-          <a:solidFill>
-            <a:schemeClr val="phClr"/>
-          </a:solidFill>
-          <a:prstDash val="solid"/>
-          <a:miter lim="800000"/>
-        </a:ln>
-        <a:ln w="19050" cap="flat" cmpd="sng" algn="ctr">
-          <a:solidFill>
-            <a:schemeClr val="phClr"/>
-          </a:solidFill>
-          <a:prstDash val="solid"/>
-          <a:miter lim="800000"/>
-        </a:ln>
-      </a:lnStyleLst>
-      <a:effectStyleLst>
-        <a:effectStyle>
-          <a:effectLst/>
-        </a:effectStyle>
-        <a:effectStyle>
-          <a:effectLst/>
-        </a:effectStyle>
-        <a:effectStyle>
-          <a:effectLst>
-            <a:outerShdw blurRad="57150" dist="19050" dir="5400000" algn="ctr" rotWithShape="0">
-              <a:srgbClr val="000000">
-                <a:alpha val="63000"/>
-              </a:srgbClr>
-            </a:outerShdw>
-          </a:effectLst>
-        </a:effectStyle>
-      </a:effectStyleLst>
-      <a:bgFillStyleLst>
-        <a:solidFill>
-          <a:schemeClr val="phClr"/>
-        </a:solidFill>
-        <a:solidFill>
-          <a:schemeClr val="phClr">
-            <a:tint val="95000"/>
-            <a:satMod val="170000"/>
-          </a:schemeClr>
-        </a:solidFill>
-        <a:gradFill rotWithShape="1">
-          <a:gsLst>
-            <a:gs pos="0">
-              <a:schemeClr val="phClr">
-                <a:tint val="93000"/>
-                <a:satMod val="150000"/>
-                <a:shade val="98000"/>
-                <a:lumMod val="102000"/>
-              </a:schemeClr>
-            </a:gs>
-            <a:gs pos="50000">
-              <a:schemeClr val="phClr">
-                <a:tint val="98000"/>
-                <a:satMod val="130000"/>
-                <a:shade val="90000"/>
-                <a:lumMod val="103000"/>
-              </a:schemeClr>
-            </a:gs>
-            <a:gs pos="100000">
-              <a:schemeClr val="phClr">
-                <a:shade val="63000"/>
-                <a:satMod val="120000"/>
-              </a:schemeClr>
-            </a:gs>
-          </a:gsLst>
-          <a:lin ang="5400000" scaled="0"/>
+          <a:path path="circle">
+            <a:fillToRect l="50000" t="50000" r="100000" b="100000"/>
+          </a:path>
         </a:gradFill>
       </a:bgFillStyleLst>
     </a:fmtScheme>
@@ -4543,7 +5287,7 @@
   <a:extraClrSchemeLst/>
   <a:extLst>
     <a:ext uri="{05A4C25C-085E-4340-85A3-A5531E510DB2}">
-      <thm15:themeFamily xmlns:thm15="http://schemas.microsoft.com/office/thememl/2012/main" name="Office Theme" id="{62F939B6-93AF-4DB8-9C6B-D6C7DFDC589F}" vid="{4A3C46E8-61CC-4603-A589-7422A47A8E4A}"/>
+      <thm15:themeFamily xmlns:thm15="http://schemas.microsoft.com/office/thememl/2012/main" name="Dividend" id="{9697A71B-4AB7-4A1A-BD5B-BB2D22835B57}" vid="{5D8C9649-FBE1-4B5B-8258-8A170F9843AD}"/>
     </a:ext>
   </a:extLst>
 </a:theme>

</xml_diff>